<commit_message>
Add rfm dataframe image
</commit_message>
<xml_diff>
--- a/apresentacao/Apresentacao.pptx
+++ b/apresentacao/Apresentacao.pptx
@@ -217,7 +217,7 @@
             <a:pPr rtl="0"/>
             <a:fld id="{96040C08-05E9-4012-B418-01487B5076B6}" type="datetime1">
               <a:rPr lang="pt-BR" noProof="1" smtClean="0"/>
-              <a:t>01/10/2020</a:t>
+              <a:t>02/10/2020</a:t>
             </a:fld>
             <a:endParaRPr lang="pt-BR" noProof="1"/>
           </a:p>
@@ -387,7 +387,7 @@
             <a:pPr rtl="0"/>
             <a:fld id="{165A813A-4011-45B8-A14A-44F23C1D3E48}" type="datetime1">
               <a:rPr lang="pt-BR" noProof="1" smtClean="0"/>
-              <a:t>01/10/2020</a:t>
+              <a:t>02/10/2020</a:t>
             </a:fld>
             <a:endParaRPr lang="pt-BR" noProof="1"/>
           </a:p>
@@ -708,7 +708,7 @@
           <a:noFill/>
           <a:extLst>
             <a:ext uri="{909E8E84-426E-40dd-AFC4-6F175D3DCCD1}">
-              <a14:hiddenFill xmlns="" xmlns:a14="http://schemas.microsoft.com/office/drawing/2010/main">
+              <a14:hiddenFill xmlns:a14="http://schemas.microsoft.com/office/drawing/2010/main" xmlns="">
                 <a:solidFill>
                   <a:srgbClr val="FFFFFF"/>
                 </a:solidFill>
@@ -768,7 +768,7 @@
             </a:ln>
             <a:extLst>
               <a:ext uri="{91240B29-F687-4f45-9708-019B960494DF}">
-                <a14:hiddenLine xmlns="" xmlns:a14="http://schemas.microsoft.com/office/drawing/2010/main" w="9525">
+                <a14:hiddenLine xmlns:a14="http://schemas.microsoft.com/office/drawing/2010/main" xmlns="" w="9525">
                   <a:solidFill>
                     <a:srgbClr val="000000"/>
                   </a:solidFill>
@@ -858,7 +858,7 @@
             </a:ln>
             <a:extLst>
               <a:ext uri="{91240B29-F687-4f45-9708-019B960494DF}">
-                <a14:hiddenLine xmlns="" xmlns:a14="http://schemas.microsoft.com/office/drawing/2010/main" w="9525">
+                <a14:hiddenLine xmlns:a14="http://schemas.microsoft.com/office/drawing/2010/main" xmlns="" w="9525">
                   <a:solidFill>
                     <a:srgbClr val="000000"/>
                   </a:solidFill>
@@ -948,7 +948,7 @@
             </a:ln>
             <a:extLst>
               <a:ext uri="{91240B29-F687-4f45-9708-019B960494DF}">
-                <a14:hiddenLine xmlns="" xmlns:a14="http://schemas.microsoft.com/office/drawing/2010/main" w="9525">
+                <a14:hiddenLine xmlns:a14="http://schemas.microsoft.com/office/drawing/2010/main" xmlns="" w="9525">
                   <a:solidFill>
                     <a:srgbClr val="000000"/>
                   </a:solidFill>
@@ -982,7 +982,7 @@
             </a:ln>
             <a:extLst>
               <a:ext uri="{91240B29-F687-4f45-9708-019B960494DF}">
-                <a14:hiddenLine xmlns="" xmlns:a14="http://schemas.microsoft.com/office/drawing/2010/main" w="9525">
+                <a14:hiddenLine xmlns:a14="http://schemas.microsoft.com/office/drawing/2010/main" xmlns="" w="9525">
                   <a:solidFill>
                     <a:srgbClr val="000000"/>
                   </a:solidFill>
@@ -1072,7 +1072,7 @@
             </a:ln>
             <a:extLst>
               <a:ext uri="{91240B29-F687-4f45-9708-019B960494DF}">
-                <a14:hiddenLine xmlns="" xmlns:a14="http://schemas.microsoft.com/office/drawing/2010/main" w="9525">
+                <a14:hiddenLine xmlns:a14="http://schemas.microsoft.com/office/drawing/2010/main" xmlns="" w="9525">
                   <a:solidFill>
                     <a:srgbClr val="000000"/>
                   </a:solidFill>
@@ -1134,7 +1134,7 @@
             </a:ln>
             <a:extLst>
               <a:ext uri="{91240B29-F687-4f45-9708-019B960494DF}">
-                <a14:hiddenLine xmlns="" xmlns:a14="http://schemas.microsoft.com/office/drawing/2010/main" w="9525">
+                <a14:hiddenLine xmlns:a14="http://schemas.microsoft.com/office/drawing/2010/main" xmlns="" w="9525">
                   <a:solidFill>
                     <a:srgbClr val="000000"/>
                   </a:solidFill>
@@ -1196,7 +1196,7 @@
             </a:ln>
             <a:extLst>
               <a:ext uri="{91240B29-F687-4f45-9708-019B960494DF}">
-                <a14:hiddenLine xmlns="" xmlns:a14="http://schemas.microsoft.com/office/drawing/2010/main" w="9525">
+                <a14:hiddenLine xmlns:a14="http://schemas.microsoft.com/office/drawing/2010/main" xmlns="" w="9525">
                   <a:solidFill>
                     <a:srgbClr val="000000"/>
                   </a:solidFill>
@@ -1286,7 +1286,7 @@
             </a:ln>
             <a:extLst>
               <a:ext uri="{91240B29-F687-4f45-9708-019B960494DF}">
-                <a14:hiddenLine xmlns="" xmlns:a14="http://schemas.microsoft.com/office/drawing/2010/main" w="9525">
+                <a14:hiddenLine xmlns:a14="http://schemas.microsoft.com/office/drawing/2010/main" xmlns="" w="9525">
                   <a:solidFill>
                     <a:srgbClr val="000000"/>
                   </a:solidFill>
@@ -1348,7 +1348,7 @@
             </a:ln>
             <a:extLst>
               <a:ext uri="{91240B29-F687-4f45-9708-019B960494DF}">
-                <a14:hiddenLine xmlns="" xmlns:a14="http://schemas.microsoft.com/office/drawing/2010/main" w="9525">
+                <a14:hiddenLine xmlns:a14="http://schemas.microsoft.com/office/drawing/2010/main" xmlns="" w="9525">
                   <a:solidFill>
                     <a:srgbClr val="000000"/>
                   </a:solidFill>
@@ -1410,7 +1410,7 @@
             </a:ln>
             <a:extLst>
               <a:ext uri="{91240B29-F687-4f45-9708-019B960494DF}">
-                <a14:hiddenLine xmlns="" xmlns:a14="http://schemas.microsoft.com/office/drawing/2010/main" w="9525">
+                <a14:hiddenLine xmlns:a14="http://schemas.microsoft.com/office/drawing/2010/main" xmlns="" w="9525">
                   <a:solidFill>
                     <a:srgbClr val="000000"/>
                   </a:solidFill>
@@ -1500,7 +1500,7 @@
             </a:ln>
             <a:extLst>
               <a:ext uri="{91240B29-F687-4f45-9708-019B960494DF}">
-                <a14:hiddenLine xmlns="" xmlns:a14="http://schemas.microsoft.com/office/drawing/2010/main" w="9525">
+                <a14:hiddenLine xmlns:a14="http://schemas.microsoft.com/office/drawing/2010/main" xmlns="" w="9525">
                   <a:solidFill>
                     <a:srgbClr val="000000"/>
                   </a:solidFill>
@@ -1590,7 +1590,7 @@
             </a:ln>
             <a:extLst>
               <a:ext uri="{91240B29-F687-4f45-9708-019B960494DF}">
-                <a14:hiddenLine xmlns="" xmlns:a14="http://schemas.microsoft.com/office/drawing/2010/main" w="9525">
+                <a14:hiddenLine xmlns:a14="http://schemas.microsoft.com/office/drawing/2010/main" xmlns="" w="9525">
                   <a:solidFill>
                     <a:srgbClr val="000000"/>
                   </a:solidFill>
@@ -1652,7 +1652,7 @@
             </a:ln>
             <a:extLst>
               <a:ext uri="{91240B29-F687-4f45-9708-019B960494DF}">
-                <a14:hiddenLine xmlns="" xmlns:a14="http://schemas.microsoft.com/office/drawing/2010/main" w="9525">
+                <a14:hiddenLine xmlns:a14="http://schemas.microsoft.com/office/drawing/2010/main" xmlns="" w="9525">
                   <a:solidFill>
                     <a:srgbClr val="000000"/>
                   </a:solidFill>
@@ -1762,7 +1762,7 @@
             </a:ln>
             <a:extLst>
               <a:ext uri="{91240B29-F687-4f45-9708-019B960494DF}">
-                <a14:hiddenLine xmlns="" xmlns:a14="http://schemas.microsoft.com/office/drawing/2010/main" w="9525">
+                <a14:hiddenLine xmlns:a14="http://schemas.microsoft.com/office/drawing/2010/main" xmlns="" w="9525">
                   <a:solidFill>
                     <a:srgbClr val="000000"/>
                   </a:solidFill>
@@ -1824,7 +1824,7 @@
             </a:ln>
             <a:extLst>
               <a:ext uri="{91240B29-F687-4f45-9708-019B960494DF}">
-                <a14:hiddenLine xmlns="" xmlns:a14="http://schemas.microsoft.com/office/drawing/2010/main" w="9525">
+                <a14:hiddenLine xmlns:a14="http://schemas.microsoft.com/office/drawing/2010/main" xmlns="" w="9525">
                   <a:solidFill>
                     <a:srgbClr val="000000"/>
                   </a:solidFill>
@@ -1914,7 +1914,7 @@
             </a:ln>
             <a:extLst>
               <a:ext uri="{91240B29-F687-4f45-9708-019B960494DF}">
-                <a14:hiddenLine xmlns="" xmlns:a14="http://schemas.microsoft.com/office/drawing/2010/main" w="9525">
+                <a14:hiddenLine xmlns:a14="http://schemas.microsoft.com/office/drawing/2010/main" xmlns="" w="9525">
                   <a:solidFill>
                     <a:srgbClr val="000000"/>
                   </a:solidFill>
@@ -2004,7 +2004,7 @@
             </a:ln>
             <a:extLst>
               <a:ext uri="{91240B29-F687-4f45-9708-019B960494DF}">
-                <a14:hiddenLine xmlns="" xmlns:a14="http://schemas.microsoft.com/office/drawing/2010/main" w="9525">
+                <a14:hiddenLine xmlns:a14="http://schemas.microsoft.com/office/drawing/2010/main" xmlns="" w="9525">
                   <a:solidFill>
                     <a:srgbClr val="000000"/>
                   </a:solidFill>
@@ -2066,7 +2066,7 @@
             </a:ln>
             <a:extLst>
               <a:ext uri="{91240B29-F687-4f45-9708-019B960494DF}">
-                <a14:hiddenLine xmlns="" xmlns:a14="http://schemas.microsoft.com/office/drawing/2010/main" w="9525">
+                <a14:hiddenLine xmlns:a14="http://schemas.microsoft.com/office/drawing/2010/main" xmlns="" w="9525">
                   <a:solidFill>
                     <a:srgbClr val="000000"/>
                   </a:solidFill>
@@ -2156,7 +2156,7 @@
             </a:ln>
             <a:extLst>
               <a:ext uri="{91240B29-F687-4f45-9708-019B960494DF}">
-                <a14:hiddenLine xmlns="" xmlns:a14="http://schemas.microsoft.com/office/drawing/2010/main" w="9525">
+                <a14:hiddenLine xmlns:a14="http://schemas.microsoft.com/office/drawing/2010/main" xmlns="" w="9525">
                   <a:solidFill>
                     <a:srgbClr val="000000"/>
                   </a:solidFill>
@@ -2246,7 +2246,7 @@
             </a:ln>
             <a:extLst>
               <a:ext uri="{91240B29-F687-4f45-9708-019B960494DF}">
-                <a14:hiddenLine xmlns="" xmlns:a14="http://schemas.microsoft.com/office/drawing/2010/main" w="9525">
+                <a14:hiddenLine xmlns:a14="http://schemas.microsoft.com/office/drawing/2010/main" xmlns="" w="9525">
                   <a:solidFill>
                     <a:srgbClr val="000000"/>
                   </a:solidFill>
@@ -2302,7 +2302,7 @@
             </a:ln>
             <a:extLst>
               <a:ext uri="{91240B29-F687-4f45-9708-019B960494DF}">
-                <a14:hiddenLine xmlns="" xmlns:a14="http://schemas.microsoft.com/office/drawing/2010/main" w="9525">
+                <a14:hiddenLine xmlns:a14="http://schemas.microsoft.com/office/drawing/2010/main" xmlns="" w="9525">
                   <a:solidFill>
                     <a:srgbClr val="000000"/>
                   </a:solidFill>
@@ -2392,7 +2392,7 @@
             </a:ln>
             <a:extLst>
               <a:ext uri="{91240B29-F687-4f45-9708-019B960494DF}">
-                <a14:hiddenLine xmlns="" xmlns:a14="http://schemas.microsoft.com/office/drawing/2010/main" w="9525">
+                <a14:hiddenLine xmlns:a14="http://schemas.microsoft.com/office/drawing/2010/main" xmlns="" w="9525">
                   <a:solidFill>
                     <a:srgbClr val="000000"/>
                   </a:solidFill>
@@ -2448,7 +2448,7 @@
             </a:ln>
             <a:extLst>
               <a:ext uri="{91240B29-F687-4f45-9708-019B960494DF}">
-                <a14:hiddenLine xmlns="" xmlns:a14="http://schemas.microsoft.com/office/drawing/2010/main" w="9525">
+                <a14:hiddenLine xmlns:a14="http://schemas.microsoft.com/office/drawing/2010/main" xmlns="" w="9525">
                   <a:solidFill>
                     <a:srgbClr val="000000"/>
                   </a:solidFill>
@@ -2538,7 +2538,7 @@
             </a:ln>
             <a:extLst>
               <a:ext uri="{91240B29-F687-4f45-9708-019B960494DF}">
-                <a14:hiddenLine xmlns="" xmlns:a14="http://schemas.microsoft.com/office/drawing/2010/main" w="9525">
+                <a14:hiddenLine xmlns:a14="http://schemas.microsoft.com/office/drawing/2010/main" xmlns="" w="9525">
                   <a:solidFill>
                     <a:srgbClr val="000000"/>
                   </a:solidFill>
@@ -2606,7 +2606,7 @@
             </a:ln>
             <a:extLst>
               <a:ext uri="{91240B29-F687-4f45-9708-019B960494DF}">
-                <a14:hiddenLine xmlns="" xmlns:a14="http://schemas.microsoft.com/office/drawing/2010/main" w="9525">
+                <a14:hiddenLine xmlns:a14="http://schemas.microsoft.com/office/drawing/2010/main" xmlns="" w="9525">
                   <a:solidFill>
                     <a:srgbClr val="000000"/>
                   </a:solidFill>
@@ -2696,7 +2696,7 @@
             </a:ln>
             <a:extLst>
               <a:ext uri="{91240B29-F687-4f45-9708-019B960494DF}">
-                <a14:hiddenLine xmlns="" xmlns:a14="http://schemas.microsoft.com/office/drawing/2010/main" w="9525">
+                <a14:hiddenLine xmlns:a14="http://schemas.microsoft.com/office/drawing/2010/main" xmlns="" w="9525">
                   <a:solidFill>
                     <a:srgbClr val="000000"/>
                   </a:solidFill>
@@ -2764,7 +2764,7 @@
             </a:ln>
             <a:extLst>
               <a:ext uri="{91240B29-F687-4f45-9708-019B960494DF}">
-                <a14:hiddenLine xmlns="" xmlns:a14="http://schemas.microsoft.com/office/drawing/2010/main" w="9525">
+                <a14:hiddenLine xmlns:a14="http://schemas.microsoft.com/office/drawing/2010/main" xmlns="" w="9525">
                   <a:solidFill>
                     <a:srgbClr val="000000"/>
                   </a:solidFill>
@@ -2854,7 +2854,7 @@
             </a:ln>
             <a:extLst>
               <a:ext uri="{91240B29-F687-4f45-9708-019B960494DF}">
-                <a14:hiddenLine xmlns="" xmlns:a14="http://schemas.microsoft.com/office/drawing/2010/main" w="9525">
+                <a14:hiddenLine xmlns:a14="http://schemas.microsoft.com/office/drawing/2010/main" xmlns="" w="9525">
                   <a:solidFill>
                     <a:srgbClr val="000000"/>
                   </a:solidFill>
@@ -2888,7 +2888,7 @@
             </a:ln>
             <a:extLst>
               <a:ext uri="{91240B29-F687-4f45-9708-019B960494DF}">
-                <a14:hiddenLine xmlns="" xmlns:a14="http://schemas.microsoft.com/office/drawing/2010/main" w="9525">
+                <a14:hiddenLine xmlns:a14="http://schemas.microsoft.com/office/drawing/2010/main" xmlns="" w="9525">
                   <a:solidFill>
                     <a:srgbClr val="000000"/>
                   </a:solidFill>
@@ -2978,7 +2978,7 @@
             </a:ln>
             <a:extLst>
               <a:ext uri="{91240B29-F687-4f45-9708-019B960494DF}">
-                <a14:hiddenLine xmlns="" xmlns:a14="http://schemas.microsoft.com/office/drawing/2010/main" w="9525">
+                <a14:hiddenLine xmlns:a14="http://schemas.microsoft.com/office/drawing/2010/main" xmlns="" w="9525">
                   <a:solidFill>
                     <a:srgbClr val="000000"/>
                   </a:solidFill>
@@ -3040,7 +3040,7 @@
             </a:ln>
             <a:extLst>
               <a:ext uri="{91240B29-F687-4f45-9708-019B960494DF}">
-                <a14:hiddenLine xmlns="" xmlns:a14="http://schemas.microsoft.com/office/drawing/2010/main" w="9525">
+                <a14:hiddenLine xmlns:a14="http://schemas.microsoft.com/office/drawing/2010/main" xmlns="" w="9525">
                   <a:solidFill>
                     <a:srgbClr val="000000"/>
                   </a:solidFill>
@@ -3102,7 +3102,7 @@
             </a:ln>
             <a:extLst>
               <a:ext uri="{91240B29-F687-4f45-9708-019B960494DF}">
-                <a14:hiddenLine xmlns="" xmlns:a14="http://schemas.microsoft.com/office/drawing/2010/main" w="9525">
+                <a14:hiddenLine xmlns:a14="http://schemas.microsoft.com/office/drawing/2010/main" xmlns="" w="9525">
                   <a:solidFill>
                     <a:srgbClr val="000000"/>
                   </a:solidFill>
@@ -3192,7 +3192,7 @@
             </a:ln>
             <a:extLst>
               <a:ext uri="{91240B29-F687-4f45-9708-019B960494DF}">
-                <a14:hiddenLine xmlns="" xmlns:a14="http://schemas.microsoft.com/office/drawing/2010/main" w="9525">
+                <a14:hiddenLine xmlns:a14="http://schemas.microsoft.com/office/drawing/2010/main" xmlns="" w="9525">
                   <a:solidFill>
                     <a:srgbClr val="000000"/>
                   </a:solidFill>
@@ -3260,7 +3260,7 @@
             </a:ln>
             <a:extLst>
               <a:ext uri="{91240B29-F687-4f45-9708-019B960494DF}">
-                <a14:hiddenLine xmlns="" xmlns:a14="http://schemas.microsoft.com/office/drawing/2010/main" w="9525">
+                <a14:hiddenLine xmlns:a14="http://schemas.microsoft.com/office/drawing/2010/main" xmlns="" w="9525">
                   <a:solidFill>
                     <a:srgbClr val="000000"/>
                   </a:solidFill>
@@ -3322,7 +3322,7 @@
             </a:ln>
             <a:extLst>
               <a:ext uri="{91240B29-F687-4f45-9708-019B960494DF}">
-                <a14:hiddenLine xmlns="" xmlns:a14="http://schemas.microsoft.com/office/drawing/2010/main" w="9525">
+                <a14:hiddenLine xmlns:a14="http://schemas.microsoft.com/office/drawing/2010/main" xmlns="" w="9525">
                   <a:solidFill>
                     <a:srgbClr val="000000"/>
                   </a:solidFill>
@@ -3412,7 +3412,7 @@
             </a:ln>
             <a:extLst>
               <a:ext uri="{91240B29-F687-4f45-9708-019B960494DF}">
-                <a14:hiddenLine xmlns="" xmlns:a14="http://schemas.microsoft.com/office/drawing/2010/main" w="9525">
+                <a14:hiddenLine xmlns:a14="http://schemas.microsoft.com/office/drawing/2010/main" xmlns="" w="9525">
                   <a:solidFill>
                     <a:srgbClr val="000000"/>
                   </a:solidFill>
@@ -3474,7 +3474,7 @@
             </a:ln>
             <a:extLst>
               <a:ext uri="{91240B29-F687-4f45-9708-019B960494DF}">
-                <a14:hiddenLine xmlns="" xmlns:a14="http://schemas.microsoft.com/office/drawing/2010/main" w="9525">
+                <a14:hiddenLine xmlns:a14="http://schemas.microsoft.com/office/drawing/2010/main" xmlns="" w="9525">
                   <a:solidFill>
                     <a:srgbClr val="000000"/>
                   </a:solidFill>
@@ -3564,7 +3564,7 @@
             </a:ln>
             <a:extLst>
               <a:ext uri="{91240B29-F687-4f45-9708-019B960494DF}">
-                <a14:hiddenLine xmlns="" xmlns:a14="http://schemas.microsoft.com/office/drawing/2010/main" w="9525">
+                <a14:hiddenLine xmlns:a14="http://schemas.microsoft.com/office/drawing/2010/main" xmlns="" w="9525">
                   <a:solidFill>
                     <a:srgbClr val="000000"/>
                   </a:solidFill>
@@ -3626,7 +3626,7 @@
             </a:ln>
             <a:extLst>
               <a:ext uri="{91240B29-F687-4f45-9708-019B960494DF}">
-                <a14:hiddenLine xmlns="" xmlns:a14="http://schemas.microsoft.com/office/drawing/2010/main" w="9525">
+                <a14:hiddenLine xmlns:a14="http://schemas.microsoft.com/office/drawing/2010/main" xmlns="" w="9525">
                   <a:solidFill>
                     <a:srgbClr val="000000"/>
                   </a:solidFill>
@@ -3716,7 +3716,7 @@
             </a:ln>
             <a:extLst>
               <a:ext uri="{91240B29-F687-4f45-9708-019B960494DF}">
-                <a14:hiddenLine xmlns="" xmlns:a14="http://schemas.microsoft.com/office/drawing/2010/main" w="9525">
+                <a14:hiddenLine xmlns:a14="http://schemas.microsoft.com/office/drawing/2010/main" xmlns="" w="9525">
                   <a:solidFill>
                     <a:srgbClr val="000000"/>
                   </a:solidFill>
@@ -3750,7 +3750,7 @@
             </a:ln>
             <a:extLst>
               <a:ext uri="{91240B29-F687-4f45-9708-019B960494DF}">
-                <a14:hiddenLine xmlns="" xmlns:a14="http://schemas.microsoft.com/office/drawing/2010/main" w="9525">
+                <a14:hiddenLine xmlns:a14="http://schemas.microsoft.com/office/drawing/2010/main" xmlns="" w="9525">
                   <a:solidFill>
                     <a:srgbClr val="000000"/>
                   </a:solidFill>
@@ -3815,7 +3815,7 @@
             </a:ln>
             <a:extLst>
               <a:ext uri="{91240B29-F687-4f45-9708-019B960494DF}">
-                <a14:hiddenLine xmlns="" xmlns:a14="http://schemas.microsoft.com/office/drawing/2010/main" w="9525">
+                <a14:hiddenLine xmlns:a14="http://schemas.microsoft.com/office/drawing/2010/main" xmlns="" w="9525">
                   <a:solidFill>
                     <a:srgbClr val="000000"/>
                   </a:solidFill>
@@ -3905,7 +3905,7 @@
             </a:ln>
             <a:extLst>
               <a:ext uri="{91240B29-F687-4f45-9708-019B960494DF}">
-                <a14:hiddenLine xmlns="" xmlns:a14="http://schemas.microsoft.com/office/drawing/2010/main" w="9525">
+                <a14:hiddenLine xmlns:a14="http://schemas.microsoft.com/office/drawing/2010/main" xmlns="" w="9525">
                   <a:solidFill>
                     <a:srgbClr val="000000"/>
                   </a:solidFill>
@@ -3967,7 +3967,7 @@
             </a:ln>
             <a:extLst>
               <a:ext uri="{91240B29-F687-4f45-9708-019B960494DF}">
-                <a14:hiddenLine xmlns="" xmlns:a14="http://schemas.microsoft.com/office/drawing/2010/main" w="9525">
+                <a14:hiddenLine xmlns:a14="http://schemas.microsoft.com/office/drawing/2010/main" xmlns="" w="9525">
                   <a:solidFill>
                     <a:srgbClr val="000000"/>
                   </a:solidFill>
@@ -4057,7 +4057,7 @@
             </a:ln>
             <a:extLst>
               <a:ext uri="{91240B29-F687-4f45-9708-019B960494DF}">
-                <a14:hiddenLine xmlns="" xmlns:a14="http://schemas.microsoft.com/office/drawing/2010/main" w="9525">
+                <a14:hiddenLine xmlns:a14="http://schemas.microsoft.com/office/drawing/2010/main" xmlns="" w="9525">
                   <a:solidFill>
                     <a:srgbClr val="000000"/>
                   </a:solidFill>
@@ -4147,7 +4147,7 @@
             </a:ln>
             <a:extLst>
               <a:ext uri="{91240B29-F687-4f45-9708-019B960494DF}">
-                <a14:hiddenLine xmlns="" xmlns:a14="http://schemas.microsoft.com/office/drawing/2010/main" w="9525">
+                <a14:hiddenLine xmlns:a14="http://schemas.microsoft.com/office/drawing/2010/main" xmlns="" w="9525">
                   <a:solidFill>
                     <a:srgbClr val="000000"/>
                   </a:solidFill>
@@ -4212,7 +4212,7 @@
             </a:ln>
             <a:extLst>
               <a:ext uri="{91240B29-F687-4f45-9708-019B960494DF}">
-                <a14:hiddenLine xmlns="" xmlns:a14="http://schemas.microsoft.com/office/drawing/2010/main" w="9525">
+                <a14:hiddenLine xmlns:a14="http://schemas.microsoft.com/office/drawing/2010/main" xmlns="" w="9525">
                   <a:solidFill>
                     <a:srgbClr val="000000"/>
                   </a:solidFill>
@@ -4274,7 +4274,7 @@
             </a:ln>
             <a:extLst>
               <a:ext uri="{91240B29-F687-4f45-9708-019B960494DF}">
-                <a14:hiddenLine xmlns="" xmlns:a14="http://schemas.microsoft.com/office/drawing/2010/main" w="9525">
+                <a14:hiddenLine xmlns:a14="http://schemas.microsoft.com/office/drawing/2010/main" xmlns="" w="9525">
                   <a:solidFill>
                     <a:srgbClr val="000000"/>
                   </a:solidFill>
@@ -4364,7 +4364,7 @@
             </a:ln>
             <a:extLst>
               <a:ext uri="{91240B29-F687-4f45-9708-019B960494DF}">
-                <a14:hiddenLine xmlns="" xmlns:a14="http://schemas.microsoft.com/office/drawing/2010/main" w="9525">
+                <a14:hiddenLine xmlns:a14="http://schemas.microsoft.com/office/drawing/2010/main" xmlns="" w="9525">
                   <a:solidFill>
                     <a:srgbClr val="000000"/>
                   </a:solidFill>
@@ -4454,7 +4454,7 @@
             </a:ln>
             <a:extLst>
               <a:ext uri="{91240B29-F687-4f45-9708-019B960494DF}">
-                <a14:hiddenLine xmlns="" xmlns:a14="http://schemas.microsoft.com/office/drawing/2010/main" w="9525">
+                <a14:hiddenLine xmlns:a14="http://schemas.microsoft.com/office/drawing/2010/main" xmlns="" w="9525">
                   <a:solidFill>
                     <a:srgbClr val="000000"/>
                   </a:solidFill>
@@ -4516,7 +4516,7 @@
             </a:ln>
             <a:extLst>
               <a:ext uri="{91240B29-F687-4f45-9708-019B960494DF}">
-                <a14:hiddenLine xmlns="" xmlns:a14="http://schemas.microsoft.com/office/drawing/2010/main" w="9525">
+                <a14:hiddenLine xmlns:a14="http://schemas.microsoft.com/office/drawing/2010/main" xmlns="" w="9525">
                   <a:solidFill>
                     <a:srgbClr val="000000"/>
                   </a:solidFill>
@@ -4636,7 +4636,7 @@
             </a:ln>
             <a:extLst>
               <a:ext uri="{91240B29-F687-4f45-9708-019B960494DF}">
-                <a14:hiddenLine xmlns="" xmlns:a14="http://schemas.microsoft.com/office/drawing/2010/main" w="9525">
+                <a14:hiddenLine xmlns:a14="http://schemas.microsoft.com/office/drawing/2010/main" xmlns="" w="9525">
                   <a:solidFill>
                     <a:srgbClr val="000000"/>
                   </a:solidFill>
@@ -4704,7 +4704,7 @@
             </a:ln>
             <a:extLst>
               <a:ext uri="{91240B29-F687-4f45-9708-019B960494DF}">
-                <a14:hiddenLine xmlns="" xmlns:a14="http://schemas.microsoft.com/office/drawing/2010/main" w="9525">
+                <a14:hiddenLine xmlns:a14="http://schemas.microsoft.com/office/drawing/2010/main" xmlns="" w="9525">
                   <a:solidFill>
                     <a:srgbClr val="000000"/>
                   </a:solidFill>
@@ -4794,7 +4794,7 @@
             </a:ln>
             <a:extLst>
               <a:ext uri="{91240B29-F687-4f45-9708-019B960494DF}">
-                <a14:hiddenLine xmlns="" xmlns:a14="http://schemas.microsoft.com/office/drawing/2010/main" w="9525">
+                <a14:hiddenLine xmlns:a14="http://schemas.microsoft.com/office/drawing/2010/main" xmlns="" w="9525">
                   <a:solidFill>
                     <a:srgbClr val="000000"/>
                   </a:solidFill>
@@ -4935,7 +4935,7 @@
             <a:pPr rtl="0"/>
             <a:fld id="{C7BAFE39-3CD2-438B-98DC-F175D13D36F9}" type="datetime1">
               <a:rPr lang="pt-BR" noProof="1" dirty="0" smtClean="0"/>
-              <a:t>01/10/2020</a:t>
+              <a:t>02/10/2020</a:t>
             </a:fld>
             <a:endParaRPr lang="pt-BR" noProof="1"/>
           </a:p>
@@ -5200,7 +5200,7 @@
             <a:pPr rtl="0"/>
             <a:fld id="{19434977-38C4-4AC5-A184-1B8E188943F8}" type="datetime1">
               <a:rPr lang="pt-BR" noProof="1" smtClean="0"/>
-              <a:t>01/10/2020</a:t>
+              <a:t>02/10/2020</a:t>
             </a:fld>
             <a:endParaRPr lang="pt-BR" noProof="1"/>
           </a:p>
@@ -5394,7 +5394,7 @@
             <a:pPr rtl="0"/>
             <a:fld id="{8F57C134-9496-48BE-A542-5782DC57EF7C}" type="datetime1">
               <a:rPr lang="pt-BR" noProof="1" smtClean="0"/>
-              <a:t>01/10/2020</a:t>
+              <a:t>02/10/2020</a:t>
             </a:fld>
             <a:endParaRPr lang="pt-BR" noProof="1"/>
           </a:p>
@@ -5656,7 +5656,7 @@
             <a:pPr rtl="0"/>
             <a:fld id="{B5B2A30D-686C-43CB-A630-481CB9735D21}" type="datetime1">
               <a:rPr lang="pt-BR" noProof="1" smtClean="0"/>
-              <a:t>01/10/2020</a:t>
+              <a:t>02/10/2020</a:t>
             </a:fld>
             <a:endParaRPr lang="pt-BR" noProof="1"/>
           </a:p>
@@ -6088,7 +6088,7 @@
             <a:pPr rtl="0"/>
             <a:fld id="{7B844AFB-902A-4143-B269-544E558C0D47}" type="datetime1">
               <a:rPr lang="pt-BR" noProof="1" smtClean="0"/>
-              <a:t>01/10/2020</a:t>
+              <a:t>02/10/2020</a:t>
             </a:fld>
             <a:endParaRPr lang="pt-BR" noProof="1"/>
           </a:p>
@@ -6632,7 +6632,7 @@
             <a:pPr rtl="0"/>
             <a:fld id="{CB145496-3D8E-4D78-9EDC-F9D92D27C280}" type="datetime1">
               <a:rPr lang="pt-BR" noProof="1" smtClean="0"/>
-              <a:t>01/10/2020</a:t>
+              <a:t>02/10/2020</a:t>
             </a:fld>
             <a:endParaRPr lang="pt-BR" noProof="1"/>
           </a:p>
@@ -7351,7 +7351,7 @@
             <a:pPr rtl="0"/>
             <a:fld id="{4EC85B7D-9CB6-4905-9186-69EF463E94F9}" type="datetime1">
               <a:rPr lang="pt-BR" noProof="1" smtClean="0"/>
-              <a:t>01/10/2020</a:t>
+              <a:t>02/10/2020</a:t>
             </a:fld>
             <a:endParaRPr lang="pt-BR" noProof="1"/>
           </a:p>
@@ -7518,7 +7518,7 @@
             <a:pPr rtl="0"/>
             <a:fld id="{C82AE119-2B17-4615-B2A6-43C0C343D88E}" type="datetime1">
               <a:rPr lang="pt-BR" noProof="1" smtClean="0"/>
-              <a:t>01/10/2020</a:t>
+              <a:t>02/10/2020</a:t>
             </a:fld>
             <a:endParaRPr lang="pt-BR" noProof="1"/>
           </a:p>
@@ -7695,7 +7695,7 @@
             <a:pPr rtl="0"/>
             <a:fld id="{6343EC4F-2B28-413E-9EFD-3AD28D481070}" type="datetime1">
               <a:rPr lang="pt-BR" noProof="1" smtClean="0"/>
-              <a:t>01/10/2020</a:t>
+              <a:t>02/10/2020</a:t>
             </a:fld>
             <a:endParaRPr lang="pt-BR" noProof="1"/>
           </a:p>
@@ -7862,7 +7862,7 @@
             <a:pPr rtl="0"/>
             <a:fld id="{B596146D-C863-4CFA-8430-F836E2550190}" type="datetime1">
               <a:rPr lang="pt-BR" noProof="1" smtClean="0"/>
-              <a:t>01/10/2020</a:t>
+              <a:t>02/10/2020</a:t>
             </a:fld>
             <a:endParaRPr lang="pt-BR" noProof="1"/>
           </a:p>
@@ -8110,7 +8110,7 @@
             <a:pPr rtl="0"/>
             <a:fld id="{A9F944D4-3462-47E3-BCC4-3209F18C1240}" type="datetime1">
               <a:rPr lang="pt-BR" noProof="1" smtClean="0"/>
-              <a:t>01/10/2020</a:t>
+              <a:t>02/10/2020</a:t>
             </a:fld>
             <a:endParaRPr lang="pt-BR" noProof="1"/>
           </a:p>
@@ -8338,7 +8338,7 @@
             <a:pPr rtl="0"/>
             <a:fld id="{D00C1AC3-F0BB-40C0-88AB-424EF0CDC369}" type="datetime1">
               <a:rPr lang="pt-BR" noProof="1" smtClean="0"/>
-              <a:t>01/10/2020</a:t>
+              <a:t>02/10/2020</a:t>
             </a:fld>
             <a:endParaRPr lang="pt-BR" noProof="1"/>
           </a:p>
@@ -8716,7 +8716,7 @@
             <a:pPr rtl="0"/>
             <a:fld id="{313A7D48-E889-4EF0-A586-900AB4128C83}" type="datetime1">
               <a:rPr lang="pt-BR" noProof="1" smtClean="0"/>
-              <a:t>01/10/2020</a:t>
+              <a:t>02/10/2020</a:t>
             </a:fld>
             <a:endParaRPr lang="pt-BR" noProof="1"/>
           </a:p>
@@ -8832,7 +8832,7 @@
             <a:pPr rtl="0"/>
             <a:fld id="{210F89FB-AF48-4FE6-BBAF-38BCC18EF6F8}" type="datetime1">
               <a:rPr lang="pt-BR" noProof="1" smtClean="0"/>
-              <a:t>01/10/2020</a:t>
+              <a:t>02/10/2020</a:t>
             </a:fld>
             <a:endParaRPr lang="pt-BR" noProof="1"/>
           </a:p>
@@ -8925,7 +8925,7 @@
             <a:pPr rtl="0"/>
             <a:fld id="{4DE41C33-0EF3-4494-98B0-359DBB520128}" type="datetime1">
               <a:rPr lang="pt-BR" noProof="1" smtClean="0"/>
-              <a:t>01/10/2020</a:t>
+              <a:t>02/10/2020</a:t>
             </a:fld>
             <a:endParaRPr lang="pt-BR" noProof="1"/>
           </a:p>
@@ -9171,7 +9171,7 @@
             <a:pPr rtl="0"/>
             <a:fld id="{8B4AB2D0-ADEB-4519-98D0-D97171176440}" type="datetime1">
               <a:rPr lang="pt-BR" noProof="1" smtClean="0"/>
-              <a:t>01/10/2020</a:t>
+              <a:t>02/10/2020</a:t>
             </a:fld>
             <a:endParaRPr lang="pt-BR" noProof="1"/>
           </a:p>
@@ -9451,7 +9451,7 @@
             <a:pPr rtl="0"/>
             <a:fld id="{765542AB-00EF-4079-9FA3-AA440DDB0054}" type="datetime1">
               <a:rPr lang="pt-BR" noProof="1" smtClean="0"/>
-              <a:t>01/10/2020</a:t>
+              <a:t>02/10/2020</a:t>
             </a:fld>
             <a:endParaRPr lang="pt-BR" noProof="1"/>
           </a:p>
@@ -9564,7 +9564,7 @@
           <a:noFill/>
           <a:extLst>
             <a:ext uri="{909E8E84-426E-40dd-AFC4-6F175D3DCCD1}">
-              <a14:hiddenFill xmlns="" xmlns:a14="http://schemas.microsoft.com/office/drawing/2010/main">
+              <a14:hiddenFill xmlns:a14="http://schemas.microsoft.com/office/drawing/2010/main" xmlns="">
                 <a:solidFill>
                   <a:srgbClr val="FFFFFF"/>
                 </a:solidFill>
@@ -9638,7 +9638,7 @@
               </a:ln>
               <a:extLst>
                 <a:ext uri="{91240B29-F687-4f45-9708-019B960494DF}">
-                  <a14:hiddenLine xmlns="" xmlns:a14="http://schemas.microsoft.com/office/drawing/2010/main" w="9525">
+                  <a14:hiddenLine xmlns:a14="http://schemas.microsoft.com/office/drawing/2010/main" xmlns="" w="9525">
                     <a:solidFill>
                       <a:srgbClr val="000000"/>
                     </a:solidFill>
@@ -9728,7 +9728,7 @@
               </a:ln>
               <a:extLst>
                 <a:ext uri="{91240B29-F687-4f45-9708-019B960494DF}">
-                  <a14:hiddenLine xmlns="" xmlns:a14="http://schemas.microsoft.com/office/drawing/2010/main" w="9525">
+                  <a14:hiddenLine xmlns:a14="http://schemas.microsoft.com/office/drawing/2010/main" xmlns="" w="9525">
                     <a:solidFill>
                       <a:srgbClr val="000000"/>
                     </a:solidFill>
@@ -9818,7 +9818,7 @@
               </a:ln>
               <a:extLst>
                 <a:ext uri="{91240B29-F687-4f45-9708-019B960494DF}">
-                  <a14:hiddenLine xmlns="" xmlns:a14="http://schemas.microsoft.com/office/drawing/2010/main" w="9525">
+                  <a14:hiddenLine xmlns:a14="http://schemas.microsoft.com/office/drawing/2010/main" xmlns="" w="9525">
                     <a:solidFill>
                       <a:srgbClr val="000000"/>
                     </a:solidFill>
@@ -9880,7 +9880,7 @@
               </a:ln>
               <a:extLst>
                 <a:ext uri="{91240B29-F687-4f45-9708-019B960494DF}">
-                  <a14:hiddenLine xmlns="" xmlns:a14="http://schemas.microsoft.com/office/drawing/2010/main" w="9525">
+                  <a14:hiddenLine xmlns:a14="http://schemas.microsoft.com/office/drawing/2010/main" xmlns="" w="9525">
                     <a:solidFill>
                       <a:srgbClr val="000000"/>
                     </a:solidFill>
@@ -9970,7 +9970,7 @@
               </a:ln>
               <a:extLst>
                 <a:ext uri="{91240B29-F687-4f45-9708-019B960494DF}">
-                  <a14:hiddenLine xmlns="" xmlns:a14="http://schemas.microsoft.com/office/drawing/2010/main" w="9525">
+                  <a14:hiddenLine xmlns:a14="http://schemas.microsoft.com/office/drawing/2010/main" xmlns="" w="9525">
                     <a:solidFill>
                       <a:srgbClr val="000000"/>
                     </a:solidFill>
@@ -10032,7 +10032,7 @@
               </a:ln>
               <a:extLst>
                 <a:ext uri="{91240B29-F687-4f45-9708-019B960494DF}">
-                  <a14:hiddenLine xmlns="" xmlns:a14="http://schemas.microsoft.com/office/drawing/2010/main" w="9525">
+                  <a14:hiddenLine xmlns:a14="http://schemas.microsoft.com/office/drawing/2010/main" xmlns="" w="9525">
                     <a:solidFill>
                       <a:srgbClr val="000000"/>
                     </a:solidFill>
@@ -10094,7 +10094,7 @@
               </a:ln>
               <a:extLst>
                 <a:ext uri="{91240B29-F687-4f45-9708-019B960494DF}">
-                  <a14:hiddenLine xmlns="" xmlns:a14="http://schemas.microsoft.com/office/drawing/2010/main" w="9525">
+                  <a14:hiddenLine xmlns:a14="http://schemas.microsoft.com/office/drawing/2010/main" xmlns="" w="9525">
                     <a:solidFill>
                       <a:srgbClr val="000000"/>
                     </a:solidFill>
@@ -10184,7 +10184,7 @@
               </a:ln>
               <a:extLst>
                 <a:ext uri="{91240B29-F687-4f45-9708-019B960494DF}">
-                  <a14:hiddenLine xmlns="" xmlns:a14="http://schemas.microsoft.com/office/drawing/2010/main" w="9525">
+                  <a14:hiddenLine xmlns:a14="http://schemas.microsoft.com/office/drawing/2010/main" xmlns="" w="9525">
                     <a:solidFill>
                       <a:srgbClr val="000000"/>
                     </a:solidFill>
@@ -10274,7 +10274,7 @@
               </a:ln>
               <a:extLst>
                 <a:ext uri="{91240B29-F687-4f45-9708-019B960494DF}">
-                  <a14:hiddenLine xmlns="" xmlns:a14="http://schemas.microsoft.com/office/drawing/2010/main" w="9525">
+                  <a14:hiddenLine xmlns:a14="http://schemas.microsoft.com/office/drawing/2010/main" xmlns="" w="9525">
                     <a:solidFill>
                       <a:srgbClr val="000000"/>
                     </a:solidFill>
@@ -10336,7 +10336,7 @@
               </a:ln>
               <a:extLst>
                 <a:ext uri="{91240B29-F687-4f45-9708-019B960494DF}">
-                  <a14:hiddenLine xmlns="" xmlns:a14="http://schemas.microsoft.com/office/drawing/2010/main" w="9525">
+                  <a14:hiddenLine xmlns:a14="http://schemas.microsoft.com/office/drawing/2010/main" xmlns="" w="9525">
                     <a:solidFill>
                       <a:srgbClr val="000000"/>
                     </a:solidFill>
@@ -10446,7 +10446,7 @@
               </a:ln>
               <a:extLst>
                 <a:ext uri="{91240B29-F687-4f45-9708-019B960494DF}">
-                  <a14:hiddenLine xmlns="" xmlns:a14="http://schemas.microsoft.com/office/drawing/2010/main" w="9525">
+                  <a14:hiddenLine xmlns:a14="http://schemas.microsoft.com/office/drawing/2010/main" xmlns="" w="9525">
                     <a:solidFill>
                       <a:srgbClr val="000000"/>
                     </a:solidFill>
@@ -10530,7 +10530,7 @@
               </a:ln>
               <a:extLst>
                 <a:ext uri="{91240B29-F687-4f45-9708-019B960494DF}">
-                  <a14:hiddenLine xmlns="" xmlns:a14="http://schemas.microsoft.com/office/drawing/2010/main" w="9525">
+                  <a14:hiddenLine xmlns:a14="http://schemas.microsoft.com/office/drawing/2010/main" xmlns="" w="9525">
                     <a:solidFill>
                       <a:srgbClr val="000000"/>
                     </a:solidFill>
@@ -10592,7 +10592,7 @@
               </a:ln>
               <a:extLst>
                 <a:ext uri="{91240B29-F687-4f45-9708-019B960494DF}">
-                  <a14:hiddenLine xmlns="" xmlns:a14="http://schemas.microsoft.com/office/drawing/2010/main" w="9525">
+                  <a14:hiddenLine xmlns:a14="http://schemas.microsoft.com/office/drawing/2010/main" xmlns="" w="9525">
                     <a:solidFill>
                       <a:srgbClr val="000000"/>
                     </a:solidFill>
@@ -10654,7 +10654,7 @@
               </a:ln>
               <a:extLst>
                 <a:ext uri="{91240B29-F687-4f45-9708-019B960494DF}">
-                  <a14:hiddenLine xmlns="" xmlns:a14="http://schemas.microsoft.com/office/drawing/2010/main" w="9525">
+                  <a14:hiddenLine xmlns:a14="http://schemas.microsoft.com/office/drawing/2010/main" xmlns="" w="9525">
                     <a:solidFill>
                       <a:srgbClr val="000000"/>
                     </a:solidFill>
@@ -10744,7 +10744,7 @@
               </a:ln>
               <a:extLst>
                 <a:ext uri="{91240B29-F687-4f45-9708-019B960494DF}">
-                  <a14:hiddenLine xmlns="" xmlns:a14="http://schemas.microsoft.com/office/drawing/2010/main" w="9525">
+                  <a14:hiddenLine xmlns:a14="http://schemas.microsoft.com/office/drawing/2010/main" xmlns="" w="9525">
                     <a:solidFill>
                       <a:srgbClr val="000000"/>
                     </a:solidFill>
@@ -10778,7 +10778,7 @@
               </a:ln>
               <a:extLst>
                 <a:ext uri="{91240B29-F687-4f45-9708-019B960494DF}">
-                  <a14:hiddenLine xmlns="" xmlns:a14="http://schemas.microsoft.com/office/drawing/2010/main" w="9525">
+                  <a14:hiddenLine xmlns:a14="http://schemas.microsoft.com/office/drawing/2010/main" xmlns="" w="9525">
                     <a:solidFill>
                       <a:srgbClr val="000000"/>
                     </a:solidFill>
@@ -10843,7 +10843,7 @@
               </a:ln>
               <a:extLst>
                 <a:ext uri="{91240B29-F687-4f45-9708-019B960494DF}">
-                  <a14:hiddenLine xmlns="" xmlns:a14="http://schemas.microsoft.com/office/drawing/2010/main" w="9525">
+                  <a14:hiddenLine xmlns:a14="http://schemas.microsoft.com/office/drawing/2010/main" xmlns="" w="9525">
                     <a:solidFill>
                       <a:srgbClr val="000000"/>
                     </a:solidFill>
@@ -10933,7 +10933,7 @@
               </a:ln>
               <a:extLst>
                 <a:ext uri="{91240B29-F687-4f45-9708-019B960494DF}">
-                  <a14:hiddenLine xmlns="" xmlns:a14="http://schemas.microsoft.com/office/drawing/2010/main" w="9525">
+                  <a14:hiddenLine xmlns:a14="http://schemas.microsoft.com/office/drawing/2010/main" xmlns="" w="9525">
                     <a:solidFill>
                       <a:srgbClr val="000000"/>
                     </a:solidFill>
@@ -10995,7 +10995,7 @@
               </a:ln>
               <a:extLst>
                 <a:ext uri="{91240B29-F687-4f45-9708-019B960494DF}">
-                  <a14:hiddenLine xmlns="" xmlns:a14="http://schemas.microsoft.com/office/drawing/2010/main" w="9525">
+                  <a14:hiddenLine xmlns:a14="http://schemas.microsoft.com/office/drawing/2010/main" xmlns="" w="9525">
                     <a:solidFill>
                       <a:srgbClr val="000000"/>
                     </a:solidFill>
@@ -11085,7 +11085,7 @@
               </a:ln>
               <a:extLst>
                 <a:ext uri="{91240B29-F687-4f45-9708-019B960494DF}">
-                  <a14:hiddenLine xmlns="" xmlns:a14="http://schemas.microsoft.com/office/drawing/2010/main" w="9525">
+                  <a14:hiddenLine xmlns:a14="http://schemas.microsoft.com/office/drawing/2010/main" xmlns="" w="9525">
                     <a:solidFill>
                       <a:srgbClr val="000000"/>
                     </a:solidFill>
@@ -11150,7 +11150,7 @@
               </a:ln>
               <a:extLst>
                 <a:ext uri="{91240B29-F687-4f45-9708-019B960494DF}">
-                  <a14:hiddenLine xmlns="" xmlns:a14="http://schemas.microsoft.com/office/drawing/2010/main" w="9525">
+                  <a14:hiddenLine xmlns:a14="http://schemas.microsoft.com/office/drawing/2010/main" xmlns="" w="9525">
                     <a:solidFill>
                       <a:srgbClr val="000000"/>
                     </a:solidFill>
@@ -11212,7 +11212,7 @@
               </a:ln>
               <a:extLst>
                 <a:ext uri="{91240B29-F687-4f45-9708-019B960494DF}">
-                  <a14:hiddenLine xmlns="" xmlns:a14="http://schemas.microsoft.com/office/drawing/2010/main" w="9525">
+                  <a14:hiddenLine xmlns:a14="http://schemas.microsoft.com/office/drawing/2010/main" xmlns="" w="9525">
                     <a:solidFill>
                       <a:srgbClr val="000000"/>
                     </a:solidFill>
@@ -11302,7 +11302,7 @@
               </a:ln>
               <a:extLst>
                 <a:ext uri="{91240B29-F687-4f45-9708-019B960494DF}">
-                  <a14:hiddenLine xmlns="" xmlns:a14="http://schemas.microsoft.com/office/drawing/2010/main" w="9525">
+                  <a14:hiddenLine xmlns:a14="http://schemas.microsoft.com/office/drawing/2010/main" xmlns="" w="9525">
                     <a:solidFill>
                       <a:srgbClr val="000000"/>
                     </a:solidFill>
@@ -11392,7 +11392,7 @@
               </a:ln>
               <a:extLst>
                 <a:ext uri="{91240B29-F687-4f45-9708-019B960494DF}">
-                  <a14:hiddenLine xmlns="" xmlns:a14="http://schemas.microsoft.com/office/drawing/2010/main" w="9525">
+                  <a14:hiddenLine xmlns:a14="http://schemas.microsoft.com/office/drawing/2010/main" xmlns="" w="9525">
                     <a:solidFill>
                       <a:srgbClr val="000000"/>
                     </a:solidFill>
@@ -11457,7 +11457,7 @@
               </a:ln>
               <a:extLst>
                 <a:ext uri="{91240B29-F687-4f45-9708-019B960494DF}">
-                  <a14:hiddenLine xmlns="" xmlns:a14="http://schemas.microsoft.com/office/drawing/2010/main" w="9525">
+                  <a14:hiddenLine xmlns:a14="http://schemas.microsoft.com/office/drawing/2010/main" xmlns="" w="9525">
                     <a:solidFill>
                       <a:srgbClr val="000000"/>
                     </a:solidFill>
@@ -11577,7 +11577,7 @@
               </a:ln>
               <a:extLst>
                 <a:ext uri="{91240B29-F687-4f45-9708-019B960494DF}">
-                  <a14:hiddenLine xmlns="" xmlns:a14="http://schemas.microsoft.com/office/drawing/2010/main" w="9525">
+                  <a14:hiddenLine xmlns:a14="http://schemas.microsoft.com/office/drawing/2010/main" xmlns="" w="9525">
                     <a:solidFill>
                       <a:srgbClr val="000000"/>
                     </a:solidFill>
@@ -11675,7 +11675,7 @@
               </a:ln>
               <a:extLst>
                 <a:ext uri="{91240B29-F687-4f45-9708-019B960494DF}">
-                  <a14:hiddenLine xmlns="" xmlns:a14="http://schemas.microsoft.com/office/drawing/2010/main" w="9525">
+                  <a14:hiddenLine xmlns:a14="http://schemas.microsoft.com/office/drawing/2010/main" xmlns="" w="9525">
                     <a:solidFill>
                       <a:srgbClr val="000000"/>
                     </a:solidFill>
@@ -11790,7 +11790,7 @@
               </a:ln>
               <a:extLst>
                 <a:ext uri="{91240B29-F687-4f45-9708-019B960494DF}">
-                  <a14:hiddenLine xmlns="" xmlns:a14="http://schemas.microsoft.com/office/drawing/2010/main" w="9525">
+                  <a14:hiddenLine xmlns:a14="http://schemas.microsoft.com/office/drawing/2010/main" xmlns="" w="9525">
                     <a:solidFill>
                       <a:srgbClr val="000000"/>
                     </a:solidFill>
@@ -11880,7 +11880,7 @@
               </a:ln>
               <a:extLst>
                 <a:ext uri="{91240B29-F687-4f45-9708-019B960494DF}">
-                  <a14:hiddenLine xmlns="" xmlns:a14="http://schemas.microsoft.com/office/drawing/2010/main" w="9525">
+                  <a14:hiddenLine xmlns:a14="http://schemas.microsoft.com/office/drawing/2010/main" xmlns="" w="9525">
                     <a:solidFill>
                       <a:srgbClr val="000000"/>
                     </a:solidFill>
@@ -11945,7 +11945,7 @@
               </a:ln>
               <a:extLst>
                 <a:ext uri="{91240B29-F687-4f45-9708-019B960494DF}">
-                  <a14:hiddenLine xmlns="" xmlns:a14="http://schemas.microsoft.com/office/drawing/2010/main" w="9525">
+                  <a14:hiddenLine xmlns:a14="http://schemas.microsoft.com/office/drawing/2010/main" xmlns="" w="9525">
                     <a:solidFill>
                       <a:srgbClr val="000000"/>
                     </a:solidFill>
@@ -12035,7 +12035,7 @@
               </a:ln>
               <a:extLst>
                 <a:ext uri="{91240B29-F687-4f45-9708-019B960494DF}">
-                  <a14:hiddenLine xmlns="" xmlns:a14="http://schemas.microsoft.com/office/drawing/2010/main" w="9525">
+                  <a14:hiddenLine xmlns:a14="http://schemas.microsoft.com/office/drawing/2010/main" xmlns="" w="9525">
                     <a:solidFill>
                       <a:srgbClr val="000000"/>
                     </a:solidFill>
@@ -12103,7 +12103,7 @@
               </a:ln>
               <a:extLst>
                 <a:ext uri="{91240B29-F687-4f45-9708-019B960494DF}">
-                  <a14:hiddenLine xmlns="" xmlns:a14="http://schemas.microsoft.com/office/drawing/2010/main" w="9525">
+                  <a14:hiddenLine xmlns:a14="http://schemas.microsoft.com/office/drawing/2010/main" xmlns="" w="9525">
                     <a:solidFill>
                       <a:srgbClr val="000000"/>
                     </a:solidFill>
@@ -12193,7 +12193,7 @@
               </a:ln>
               <a:extLst>
                 <a:ext uri="{91240B29-F687-4f45-9708-019B960494DF}">
-                  <a14:hiddenLine xmlns="" xmlns:a14="http://schemas.microsoft.com/office/drawing/2010/main" w="9525">
+                  <a14:hiddenLine xmlns:a14="http://schemas.microsoft.com/office/drawing/2010/main" xmlns="" w="9525">
                     <a:solidFill>
                       <a:srgbClr val="000000"/>
                     </a:solidFill>
@@ -12261,7 +12261,7 @@
               </a:ln>
               <a:extLst>
                 <a:ext uri="{91240B29-F687-4f45-9708-019B960494DF}">
-                  <a14:hiddenLine xmlns="" xmlns:a14="http://schemas.microsoft.com/office/drawing/2010/main" w="9525">
+                  <a14:hiddenLine xmlns:a14="http://schemas.microsoft.com/office/drawing/2010/main" xmlns="" w="9525">
                     <a:solidFill>
                       <a:srgbClr val="000000"/>
                     </a:solidFill>
@@ -12351,7 +12351,7 @@
               </a:ln>
               <a:extLst>
                 <a:ext uri="{91240B29-F687-4f45-9708-019B960494DF}">
-                  <a14:hiddenLine xmlns="" xmlns:a14="http://schemas.microsoft.com/office/drawing/2010/main" w="9525">
+                  <a14:hiddenLine xmlns:a14="http://schemas.microsoft.com/office/drawing/2010/main" xmlns="" w="9525">
                     <a:solidFill>
                       <a:srgbClr val="000000"/>
                     </a:solidFill>
@@ -12385,7 +12385,7 @@
               </a:ln>
               <a:extLst>
                 <a:ext uri="{91240B29-F687-4f45-9708-019B960494DF}">
-                  <a14:hiddenLine xmlns="" xmlns:a14="http://schemas.microsoft.com/office/drawing/2010/main" w="9525">
+                  <a14:hiddenLine xmlns:a14="http://schemas.microsoft.com/office/drawing/2010/main" xmlns="" w="9525">
                     <a:solidFill>
                       <a:srgbClr val="000000"/>
                     </a:solidFill>
@@ -12526,7 +12526,7 @@
             <a:pPr rtl="0"/>
             <a:fld id="{6858E5E6-2136-44A9-BD21-5FB6661CE345}" type="datetime1">
               <a:rPr lang="pt-BR" noProof="1" dirty="0" smtClean="0"/>
-              <a:t>01/10/2020</a:t>
+              <a:t>02/10/2020</a:t>
             </a:fld>
             <a:endParaRPr lang="pt-BR" noProof="1"/>
           </a:p>
@@ -13862,7 +13862,6 @@
               <a:rPr lang="pt-BR" dirty="0" smtClean="0"/>
               <a:t>Considerações finais</a:t>
             </a:r>
-            <a:endParaRPr lang="pt-BR" dirty="0" smtClean="0"/>
           </a:p>
           <a:p>
             <a:pPr marL="342900" indent="-342900">
@@ -14061,13 +14060,8 @@
             </a:pPr>
             <a:r>
               <a:rPr lang="pt-BR" dirty="0" smtClean="0"/>
-              <a:t>Modelo de classificação de consumidores de um </a:t>
-            </a:r>
-            <a:r>
-              <a:rPr lang="pt-BR" dirty="0" smtClean="0"/>
-              <a:t>serviço</a:t>
-            </a:r>
-            <a:endParaRPr lang="pt-BR" dirty="0" smtClean="0"/>
+              <a:t>Modelo de classificação de consumidores de um serviço</a:t>
+            </a:r>
           </a:p>
           <a:p>
             <a:pPr marL="285750" indent="-285750">
@@ -14076,13 +14070,8 @@
             </a:pPr>
             <a:r>
               <a:rPr lang="pt-BR" dirty="0" smtClean="0"/>
-              <a:t>Variáveis </a:t>
-            </a:r>
-            <a:r>
-              <a:rPr lang="pt-BR" dirty="0" smtClean="0"/>
-              <a:t>consideradas</a:t>
-            </a:r>
-            <a:endParaRPr lang="pt-BR" dirty="0" smtClean="0"/>
+              <a:t>Variáveis consideradas</a:t>
+            </a:r>
           </a:p>
           <a:p>
             <a:pPr marL="800100" lvl="1" indent="-342900">
@@ -14107,7 +14096,6 @@
               <a:rPr lang="pt-BR" dirty="0" smtClean="0"/>
               <a:t>Frequência: número de compras realizadas </a:t>
             </a:r>
-            <a:endParaRPr lang="pt-BR" dirty="0" smtClean="0"/>
           </a:p>
           <a:p>
             <a:pPr marL="800100" lvl="1" indent="-342900">
@@ -14116,17 +14104,12 @@
             </a:pPr>
             <a:r>
               <a:rPr lang="pt-BR" dirty="0" err="1" smtClean="0"/>
-              <a:t>Mo</a:t>
-            </a:r>
-            <a:r>
-              <a:rPr lang="pt-BR" dirty="0" err="1" smtClean="0"/>
-              <a:t>netaridade</a:t>
+              <a:t>Monetaridade</a:t>
             </a:r>
             <a:r>
               <a:rPr lang="pt-BR" dirty="0" smtClean="0"/>
               <a:t>: quanto de dinheiro gasto</a:t>
             </a:r>
-            <a:endParaRPr lang="pt-BR" dirty="0" smtClean="0"/>
           </a:p>
           <a:p>
             <a:pPr marL="285750" indent="-285750">
@@ -14135,11 +14118,7 @@
             </a:pPr>
             <a:r>
               <a:rPr lang="pt-BR" dirty="0" smtClean="0"/>
-              <a:t>Entender </a:t>
-            </a:r>
-            <a:r>
-              <a:rPr lang="pt-BR" dirty="0" smtClean="0"/>
-              <a:t>o comportamento dos clientes</a:t>
+              <a:t>Entender o comportamento dos clientes</a:t>
             </a:r>
           </a:p>
           <a:p>
@@ -14229,7 +14208,7 @@
         <p:spPr>
           <a:xfrm>
             <a:off x="1141411" y="1946366"/>
-            <a:ext cx="9906000" cy="3852771"/>
+            <a:ext cx="9906000" cy="4140925"/>
           </a:xfrm>
         </p:spPr>
         <p:txBody>
@@ -14297,75 +14276,46 @@
               <a:buChar char="•"/>
             </a:pPr>
             <a:r>
-              <a:rPr lang="pt-BR" dirty="0" smtClean="0"/>
-              <a:t>Tratamento de </a:t>
-            </a:r>
-            <a:r>
               <a:rPr lang="pt-BR" dirty="0" err="1" smtClean="0"/>
-              <a:t>outliers</a:t>
-            </a:r>
-            <a:endParaRPr lang="pt-BR" dirty="0"/>
-          </a:p>
-          <a:p>
-            <a:pPr marL="285750" indent="-285750">
-              <a:buFont typeface="Arial" panose="020B0604020202020204" pitchFamily="34" charset="0"/>
-              <a:buChar char="•"/>
-            </a:pPr>
-            <a:r>
-              <a:rPr lang="pt-BR" dirty="0"/>
-              <a:t>Utilização </a:t>
-            </a:r>
-            <a:r>
-              <a:rPr lang="pt-BR" dirty="0" smtClean="0"/>
-              <a:t>k-</a:t>
-            </a:r>
-            <a:r>
-              <a:rPr lang="pt-BR" dirty="0" err="1" smtClean="0"/>
-              <a:t>means</a:t>
+              <a:t>Dataframe</a:t>
             </a:r>
             <a:endParaRPr lang="pt-BR" dirty="0" smtClean="0"/>
-          </a:p>
-          <a:p>
-            <a:pPr marL="285750" indent="-285750">
-              <a:buFont typeface="Arial" panose="020B0604020202020204" pitchFamily="34" charset="0"/>
-              <a:buChar char="•"/>
-            </a:pPr>
-            <a:r>
-              <a:rPr lang="pt-BR" dirty="0" smtClean="0"/>
-              <a:t>Pontuação dos clientes</a:t>
-            </a:r>
-          </a:p>
-          <a:p>
-            <a:pPr marL="285750" indent="-285750">
-              <a:buFont typeface="Arial" panose="020B0604020202020204" pitchFamily="34" charset="0"/>
-              <a:buChar char="•"/>
-            </a:pPr>
-            <a:r>
-              <a:rPr lang="pt-BR" dirty="0" err="1" smtClean="0"/>
-              <a:t>Scatter</a:t>
-            </a:r>
-            <a:r>
-              <a:rPr lang="pt-BR" dirty="0" smtClean="0"/>
-              <a:t> </a:t>
-            </a:r>
-            <a:r>
-              <a:rPr lang="pt-BR" dirty="0" err="1" smtClean="0"/>
-              <a:t>plot</a:t>
-            </a:r>
-            <a:r>
-              <a:rPr lang="pt-BR" dirty="0" smtClean="0"/>
-              <a:t> </a:t>
-            </a:r>
-            <a:r>
-              <a:rPr lang="pt-BR" dirty="0"/>
-              <a:t>das variáveis duas a duas</a:t>
-            </a:r>
           </a:p>
           <a:p>
             <a:endParaRPr lang="pt-BR" dirty="0" smtClean="0"/>
           </a:p>
         </p:txBody>
       </p:sp>
+      <p:pic>
+        <p:nvPicPr>
+          <p:cNvPr id="4" name="Imagem 3"/>
+          <p:cNvPicPr>
+            <a:picLocks noChangeAspect="1"/>
+          </p:cNvPicPr>
+          <p:nvPr/>
+        </p:nvPicPr>
+        <p:blipFill>
+          <a:blip r:embed="rId2">
+            <a:extLst>
+              <a:ext uri="{28A0092B-C50C-407E-A947-70E740481C1C}">
+                <a14:useLocalDpi xmlns:a14="http://schemas.microsoft.com/office/drawing/2010/main" val="0"/>
+              </a:ext>
+            </a:extLst>
+          </a:blip>
+          <a:stretch>
+            <a:fillRect/>
+          </a:stretch>
+        </p:blipFill>
+        <p:spPr>
+          <a:xfrm>
+            <a:off x="3282333" y="3957981"/>
+            <a:ext cx="5624155" cy="2129310"/>
+          </a:xfrm>
+          <a:prstGeom prst="rect">
+            <a:avLst/>
+          </a:prstGeom>
+        </p:spPr>
+      </p:pic>
     </p:spTree>
     <p:extLst>
       <p:ext uri="{BB962C8B-B14F-4D97-AF65-F5344CB8AC3E}">
@@ -15732,6 +15682,14 @@
 </file>
 
 <file path=customXml/item2.xml><?xml version="1.0" encoding="utf-8"?>
+<p:properties xmlns:p="http://schemas.microsoft.com/office/2006/metadata/properties" xmlns:xsi="http://www.w3.org/2001/XMLSchema-instance" xmlns:pc="http://schemas.microsoft.com/office/infopath/2007/PartnerControls">
+  <documentManagement>
+    <MediaServiceKeyPoints xmlns="71af3243-3dd4-4a8d-8c0d-dd76da1f02a5" xsi:nil="true"/>
+  </documentManagement>
+</p:properties>
+</file>
+
+<file path=customXml/item3.xml><?xml version="1.0" encoding="utf-8"?>
 <ct:contentTypeSchema xmlns:ct="http://schemas.microsoft.com/office/2006/metadata/contentType" xmlns:ma="http://schemas.microsoft.com/office/2006/metadata/properties/metaAttributes" ct:_="" ma:_="" ma:contentTypeName="Document" ma:contentTypeID="0x01010079F111ED35F8CC479449609E8A0923A6" ma:contentTypeVersion="11" ma:contentTypeDescription="Create a new document." ma:contentTypeScope="" ma:versionID="9677210f24a1be23c92c90fd886aa0aa">
   <xsd:schema xmlns:xsd="http://www.w3.org/2001/XMLSchema" xmlns:xs="http://www.w3.org/2001/XMLSchema" xmlns:p="http://schemas.microsoft.com/office/2006/metadata/properties" xmlns:ns2="71af3243-3dd4-4a8d-8c0d-dd76da1f02a5" xmlns:ns3="16c05727-aa75-4e4a-9b5f-8a80a1165891" targetNamespace="http://schemas.microsoft.com/office/2006/metadata/properties" ma:root="true" ma:fieldsID="60e05723c5c1908df1a1a4ebf11d344e" ns2:_="" ns3:_="">
     <xsd:import namespace="71af3243-3dd4-4a8d-8c0d-dd76da1f02a5"/>
@@ -15942,14 +15900,6 @@
 </ct:contentTypeSchema>
 </file>
 
-<file path=customXml/item3.xml><?xml version="1.0" encoding="utf-8"?>
-<p:properties xmlns:p="http://schemas.microsoft.com/office/2006/metadata/properties" xmlns:xsi="http://www.w3.org/2001/XMLSchema-instance" xmlns:pc="http://schemas.microsoft.com/office/infopath/2007/PartnerControls">
-  <documentManagement>
-    <MediaServiceKeyPoints xmlns="71af3243-3dd4-4a8d-8c0d-dd76da1f02a5" xsi:nil="true"/>
-  </documentManagement>
-</p:properties>
-</file>
-
 <file path=customXml/itemProps1.xml><?xml version="1.0" encoding="utf-8"?>
 <ds:datastoreItem xmlns:ds="http://schemas.openxmlformats.org/officeDocument/2006/customXml" ds:itemID="{E096F0E7-E7B5-406E-8E94-F0043B2AC7F6}">
   <ds:schemaRefs>
@@ -15959,6 +15909,23 @@
 </file>
 
 <file path=customXml/itemProps2.xml><?xml version="1.0" encoding="utf-8"?>
+<ds:datastoreItem xmlns:ds="http://schemas.openxmlformats.org/officeDocument/2006/customXml" ds:itemID="{AC41CBB0-BAA0-4983-8F2B-E10AF3358DA8}">
+  <ds:schemaRefs>
+    <ds:schemaRef ds:uri="http://schemas.microsoft.com/office/2006/documentManagement/types"/>
+    <ds:schemaRef ds:uri="http://schemas.openxmlformats.org/package/2006/metadata/core-properties"/>
+    <ds:schemaRef ds:uri="16c05727-aa75-4e4a-9b5f-8a80a1165891"/>
+    <ds:schemaRef ds:uri="http://purl.org/dc/elements/1.1/"/>
+    <ds:schemaRef ds:uri="http://schemas.microsoft.com/office/2006/metadata/properties"/>
+    <ds:schemaRef ds:uri="http://purl.org/dc/terms/"/>
+    <ds:schemaRef ds:uri="http://schemas.microsoft.com/office/infopath/2007/PartnerControls"/>
+    <ds:schemaRef ds:uri="71af3243-3dd4-4a8d-8c0d-dd76da1f02a5"/>
+    <ds:schemaRef ds:uri="http://www.w3.org/XML/1998/namespace"/>
+    <ds:schemaRef ds:uri="http://purl.org/dc/dcmitype/"/>
+  </ds:schemaRefs>
+</ds:datastoreItem>
+</file>
+
+<file path=customXml/itemProps3.xml><?xml version="1.0" encoding="utf-8"?>
 <ds:datastoreItem xmlns:ds="http://schemas.openxmlformats.org/officeDocument/2006/customXml" ds:itemID="{104C6BCC-A38B-4625-90E6-7D3BBA3909AE}">
   <ds:schemaRefs>
     <ds:schemaRef ds:uri="http://schemas.microsoft.com/office/2006/metadata/contentType"/>
@@ -15975,21 +15942,4 @@
     <ds:schemaRef ds:uri="http://schemas.microsoft.com/internal/obd"/>
   </ds:schemaRefs>
 </ds:datastoreItem>
-</file>
-
-<file path=customXml/itemProps3.xml><?xml version="1.0" encoding="utf-8"?>
-<ds:datastoreItem xmlns:ds="http://schemas.openxmlformats.org/officeDocument/2006/customXml" ds:itemID="{AC41CBB0-BAA0-4983-8F2B-E10AF3358DA8}">
-  <ds:schemaRefs>
-    <ds:schemaRef ds:uri="http://schemas.microsoft.com/office/2006/documentManagement/types"/>
-    <ds:schemaRef ds:uri="http://schemas.openxmlformats.org/package/2006/metadata/core-properties"/>
-    <ds:schemaRef ds:uri="16c05727-aa75-4e4a-9b5f-8a80a1165891"/>
-    <ds:schemaRef ds:uri="http://purl.org/dc/elements/1.1/"/>
-    <ds:schemaRef ds:uri="http://schemas.microsoft.com/office/2006/metadata/properties"/>
-    <ds:schemaRef ds:uri="http://purl.org/dc/terms/"/>
-    <ds:schemaRef ds:uri="http://schemas.microsoft.com/office/infopath/2007/PartnerControls"/>
-    <ds:schemaRef ds:uri="71af3243-3dd4-4a8d-8c0d-dd76da1f02a5"/>
-    <ds:schemaRef ds:uri="http://www.w3.org/XML/1998/namespace"/>
-    <ds:schemaRef ds:uri="http://purl.org/dc/dcmitype/"/>
-  </ds:schemaRefs>
-</ds:datastoreItem>
 </file>
</xml_diff>

<commit_message>
Create another slide for section 3 with final dataframe image
</commit_message>
<xml_diff>
--- a/apresentacao/Apresentacao.pptx
+++ b/apresentacao/Apresentacao.pptx
@@ -5,10 +5,10 @@
     <p:sldMasterId id="2147483648" r:id="rId4"/>
   </p:sldMasterIdLst>
   <p:notesMasterIdLst>
-    <p:notesMasterId r:id="rId18"/>
+    <p:notesMasterId r:id="rId19"/>
   </p:notesMasterIdLst>
   <p:handoutMasterIdLst>
-    <p:handoutMasterId r:id="rId19"/>
+    <p:handoutMasterId r:id="rId20"/>
   </p:handoutMasterIdLst>
   <p:sldIdLst>
     <p:sldId id="263" r:id="rId5"/>
@@ -16,14 +16,15 @@
     <p:sldId id="265" r:id="rId7"/>
     <p:sldId id="266" r:id="rId8"/>
     <p:sldId id="268" r:id="rId9"/>
-    <p:sldId id="272" r:id="rId10"/>
-    <p:sldId id="273" r:id="rId11"/>
-    <p:sldId id="270" r:id="rId12"/>
-    <p:sldId id="274" r:id="rId13"/>
-    <p:sldId id="275" r:id="rId14"/>
-    <p:sldId id="276" r:id="rId15"/>
-    <p:sldId id="271" r:id="rId16"/>
-    <p:sldId id="277" r:id="rId17"/>
+    <p:sldId id="278" r:id="rId10"/>
+    <p:sldId id="272" r:id="rId11"/>
+    <p:sldId id="273" r:id="rId12"/>
+    <p:sldId id="270" r:id="rId13"/>
+    <p:sldId id="274" r:id="rId14"/>
+    <p:sldId id="275" r:id="rId15"/>
+    <p:sldId id="276" r:id="rId16"/>
+    <p:sldId id="271" r:id="rId17"/>
+    <p:sldId id="277" r:id="rId18"/>
   </p:sldIdLst>
   <p:sldSz cx="12192000" cy="6858000"/>
   <p:notesSz cx="6858000" cy="9144000"/>
@@ -13190,6 +13191,186 @@
               <a:buFont typeface="Arial" panose="020B0604020202020204" pitchFamily="34" charset="0"/>
               <a:buChar char="•"/>
             </a:pPr>
+            <a:r>
+              <a:rPr lang="pt-BR" dirty="0" smtClean="0"/>
+              <a:t>Utilização DA COLUNA DE DATA DA COMPRA</a:t>
+            </a:r>
+          </a:p>
+          <a:p>
+            <a:pPr marL="285750" indent="-285750">
+              <a:buFont typeface="Arial" panose="020B0604020202020204" pitchFamily="34" charset="0"/>
+              <a:buChar char="•"/>
+            </a:pPr>
+            <a:r>
+              <a:rPr lang="pt-BR" dirty="0" smtClean="0"/>
+              <a:t>Número de compras e valor em dinheiro</a:t>
+            </a:r>
+          </a:p>
+          <a:p>
+            <a:pPr marL="285750" indent="-285750">
+              <a:buFont typeface="Arial" panose="020B0604020202020204" pitchFamily="34" charset="0"/>
+              <a:buChar char="•"/>
+            </a:pPr>
+            <a:r>
+              <a:rPr lang="pt-BR" dirty="0" smtClean="0"/>
+              <a:t>Dados diários</a:t>
+            </a:r>
+          </a:p>
+          <a:p>
+            <a:pPr marL="285750" indent="-285750">
+              <a:buFont typeface="Arial" panose="020B0604020202020204" pitchFamily="34" charset="0"/>
+              <a:buChar char="•"/>
+            </a:pPr>
+            <a:r>
+              <a:rPr lang="pt-BR" dirty="0" smtClean="0"/>
+              <a:t>dados entre janeiro de 2017 a outubro de 2018 (20 meses)</a:t>
+            </a:r>
+          </a:p>
+          <a:p>
+            <a:pPr marL="285750" indent="-285750">
+              <a:buFont typeface="Arial" panose="020B0604020202020204" pitchFamily="34" charset="0"/>
+              <a:buChar char="•"/>
+            </a:pPr>
+            <a:r>
+              <a:rPr lang="pt-BR" dirty="0" smtClean="0"/>
+              <a:t>Remoção dos </a:t>
+            </a:r>
+            <a:r>
+              <a:rPr lang="pt-BR" dirty="0" err="1" smtClean="0"/>
+              <a:t>outliers</a:t>
+            </a:r>
+            <a:endParaRPr lang="pt-BR" dirty="0" smtClean="0"/>
+          </a:p>
+          <a:p>
+            <a:pPr marL="285750" indent="-285750">
+              <a:buFont typeface="Arial" panose="020B0604020202020204" pitchFamily="34" charset="0"/>
+              <a:buChar char="•"/>
+            </a:pPr>
+            <a:r>
+              <a:rPr lang="pt-BR" dirty="0" smtClean="0"/>
+              <a:t>Gráficos de tendência</a:t>
+            </a:r>
+          </a:p>
+          <a:p>
+            <a:pPr marL="285750" indent="-285750">
+              <a:buFont typeface="Arial" panose="020B0604020202020204" pitchFamily="34" charset="0"/>
+              <a:buChar char="•"/>
+            </a:pPr>
+            <a:r>
+              <a:rPr lang="pt-BR" dirty="0" err="1" smtClean="0"/>
+              <a:t>Forecasting</a:t>
+            </a:r>
+            <a:endParaRPr lang="pt-BR" dirty="0" smtClean="0"/>
+          </a:p>
+          <a:p>
+            <a:pPr marL="285750" indent="-285750">
+              <a:buFont typeface="Arial" panose="020B0604020202020204" pitchFamily="34" charset="0"/>
+              <a:buChar char="•"/>
+            </a:pPr>
+            <a:endParaRPr lang="pt-BR" dirty="0" smtClean="0"/>
+          </a:p>
+          <a:p>
+            <a:pPr marL="285750" indent="-285750">
+              <a:buFont typeface="Arial" panose="020B0604020202020204" pitchFamily="34" charset="0"/>
+              <a:buChar char="•"/>
+            </a:pPr>
+            <a:endParaRPr lang="pt-BR" dirty="0" smtClean="0"/>
+          </a:p>
+        </p:txBody>
+      </p:sp>
+    </p:spTree>
+    <p:extLst>
+      <p:ext uri="{BB962C8B-B14F-4D97-AF65-F5344CB8AC3E}">
+        <p14:creationId xmlns:p14="http://schemas.microsoft.com/office/powerpoint/2010/main" val="1932947923"/>
+      </p:ext>
+    </p:extLst>
+  </p:cSld>
+  <p:clrMapOvr>
+    <a:masterClrMapping/>
+  </p:clrMapOvr>
+  <p:timing>
+    <p:tnLst>
+      <p:par>
+        <p:cTn id="1" dur="indefinite" restart="never" nodeType="tmRoot"/>
+      </p:par>
+    </p:tnLst>
+  </p:timing>
+</p:sld>
+</file>
+
+<file path=ppt/slides/slide11.xml><?xml version="1.0" encoding="utf-8"?>
+<p:sld xmlns:a="http://schemas.openxmlformats.org/drawingml/2006/main" xmlns:r="http://schemas.openxmlformats.org/officeDocument/2006/relationships" xmlns:p="http://schemas.openxmlformats.org/presentationml/2006/main">
+  <p:cSld>
+    <p:spTree>
+      <p:nvGrpSpPr>
+        <p:cNvPr id="1" name=""/>
+        <p:cNvGrpSpPr/>
+        <p:nvPr/>
+      </p:nvGrpSpPr>
+      <p:grpSpPr>
+        <a:xfrm>
+          <a:off x="0" y="0"/>
+          <a:ext cx="0" cy="0"/>
+          <a:chOff x="0" y="0"/>
+          <a:chExt cx="0" cy="0"/>
+        </a:xfrm>
+      </p:grpSpPr>
+      <p:sp>
+        <p:nvSpPr>
+          <p:cNvPr id="2" name="Título 1"/>
+          <p:cNvSpPr>
+            <a:spLocks noGrp="1"/>
+          </p:cNvSpPr>
+          <p:nvPr>
+            <p:ph type="title"/>
+          </p:nvPr>
+        </p:nvSpPr>
+        <p:spPr>
+          <a:xfrm>
+            <a:off x="1141411" y="413386"/>
+            <a:ext cx="9906000" cy="997403"/>
+          </a:xfrm>
+        </p:spPr>
+        <p:txBody>
+          <a:bodyPr/>
+          <a:lstStyle/>
+          <a:p>
+            <a:r>
+              <a:rPr lang="pt-BR" dirty="0"/>
+              <a:t>5</a:t>
+            </a:r>
+            <a:r>
+              <a:rPr lang="pt-BR" dirty="0" smtClean="0"/>
+              <a:t>. Previsão de futuras vendas</a:t>
+            </a:r>
+            <a:endParaRPr lang="pt-BR" dirty="0"/>
+          </a:p>
+        </p:txBody>
+      </p:sp>
+      <p:sp>
+        <p:nvSpPr>
+          <p:cNvPr id="3" name="Espaço Reservado para Texto 2"/>
+          <p:cNvSpPr>
+            <a:spLocks noGrp="1"/>
+          </p:cNvSpPr>
+          <p:nvPr>
+            <p:ph type="body" idx="1"/>
+          </p:nvPr>
+        </p:nvSpPr>
+        <p:spPr>
+          <a:xfrm>
+            <a:off x="1141411" y="1946366"/>
+            <a:ext cx="9906000" cy="3852771"/>
+          </a:xfrm>
+        </p:spPr>
+        <p:txBody>
+          <a:bodyPr/>
+          <a:lstStyle/>
+          <a:p>
+            <a:pPr marL="285750" indent="-285750">
+              <a:buFont typeface="Arial" panose="020B0604020202020204" pitchFamily="34" charset="0"/>
+              <a:buChar char="•"/>
+            </a:pPr>
             <a:endParaRPr lang="pt-BR" dirty="0" smtClean="0"/>
           </a:p>
           <a:p>
@@ -13341,7 +13522,7 @@
 </p:sld>
 </file>
 
-<file path=ppt/slides/slide11.xml><?xml version="1.0" encoding="utf-8"?>
+<file path=ppt/slides/slide12.xml><?xml version="1.0" encoding="utf-8"?>
 <p:sld xmlns:a="http://schemas.openxmlformats.org/drawingml/2006/main" xmlns:r="http://schemas.openxmlformats.org/officeDocument/2006/relationships" xmlns:p="http://schemas.openxmlformats.org/presentationml/2006/main">
   <p:cSld>
     <p:spTree>
@@ -13475,7 +13656,7 @@
 </p:sld>
 </file>
 
-<file path=ppt/slides/slide12.xml><?xml version="1.0" encoding="utf-8"?>
+<file path=ppt/slides/slide13.xml><?xml version="1.0" encoding="utf-8"?>
 <p:sld xmlns:a="http://schemas.openxmlformats.org/drawingml/2006/main" xmlns:r="http://schemas.openxmlformats.org/officeDocument/2006/relationships" xmlns:p="http://schemas.openxmlformats.org/presentationml/2006/main">
   <p:cSld>
     <p:spTree>
@@ -13572,7 +13753,7 @@
 </p:sld>
 </file>
 
-<file path=ppt/slides/slide13.xml><?xml version="1.0" encoding="utf-8"?>
+<file path=ppt/slides/slide14.xml><?xml version="1.0" encoding="utf-8"?>
 <p:sld xmlns:a="http://schemas.openxmlformats.org/drawingml/2006/main" xmlns:r="http://schemas.openxmlformats.org/officeDocument/2006/relationships" xmlns:p="http://schemas.openxmlformats.org/presentationml/2006/main">
   <p:cSld>
     <p:spTree>
@@ -14381,9 +14562,95 @@
           </a:p>
         </p:txBody>
       </p:sp>
+      <p:sp>
+        <p:nvSpPr>
+          <p:cNvPr id="3" name="Espaço Reservado para Texto 2"/>
+          <p:cNvSpPr>
+            <a:spLocks noGrp="1"/>
+          </p:cNvSpPr>
+          <p:nvPr>
+            <p:ph type="body" idx="1"/>
+          </p:nvPr>
+        </p:nvSpPr>
+        <p:spPr>
+          <a:xfrm>
+            <a:off x="1141411" y="1946366"/>
+            <a:ext cx="9906000" cy="4323805"/>
+          </a:xfrm>
+        </p:spPr>
+        <p:txBody>
+          <a:bodyPr/>
+          <a:lstStyle/>
+          <a:p>
+            <a:pPr marL="285750" indent="-285750">
+              <a:buFont typeface="Arial" panose="020B0604020202020204" pitchFamily="34" charset="0"/>
+              <a:buChar char="•"/>
+            </a:pPr>
+            <a:r>
+              <a:rPr lang="pt-BR" dirty="0"/>
+              <a:t>Tratamento de </a:t>
+            </a:r>
+            <a:r>
+              <a:rPr lang="pt-BR" dirty="0" err="1"/>
+              <a:t>outliers</a:t>
+            </a:r>
+            <a:endParaRPr lang="pt-BR" dirty="0"/>
+          </a:p>
+          <a:p>
+            <a:pPr marL="285750" indent="-285750">
+              <a:buFont typeface="Arial" panose="020B0604020202020204" pitchFamily="34" charset="0"/>
+              <a:buChar char="•"/>
+            </a:pPr>
+            <a:r>
+              <a:rPr lang="pt-BR" dirty="0"/>
+              <a:t>Utilização k-</a:t>
+            </a:r>
+            <a:r>
+              <a:rPr lang="pt-BR" dirty="0" err="1"/>
+              <a:t>means</a:t>
+            </a:r>
+            <a:endParaRPr lang="pt-BR" dirty="0"/>
+          </a:p>
+          <a:p>
+            <a:pPr marL="285750" indent="-285750">
+              <a:buFont typeface="Arial" panose="020B0604020202020204" pitchFamily="34" charset="0"/>
+              <a:buChar char="•"/>
+            </a:pPr>
+            <a:r>
+              <a:rPr lang="pt-BR" dirty="0"/>
+              <a:t>Pontuação dos clientes</a:t>
+            </a:r>
+          </a:p>
+          <a:p>
+            <a:pPr marL="285750" indent="-285750">
+              <a:buFont typeface="Arial" panose="020B0604020202020204" pitchFamily="34" charset="0"/>
+              <a:buChar char="•"/>
+            </a:pPr>
+            <a:r>
+              <a:rPr lang="pt-BR" dirty="0" err="1"/>
+              <a:t>Scatter</a:t>
+            </a:r>
+            <a:r>
+              <a:rPr lang="pt-BR" dirty="0"/>
+              <a:t> </a:t>
+            </a:r>
+            <a:r>
+              <a:rPr lang="pt-BR" dirty="0" err="1"/>
+              <a:t>plot</a:t>
+            </a:r>
+            <a:r>
+              <a:rPr lang="pt-BR" dirty="0"/>
+              <a:t> das variáveis duas a duas</a:t>
+            </a:r>
+          </a:p>
+          <a:p>
+            <a:endParaRPr lang="pt-BR" dirty="0" smtClean="0"/>
+          </a:p>
+        </p:txBody>
+      </p:sp>
       <p:pic>
         <p:nvPicPr>
-          <p:cNvPr id="4" name="Imagem 3"/>
+          <p:cNvPr id="5" name="Imagem 4"/>
           <p:cNvPicPr>
             <a:picLocks noChangeAspect="1"/>
           </p:cNvPicPr>
@@ -14403,8 +14670,8 @@
         </p:blipFill>
         <p:spPr>
           <a:xfrm>
-            <a:off x="235132" y="1968304"/>
-            <a:ext cx="11488846" cy="3269902"/>
+            <a:off x="2175076" y="4016828"/>
+            <a:ext cx="7838669" cy="2129310"/>
           </a:xfrm>
           <a:prstGeom prst="rect">
             <a:avLst/>
@@ -14414,7 +14681,7 @@
     </p:spTree>
     <p:extLst>
       <p:ext uri="{BB962C8B-B14F-4D97-AF65-F5344CB8AC3E}">
-        <p14:creationId xmlns:p14="http://schemas.microsoft.com/office/powerpoint/2010/main" val="2780628470"/>
+        <p14:creationId xmlns:p14="http://schemas.microsoft.com/office/powerpoint/2010/main" val="2228385716"/>
       </p:ext>
     </p:extLst>
   </p:cSld>
@@ -14478,7 +14745,7 @@
       </p:sp>
       <p:pic>
         <p:nvPicPr>
-          <p:cNvPr id="3" name="Imagem 2"/>
+          <p:cNvPr id="4" name="Imagem 3"/>
           <p:cNvPicPr>
             <a:picLocks noChangeAspect="1"/>
           </p:cNvPicPr>
@@ -14498,8 +14765,8 @@
         </p:blipFill>
         <p:spPr>
           <a:xfrm>
-            <a:off x="1381637" y="1567543"/>
-            <a:ext cx="9425547" cy="4573042"/>
+            <a:off x="235132" y="1968304"/>
+            <a:ext cx="11488846" cy="3269902"/>
           </a:xfrm>
           <a:prstGeom prst="rect">
             <a:avLst/>
@@ -14509,7 +14776,7 @@
     </p:spTree>
     <p:extLst>
       <p:ext uri="{BB962C8B-B14F-4D97-AF65-F5344CB8AC3E}">
-        <p14:creationId xmlns:p14="http://schemas.microsoft.com/office/powerpoint/2010/main" val="1808584198"/>
+        <p14:creationId xmlns:p14="http://schemas.microsoft.com/office/powerpoint/2010/main" val="2780628470"/>
       </p:ext>
     </p:extLst>
   </p:cSld>
@@ -14564,124 +14831,60 @@
           <a:lstStyle/>
           <a:p>
             <a:r>
-              <a:rPr lang="pt-BR" dirty="0"/>
-              <a:t>4</a:t>
-            </a:r>
-            <a:r>
               <a:rPr lang="pt-BR" dirty="0" smtClean="0"/>
-              <a:t>. Análise das categorias dos produtos</a:t>
+              <a:t>3. Segmentação de clientes</a:t>
             </a:r>
             <a:endParaRPr lang="pt-BR" dirty="0"/>
           </a:p>
         </p:txBody>
       </p:sp>
-      <p:sp>
-        <p:nvSpPr>
-          <p:cNvPr id="3" name="Espaço Reservado para Texto 2"/>
-          <p:cNvSpPr>
-            <a:spLocks noGrp="1"/>
-          </p:cNvSpPr>
-          <p:nvPr>
-            <p:ph type="body" idx="1"/>
-          </p:nvPr>
-        </p:nvSpPr>
+      <p:pic>
+        <p:nvPicPr>
+          <p:cNvPr id="3" name="Imagem 2"/>
+          <p:cNvPicPr>
+            <a:picLocks noChangeAspect="1"/>
+          </p:cNvPicPr>
+          <p:nvPr/>
+        </p:nvPicPr>
+        <p:blipFill>
+          <a:blip r:embed="rId2">
+            <a:extLst>
+              <a:ext uri="{28A0092B-C50C-407E-A947-70E740481C1C}">
+                <a14:useLocalDpi xmlns:a14="http://schemas.microsoft.com/office/drawing/2010/main" val="0"/>
+              </a:ext>
+            </a:extLst>
+          </a:blip>
+          <a:stretch>
+            <a:fillRect/>
+          </a:stretch>
+        </p:blipFill>
         <p:spPr>
           <a:xfrm>
-            <a:off x="1141411" y="1946366"/>
-            <a:ext cx="9906000" cy="3852771"/>
+            <a:off x="1381637" y="1567543"/>
+            <a:ext cx="9425547" cy="4573042"/>
           </a:xfrm>
+          <a:prstGeom prst="rect">
+            <a:avLst/>
+          </a:prstGeom>
         </p:spPr>
-        <p:txBody>
-          <a:bodyPr/>
-          <a:lstStyle/>
-          <a:p>
-            <a:pPr marL="285750" indent="-285750">
-              <a:buFont typeface="Arial" panose="020B0604020202020204" pitchFamily="34" charset="0"/>
-              <a:buChar char="•"/>
-            </a:pPr>
-            <a:r>
-              <a:rPr lang="pt-BR" dirty="0" smtClean="0"/>
-              <a:t>Preparação dos dados</a:t>
-            </a:r>
-          </a:p>
-          <a:p>
-            <a:pPr marL="285750" indent="-285750">
-              <a:buFont typeface="Arial" panose="020B0604020202020204" pitchFamily="34" charset="0"/>
-              <a:buChar char="•"/>
-            </a:pPr>
-            <a:r>
-              <a:rPr lang="pt-BR" dirty="0" smtClean="0"/>
-              <a:t>Definição das categorias</a:t>
-            </a:r>
-          </a:p>
-          <a:p>
-            <a:pPr marL="285750" indent="-285750">
-              <a:buFont typeface="Arial" panose="020B0604020202020204" pitchFamily="34" charset="0"/>
-              <a:buChar char="•"/>
-            </a:pPr>
-            <a:r>
-              <a:rPr lang="pt-BR" dirty="0" smtClean="0"/>
-              <a:t>Criação/manipulação do </a:t>
-            </a:r>
-            <a:r>
-              <a:rPr lang="pt-BR" dirty="0" err="1" smtClean="0"/>
-              <a:t>dataframe</a:t>
-            </a:r>
-            <a:endParaRPr lang="pt-BR" dirty="0" smtClean="0"/>
-          </a:p>
-          <a:p>
-            <a:pPr marL="285750" indent="-285750">
-              <a:buFont typeface="Arial" panose="020B0604020202020204" pitchFamily="34" charset="0"/>
-              <a:buChar char="•"/>
-            </a:pPr>
-            <a:r>
-              <a:rPr lang="pt-BR" dirty="0" smtClean="0"/>
-              <a:t>Aplicação do </a:t>
-            </a:r>
-            <a:r>
-              <a:rPr lang="pt-BR" dirty="0" err="1" smtClean="0"/>
-              <a:t>pca</a:t>
-            </a:r>
-            <a:r>
-              <a:rPr lang="pt-BR" dirty="0" smtClean="0"/>
-              <a:t> (principal </a:t>
-            </a:r>
-            <a:r>
-              <a:rPr lang="pt-BR" dirty="0" err="1" smtClean="0"/>
-              <a:t>components</a:t>
-            </a:r>
-            <a:r>
-              <a:rPr lang="pt-BR" dirty="0" smtClean="0"/>
-              <a:t> </a:t>
-            </a:r>
-            <a:r>
-              <a:rPr lang="pt-BR" dirty="0" err="1" smtClean="0"/>
-              <a:t>analysis</a:t>
-            </a:r>
-            <a:r>
-              <a:rPr lang="pt-BR" dirty="0" smtClean="0"/>
-              <a:t>)</a:t>
-            </a:r>
-          </a:p>
-          <a:p>
-            <a:pPr marL="285750" indent="-285750">
-              <a:buFont typeface="Arial" panose="020B0604020202020204" pitchFamily="34" charset="0"/>
-              <a:buChar char="•"/>
-            </a:pPr>
-            <a:endParaRPr lang="pt-BR" dirty="0" smtClean="0"/>
-          </a:p>
-        </p:txBody>
-      </p:sp>
+      </p:pic>
     </p:spTree>
     <p:extLst>
       <p:ext uri="{BB962C8B-B14F-4D97-AF65-F5344CB8AC3E}">
-        <p14:creationId xmlns:p14="http://schemas.microsoft.com/office/powerpoint/2010/main" val="2087981066"/>
+        <p14:creationId xmlns:p14="http://schemas.microsoft.com/office/powerpoint/2010/main" val="1808584198"/>
       </p:ext>
     </p:extLst>
   </p:cSld>
   <p:clrMapOvr>
     <a:masterClrMapping/>
   </p:clrMapOvr>
+  <p:timing>
+    <p:tnLst>
+      <p:par>
+        <p:cTn id="1" dur="indefinite" restart="never" nodeType="tmRoot"/>
+      </p:par>
+    </p:tnLst>
+  </p:timing>
 </p:sld>
 </file>
 
@@ -14724,11 +14927,11 @@
           <a:p>
             <a:r>
               <a:rPr lang="pt-BR" dirty="0"/>
-              <a:t>5</a:t>
+              <a:t>4</a:t>
             </a:r>
             <a:r>
               <a:rPr lang="pt-BR" dirty="0" smtClean="0"/>
-              <a:t>. Previsão de futuras vendas</a:t>
+              <a:t>. Análise das categorias dos produtos</a:t>
             </a:r>
             <a:endParaRPr lang="pt-BR" dirty="0"/>
           </a:p>
@@ -14760,7 +14963,7 @@
             </a:pPr>
             <a:r>
               <a:rPr lang="pt-BR" dirty="0" smtClean="0"/>
-              <a:t>Utilização DA COLUNA DE DATA DA COMPRA</a:t>
+              <a:t>Preparação dos dados</a:t>
             </a:r>
           </a:p>
           <a:p>
@@ -14770,7 +14973,7 @@
             </a:pPr>
             <a:r>
               <a:rPr lang="pt-BR" dirty="0" smtClean="0"/>
-              <a:t>Número de compras e valor em dinheiro</a:t>
+              <a:t>Definição das categorias</a:t>
             </a:r>
           </a:p>
           <a:p>
@@ -14780,8 +14983,13 @@
             </a:pPr>
             <a:r>
               <a:rPr lang="pt-BR" dirty="0" smtClean="0"/>
-              <a:t>Dados diários</a:t>
-            </a:r>
+              <a:t>Criação/manipulação do </a:t>
+            </a:r>
+            <a:r>
+              <a:rPr lang="pt-BR" dirty="0" err="1" smtClean="0"/>
+              <a:t>dataframe</a:t>
+            </a:r>
+            <a:endParaRPr lang="pt-BR" dirty="0" smtClean="0"/>
           </a:p>
           <a:p>
             <a:pPr marL="285750" indent="-285750">
@@ -14790,44 +14998,32 @@
             </a:pPr>
             <a:r>
               <a:rPr lang="pt-BR" dirty="0" smtClean="0"/>
-              <a:t>dados entre janeiro de 2017 a outubro de 2018 (20 meses)</a:t>
-            </a:r>
-          </a:p>
-          <a:p>
-            <a:pPr marL="285750" indent="-285750">
-              <a:buFont typeface="Arial" panose="020B0604020202020204" pitchFamily="34" charset="0"/>
-              <a:buChar char="•"/>
-            </a:pPr>
+              <a:t>Aplicação do </a:t>
+            </a:r>
+            <a:r>
+              <a:rPr lang="pt-BR" dirty="0" err="1" smtClean="0"/>
+              <a:t>pca</a:t>
+            </a:r>
             <a:r>
               <a:rPr lang="pt-BR" dirty="0" smtClean="0"/>
-              <a:t>Remoção dos </a:t>
+              <a:t> (principal </a:t>
             </a:r>
             <a:r>
               <a:rPr lang="pt-BR" dirty="0" err="1" smtClean="0"/>
-              <a:t>outliers</a:t>
-            </a:r>
-            <a:endParaRPr lang="pt-BR" dirty="0" smtClean="0"/>
-          </a:p>
-          <a:p>
-            <a:pPr marL="285750" indent="-285750">
-              <a:buFont typeface="Arial" panose="020B0604020202020204" pitchFamily="34" charset="0"/>
-              <a:buChar char="•"/>
-            </a:pPr>
+              <a:t>components</a:t>
+            </a:r>
             <a:r>
               <a:rPr lang="pt-BR" dirty="0" smtClean="0"/>
-              <a:t>Gráficos de tendência</a:t>
-            </a:r>
-          </a:p>
-          <a:p>
-            <a:pPr marL="285750" indent="-285750">
-              <a:buFont typeface="Arial" panose="020B0604020202020204" pitchFamily="34" charset="0"/>
-              <a:buChar char="•"/>
-            </a:pPr>
+              <a:t> </a:t>
+            </a:r>
             <a:r>
               <a:rPr lang="pt-BR" dirty="0" err="1" smtClean="0"/>
-              <a:t>Forecasting</a:t>
-            </a:r>
-            <a:endParaRPr lang="pt-BR" dirty="0" smtClean="0"/>
+              <a:t>analysis</a:t>
+            </a:r>
+            <a:r>
+              <a:rPr lang="pt-BR" dirty="0" smtClean="0"/>
+              <a:t>)</a:t>
+            </a:r>
           </a:p>
           <a:p>
             <a:pPr marL="285750" indent="-285750">
@@ -14836,32 +15032,18 @@
             </a:pPr>
             <a:endParaRPr lang="pt-BR" dirty="0" smtClean="0"/>
           </a:p>
-          <a:p>
-            <a:pPr marL="285750" indent="-285750">
-              <a:buFont typeface="Arial" panose="020B0604020202020204" pitchFamily="34" charset="0"/>
-              <a:buChar char="•"/>
-            </a:pPr>
-            <a:endParaRPr lang="pt-BR" dirty="0" smtClean="0"/>
-          </a:p>
         </p:txBody>
       </p:sp>
     </p:spTree>
     <p:extLst>
       <p:ext uri="{BB962C8B-B14F-4D97-AF65-F5344CB8AC3E}">
-        <p14:creationId xmlns:p14="http://schemas.microsoft.com/office/powerpoint/2010/main" val="1932947923"/>
+        <p14:creationId xmlns:p14="http://schemas.microsoft.com/office/powerpoint/2010/main" val="2087981066"/>
       </p:ext>
     </p:extLst>
   </p:cSld>
   <p:clrMapOvr>
     <a:masterClrMapping/>
   </p:clrMapOvr>
-  <p:timing>
-    <p:tnLst>
-      <p:par>
-        <p:cTn id="1" dur="indefinite" restart="never" nodeType="tmRoot"/>
-      </p:par>
-    </p:tnLst>
-  </p:timing>
 </p:sld>
 </file>
 

</xml_diff>

<commit_message>
Add dataframe image for pca
</commit_message>
<xml_diff>
--- a/apresentacao/Apresentacao.pptx
+++ b/apresentacao/Apresentacao.pptx
@@ -15034,6 +15034,36 @@
           </a:p>
         </p:txBody>
       </p:sp>
+      <p:pic>
+        <p:nvPicPr>
+          <p:cNvPr id="4" name="Imagem 3"/>
+          <p:cNvPicPr>
+            <a:picLocks noChangeAspect="1"/>
+          </p:cNvPicPr>
+          <p:nvPr/>
+        </p:nvPicPr>
+        <p:blipFill>
+          <a:blip r:embed="rId2">
+            <a:extLst>
+              <a:ext uri="{28A0092B-C50C-407E-A947-70E740481C1C}">
+                <a14:useLocalDpi xmlns:a14="http://schemas.microsoft.com/office/drawing/2010/main" val="0"/>
+              </a:ext>
+            </a:extLst>
+          </a:blip>
+          <a:stretch>
+            <a:fillRect/>
+          </a:stretch>
+        </p:blipFill>
+        <p:spPr>
+          <a:xfrm>
+            <a:off x="1141411" y="3872751"/>
+            <a:ext cx="10051046" cy="2069624"/>
+          </a:xfrm>
+          <a:prstGeom prst="rect">
+            <a:avLst/>
+          </a:prstGeom>
+        </p:spPr>
+      </p:pic>
     </p:spTree>
     <p:extLst>
       <p:ext uri="{BB962C8B-B14F-4D97-AF65-F5344CB8AC3E}">
@@ -15044,6 +15074,13 @@
   <p:clrMapOvr>
     <a:masterClrMapping/>
   </p:clrMapOvr>
+  <p:timing>
+    <p:tnLst>
+      <p:par>
+        <p:cTn id="1" dur="indefinite" restart="never" nodeType="tmRoot"/>
+      </p:par>
+    </p:tnLst>
+  </p:timing>
 </p:sld>
 </file>
 

</xml_diff>

<commit_message>
Add order of dataframe image for PCA
</commit_message>
<xml_diff>
--- a/apresentacao/Apresentacao.pptx
+++ b/apresentacao/Apresentacao.pptx
@@ -14950,7 +14950,7 @@
         <p:spPr>
           <a:xfrm>
             <a:off x="1141411" y="1946366"/>
-            <a:ext cx="9906000" cy="3852771"/>
+            <a:ext cx="9906000" cy="4545874"/>
           </a:xfrm>
         </p:spPr>
         <p:txBody>
@@ -14996,40 +14996,75 @@
               <a:buFont typeface="Arial" panose="020B0604020202020204" pitchFamily="34" charset="0"/>
               <a:buChar char="•"/>
             </a:pPr>
-            <a:r>
-              <a:rPr lang="pt-BR" dirty="0" smtClean="0"/>
-              <a:t>Aplicação do </a:t>
-            </a:r>
-            <a:r>
-              <a:rPr lang="pt-BR" dirty="0" err="1" smtClean="0"/>
-              <a:t>pca</a:t>
-            </a:r>
-            <a:r>
-              <a:rPr lang="pt-BR" dirty="0" smtClean="0"/>
-              <a:t> (principal </a:t>
-            </a:r>
-            <a:r>
-              <a:rPr lang="pt-BR" dirty="0" err="1" smtClean="0"/>
-              <a:t>components</a:t>
-            </a:r>
-            <a:r>
-              <a:rPr lang="pt-BR" dirty="0" smtClean="0"/>
-              <a:t> </a:t>
-            </a:r>
-            <a:r>
-              <a:rPr lang="pt-BR" dirty="0" err="1" smtClean="0"/>
-              <a:t>analysis</a:t>
-            </a:r>
-            <a:r>
-              <a:rPr lang="pt-BR" dirty="0" smtClean="0"/>
-              <a:t>)</a:t>
-            </a:r>
+            <a:endParaRPr lang="pt-BR" dirty="0" smtClean="0"/>
           </a:p>
           <a:p>
             <a:pPr marL="285750" indent="-285750">
               <a:buFont typeface="Arial" panose="020B0604020202020204" pitchFamily="34" charset="0"/>
               <a:buChar char="•"/>
             </a:pPr>
+            <a:endParaRPr lang="pt-BR" dirty="0"/>
+          </a:p>
+          <a:p>
+            <a:pPr marL="285750" indent="-285750">
+              <a:buFont typeface="Arial" panose="020B0604020202020204" pitchFamily="34" charset="0"/>
+              <a:buChar char="•"/>
+            </a:pPr>
+            <a:endParaRPr lang="pt-BR" dirty="0" smtClean="0"/>
+          </a:p>
+          <a:p>
+            <a:pPr marL="285750" indent="-285750">
+              <a:buFont typeface="Arial" panose="020B0604020202020204" pitchFamily="34" charset="0"/>
+              <a:buChar char="•"/>
+            </a:pPr>
+            <a:endParaRPr lang="pt-BR" dirty="0"/>
+          </a:p>
+          <a:p>
+            <a:pPr marL="285750" indent="-285750">
+              <a:buFont typeface="Arial" panose="020B0604020202020204" pitchFamily="34" charset="0"/>
+              <a:buChar char="•"/>
+            </a:pPr>
+            <a:endParaRPr lang="pt-BR" dirty="0" smtClean="0"/>
+          </a:p>
+          <a:p>
+            <a:pPr marL="285750" indent="-285750">
+              <a:buFont typeface="Arial" panose="020B0604020202020204" pitchFamily="34" charset="0"/>
+              <a:buChar char="•"/>
+            </a:pPr>
+            <a:r>
+              <a:rPr lang="pt-BR" dirty="0" smtClean="0"/>
+              <a:t>Aplicação </a:t>
+            </a:r>
+            <a:r>
+              <a:rPr lang="pt-BR" dirty="0"/>
+              <a:t>do </a:t>
+            </a:r>
+            <a:r>
+              <a:rPr lang="pt-BR" dirty="0" err="1"/>
+              <a:t>pca</a:t>
+            </a:r>
+            <a:r>
+              <a:rPr lang="pt-BR" dirty="0"/>
+              <a:t> (principal </a:t>
+            </a:r>
+            <a:r>
+              <a:rPr lang="pt-BR" dirty="0" err="1"/>
+              <a:t>components</a:t>
+            </a:r>
+            <a:r>
+              <a:rPr lang="pt-BR" dirty="0"/>
+              <a:t> </a:t>
+            </a:r>
+            <a:r>
+              <a:rPr lang="pt-BR" dirty="0" err="1"/>
+              <a:t>analysis</a:t>
+            </a:r>
+            <a:r>
+              <a:rPr lang="pt-BR" dirty="0"/>
+              <a:t>)</a:t>
+            </a:r>
+          </a:p>
+          <a:p>
             <a:endParaRPr lang="pt-BR" dirty="0" smtClean="0"/>
           </a:p>
         </p:txBody>
@@ -15056,7 +15091,7 @@
         </p:blipFill>
         <p:spPr>
           <a:xfrm>
-            <a:off x="1141411" y="3872751"/>
+            <a:off x="1141411" y="3363299"/>
             <a:ext cx="10051046" cy="2069624"/>
           </a:xfrm>
           <a:prstGeom prst="rect">

</xml_diff>

<commit_message>
Add time series dataframe
</commit_message>
<xml_diff>
--- a/apresentacao/Apresentacao.pptx
+++ b/apresentacao/Apresentacao.pptx
@@ -218,7 +218,7 @@
             <a:pPr rtl="0"/>
             <a:fld id="{96040C08-05E9-4012-B418-01487B5076B6}" type="datetime1">
               <a:rPr lang="pt-BR" noProof="1" smtClean="0"/>
-              <a:t>02/10/2020</a:t>
+              <a:t>03/10/2020</a:t>
             </a:fld>
             <a:endParaRPr lang="pt-BR" noProof="1"/>
           </a:p>
@@ -388,7 +388,7 @@
             <a:pPr rtl="0"/>
             <a:fld id="{165A813A-4011-45B8-A14A-44F23C1D3E48}" type="datetime1">
               <a:rPr lang="pt-BR" noProof="1" smtClean="0"/>
-              <a:t>02/10/2020</a:t>
+              <a:t>03/10/2020</a:t>
             </a:fld>
             <a:endParaRPr lang="pt-BR" noProof="1"/>
           </a:p>
@@ -709,7 +709,7 @@
           <a:noFill/>
           <a:extLst>
             <a:ext uri="{909E8E84-426E-40dd-AFC4-6F175D3DCCD1}">
-              <a14:hiddenFill xmlns:a14="http://schemas.microsoft.com/office/drawing/2010/main" xmlns="">
+              <a14:hiddenFill xmlns="" xmlns:a14="http://schemas.microsoft.com/office/drawing/2010/main">
                 <a:solidFill>
                   <a:srgbClr val="FFFFFF"/>
                 </a:solidFill>
@@ -769,7 +769,7 @@
             </a:ln>
             <a:extLst>
               <a:ext uri="{91240B29-F687-4f45-9708-019B960494DF}">
-                <a14:hiddenLine xmlns:a14="http://schemas.microsoft.com/office/drawing/2010/main" xmlns="" w="9525">
+                <a14:hiddenLine xmlns="" xmlns:a14="http://schemas.microsoft.com/office/drawing/2010/main" w="9525">
                   <a:solidFill>
                     <a:srgbClr val="000000"/>
                   </a:solidFill>
@@ -859,7 +859,7 @@
             </a:ln>
             <a:extLst>
               <a:ext uri="{91240B29-F687-4f45-9708-019B960494DF}">
-                <a14:hiddenLine xmlns:a14="http://schemas.microsoft.com/office/drawing/2010/main" xmlns="" w="9525">
+                <a14:hiddenLine xmlns="" xmlns:a14="http://schemas.microsoft.com/office/drawing/2010/main" w="9525">
                   <a:solidFill>
                     <a:srgbClr val="000000"/>
                   </a:solidFill>
@@ -949,7 +949,7 @@
             </a:ln>
             <a:extLst>
               <a:ext uri="{91240B29-F687-4f45-9708-019B960494DF}">
-                <a14:hiddenLine xmlns:a14="http://schemas.microsoft.com/office/drawing/2010/main" xmlns="" w="9525">
+                <a14:hiddenLine xmlns="" xmlns:a14="http://schemas.microsoft.com/office/drawing/2010/main" w="9525">
                   <a:solidFill>
                     <a:srgbClr val="000000"/>
                   </a:solidFill>
@@ -983,7 +983,7 @@
             </a:ln>
             <a:extLst>
               <a:ext uri="{91240B29-F687-4f45-9708-019B960494DF}">
-                <a14:hiddenLine xmlns:a14="http://schemas.microsoft.com/office/drawing/2010/main" xmlns="" w="9525">
+                <a14:hiddenLine xmlns="" xmlns:a14="http://schemas.microsoft.com/office/drawing/2010/main" w="9525">
                   <a:solidFill>
                     <a:srgbClr val="000000"/>
                   </a:solidFill>
@@ -1073,7 +1073,7 @@
             </a:ln>
             <a:extLst>
               <a:ext uri="{91240B29-F687-4f45-9708-019B960494DF}">
-                <a14:hiddenLine xmlns:a14="http://schemas.microsoft.com/office/drawing/2010/main" xmlns="" w="9525">
+                <a14:hiddenLine xmlns="" xmlns:a14="http://schemas.microsoft.com/office/drawing/2010/main" w="9525">
                   <a:solidFill>
                     <a:srgbClr val="000000"/>
                   </a:solidFill>
@@ -1135,7 +1135,7 @@
             </a:ln>
             <a:extLst>
               <a:ext uri="{91240B29-F687-4f45-9708-019B960494DF}">
-                <a14:hiddenLine xmlns:a14="http://schemas.microsoft.com/office/drawing/2010/main" xmlns="" w="9525">
+                <a14:hiddenLine xmlns="" xmlns:a14="http://schemas.microsoft.com/office/drawing/2010/main" w="9525">
                   <a:solidFill>
                     <a:srgbClr val="000000"/>
                   </a:solidFill>
@@ -1197,7 +1197,7 @@
             </a:ln>
             <a:extLst>
               <a:ext uri="{91240B29-F687-4f45-9708-019B960494DF}">
-                <a14:hiddenLine xmlns:a14="http://schemas.microsoft.com/office/drawing/2010/main" xmlns="" w="9525">
+                <a14:hiddenLine xmlns="" xmlns:a14="http://schemas.microsoft.com/office/drawing/2010/main" w="9525">
                   <a:solidFill>
                     <a:srgbClr val="000000"/>
                   </a:solidFill>
@@ -1287,7 +1287,7 @@
             </a:ln>
             <a:extLst>
               <a:ext uri="{91240B29-F687-4f45-9708-019B960494DF}">
-                <a14:hiddenLine xmlns:a14="http://schemas.microsoft.com/office/drawing/2010/main" xmlns="" w="9525">
+                <a14:hiddenLine xmlns="" xmlns:a14="http://schemas.microsoft.com/office/drawing/2010/main" w="9525">
                   <a:solidFill>
                     <a:srgbClr val="000000"/>
                   </a:solidFill>
@@ -1349,7 +1349,7 @@
             </a:ln>
             <a:extLst>
               <a:ext uri="{91240B29-F687-4f45-9708-019B960494DF}">
-                <a14:hiddenLine xmlns:a14="http://schemas.microsoft.com/office/drawing/2010/main" xmlns="" w="9525">
+                <a14:hiddenLine xmlns="" xmlns:a14="http://schemas.microsoft.com/office/drawing/2010/main" w="9525">
                   <a:solidFill>
                     <a:srgbClr val="000000"/>
                   </a:solidFill>
@@ -1411,7 +1411,7 @@
             </a:ln>
             <a:extLst>
               <a:ext uri="{91240B29-F687-4f45-9708-019B960494DF}">
-                <a14:hiddenLine xmlns:a14="http://schemas.microsoft.com/office/drawing/2010/main" xmlns="" w="9525">
+                <a14:hiddenLine xmlns="" xmlns:a14="http://schemas.microsoft.com/office/drawing/2010/main" w="9525">
                   <a:solidFill>
                     <a:srgbClr val="000000"/>
                   </a:solidFill>
@@ -1501,7 +1501,7 @@
             </a:ln>
             <a:extLst>
               <a:ext uri="{91240B29-F687-4f45-9708-019B960494DF}">
-                <a14:hiddenLine xmlns:a14="http://schemas.microsoft.com/office/drawing/2010/main" xmlns="" w="9525">
+                <a14:hiddenLine xmlns="" xmlns:a14="http://schemas.microsoft.com/office/drawing/2010/main" w="9525">
                   <a:solidFill>
                     <a:srgbClr val="000000"/>
                   </a:solidFill>
@@ -1591,7 +1591,7 @@
             </a:ln>
             <a:extLst>
               <a:ext uri="{91240B29-F687-4f45-9708-019B960494DF}">
-                <a14:hiddenLine xmlns:a14="http://schemas.microsoft.com/office/drawing/2010/main" xmlns="" w="9525">
+                <a14:hiddenLine xmlns="" xmlns:a14="http://schemas.microsoft.com/office/drawing/2010/main" w="9525">
                   <a:solidFill>
                     <a:srgbClr val="000000"/>
                   </a:solidFill>
@@ -1653,7 +1653,7 @@
             </a:ln>
             <a:extLst>
               <a:ext uri="{91240B29-F687-4f45-9708-019B960494DF}">
-                <a14:hiddenLine xmlns:a14="http://schemas.microsoft.com/office/drawing/2010/main" xmlns="" w="9525">
+                <a14:hiddenLine xmlns="" xmlns:a14="http://schemas.microsoft.com/office/drawing/2010/main" w="9525">
                   <a:solidFill>
                     <a:srgbClr val="000000"/>
                   </a:solidFill>
@@ -1763,7 +1763,7 @@
             </a:ln>
             <a:extLst>
               <a:ext uri="{91240B29-F687-4f45-9708-019B960494DF}">
-                <a14:hiddenLine xmlns:a14="http://schemas.microsoft.com/office/drawing/2010/main" xmlns="" w="9525">
+                <a14:hiddenLine xmlns="" xmlns:a14="http://schemas.microsoft.com/office/drawing/2010/main" w="9525">
                   <a:solidFill>
                     <a:srgbClr val="000000"/>
                   </a:solidFill>
@@ -1825,7 +1825,7 @@
             </a:ln>
             <a:extLst>
               <a:ext uri="{91240B29-F687-4f45-9708-019B960494DF}">
-                <a14:hiddenLine xmlns:a14="http://schemas.microsoft.com/office/drawing/2010/main" xmlns="" w="9525">
+                <a14:hiddenLine xmlns="" xmlns:a14="http://schemas.microsoft.com/office/drawing/2010/main" w="9525">
                   <a:solidFill>
                     <a:srgbClr val="000000"/>
                   </a:solidFill>
@@ -1915,7 +1915,7 @@
             </a:ln>
             <a:extLst>
               <a:ext uri="{91240B29-F687-4f45-9708-019B960494DF}">
-                <a14:hiddenLine xmlns:a14="http://schemas.microsoft.com/office/drawing/2010/main" xmlns="" w="9525">
+                <a14:hiddenLine xmlns="" xmlns:a14="http://schemas.microsoft.com/office/drawing/2010/main" w="9525">
                   <a:solidFill>
                     <a:srgbClr val="000000"/>
                   </a:solidFill>
@@ -2005,7 +2005,7 @@
             </a:ln>
             <a:extLst>
               <a:ext uri="{91240B29-F687-4f45-9708-019B960494DF}">
-                <a14:hiddenLine xmlns:a14="http://schemas.microsoft.com/office/drawing/2010/main" xmlns="" w="9525">
+                <a14:hiddenLine xmlns="" xmlns:a14="http://schemas.microsoft.com/office/drawing/2010/main" w="9525">
                   <a:solidFill>
                     <a:srgbClr val="000000"/>
                   </a:solidFill>
@@ -2067,7 +2067,7 @@
             </a:ln>
             <a:extLst>
               <a:ext uri="{91240B29-F687-4f45-9708-019B960494DF}">
-                <a14:hiddenLine xmlns:a14="http://schemas.microsoft.com/office/drawing/2010/main" xmlns="" w="9525">
+                <a14:hiddenLine xmlns="" xmlns:a14="http://schemas.microsoft.com/office/drawing/2010/main" w="9525">
                   <a:solidFill>
                     <a:srgbClr val="000000"/>
                   </a:solidFill>
@@ -2157,7 +2157,7 @@
             </a:ln>
             <a:extLst>
               <a:ext uri="{91240B29-F687-4f45-9708-019B960494DF}">
-                <a14:hiddenLine xmlns:a14="http://schemas.microsoft.com/office/drawing/2010/main" xmlns="" w="9525">
+                <a14:hiddenLine xmlns="" xmlns:a14="http://schemas.microsoft.com/office/drawing/2010/main" w="9525">
                   <a:solidFill>
                     <a:srgbClr val="000000"/>
                   </a:solidFill>
@@ -2247,7 +2247,7 @@
             </a:ln>
             <a:extLst>
               <a:ext uri="{91240B29-F687-4f45-9708-019B960494DF}">
-                <a14:hiddenLine xmlns:a14="http://schemas.microsoft.com/office/drawing/2010/main" xmlns="" w="9525">
+                <a14:hiddenLine xmlns="" xmlns:a14="http://schemas.microsoft.com/office/drawing/2010/main" w="9525">
                   <a:solidFill>
                     <a:srgbClr val="000000"/>
                   </a:solidFill>
@@ -2303,7 +2303,7 @@
             </a:ln>
             <a:extLst>
               <a:ext uri="{91240B29-F687-4f45-9708-019B960494DF}">
-                <a14:hiddenLine xmlns:a14="http://schemas.microsoft.com/office/drawing/2010/main" xmlns="" w="9525">
+                <a14:hiddenLine xmlns="" xmlns:a14="http://schemas.microsoft.com/office/drawing/2010/main" w="9525">
                   <a:solidFill>
                     <a:srgbClr val="000000"/>
                   </a:solidFill>
@@ -2393,7 +2393,7 @@
             </a:ln>
             <a:extLst>
               <a:ext uri="{91240B29-F687-4f45-9708-019B960494DF}">
-                <a14:hiddenLine xmlns:a14="http://schemas.microsoft.com/office/drawing/2010/main" xmlns="" w="9525">
+                <a14:hiddenLine xmlns="" xmlns:a14="http://schemas.microsoft.com/office/drawing/2010/main" w="9525">
                   <a:solidFill>
                     <a:srgbClr val="000000"/>
                   </a:solidFill>
@@ -2449,7 +2449,7 @@
             </a:ln>
             <a:extLst>
               <a:ext uri="{91240B29-F687-4f45-9708-019B960494DF}">
-                <a14:hiddenLine xmlns:a14="http://schemas.microsoft.com/office/drawing/2010/main" xmlns="" w="9525">
+                <a14:hiddenLine xmlns="" xmlns:a14="http://schemas.microsoft.com/office/drawing/2010/main" w="9525">
                   <a:solidFill>
                     <a:srgbClr val="000000"/>
                   </a:solidFill>
@@ -2539,7 +2539,7 @@
             </a:ln>
             <a:extLst>
               <a:ext uri="{91240B29-F687-4f45-9708-019B960494DF}">
-                <a14:hiddenLine xmlns:a14="http://schemas.microsoft.com/office/drawing/2010/main" xmlns="" w="9525">
+                <a14:hiddenLine xmlns="" xmlns:a14="http://schemas.microsoft.com/office/drawing/2010/main" w="9525">
                   <a:solidFill>
                     <a:srgbClr val="000000"/>
                   </a:solidFill>
@@ -2607,7 +2607,7 @@
             </a:ln>
             <a:extLst>
               <a:ext uri="{91240B29-F687-4f45-9708-019B960494DF}">
-                <a14:hiddenLine xmlns:a14="http://schemas.microsoft.com/office/drawing/2010/main" xmlns="" w="9525">
+                <a14:hiddenLine xmlns="" xmlns:a14="http://schemas.microsoft.com/office/drawing/2010/main" w="9525">
                   <a:solidFill>
                     <a:srgbClr val="000000"/>
                   </a:solidFill>
@@ -2697,7 +2697,7 @@
             </a:ln>
             <a:extLst>
               <a:ext uri="{91240B29-F687-4f45-9708-019B960494DF}">
-                <a14:hiddenLine xmlns:a14="http://schemas.microsoft.com/office/drawing/2010/main" xmlns="" w="9525">
+                <a14:hiddenLine xmlns="" xmlns:a14="http://schemas.microsoft.com/office/drawing/2010/main" w="9525">
                   <a:solidFill>
                     <a:srgbClr val="000000"/>
                   </a:solidFill>
@@ -2765,7 +2765,7 @@
             </a:ln>
             <a:extLst>
               <a:ext uri="{91240B29-F687-4f45-9708-019B960494DF}">
-                <a14:hiddenLine xmlns:a14="http://schemas.microsoft.com/office/drawing/2010/main" xmlns="" w="9525">
+                <a14:hiddenLine xmlns="" xmlns:a14="http://schemas.microsoft.com/office/drawing/2010/main" w="9525">
                   <a:solidFill>
                     <a:srgbClr val="000000"/>
                   </a:solidFill>
@@ -2855,7 +2855,7 @@
             </a:ln>
             <a:extLst>
               <a:ext uri="{91240B29-F687-4f45-9708-019B960494DF}">
-                <a14:hiddenLine xmlns:a14="http://schemas.microsoft.com/office/drawing/2010/main" xmlns="" w="9525">
+                <a14:hiddenLine xmlns="" xmlns:a14="http://schemas.microsoft.com/office/drawing/2010/main" w="9525">
                   <a:solidFill>
                     <a:srgbClr val="000000"/>
                   </a:solidFill>
@@ -2889,7 +2889,7 @@
             </a:ln>
             <a:extLst>
               <a:ext uri="{91240B29-F687-4f45-9708-019B960494DF}">
-                <a14:hiddenLine xmlns:a14="http://schemas.microsoft.com/office/drawing/2010/main" xmlns="" w="9525">
+                <a14:hiddenLine xmlns="" xmlns:a14="http://schemas.microsoft.com/office/drawing/2010/main" w="9525">
                   <a:solidFill>
                     <a:srgbClr val="000000"/>
                   </a:solidFill>
@@ -2979,7 +2979,7 @@
             </a:ln>
             <a:extLst>
               <a:ext uri="{91240B29-F687-4f45-9708-019B960494DF}">
-                <a14:hiddenLine xmlns:a14="http://schemas.microsoft.com/office/drawing/2010/main" xmlns="" w="9525">
+                <a14:hiddenLine xmlns="" xmlns:a14="http://schemas.microsoft.com/office/drawing/2010/main" w="9525">
                   <a:solidFill>
                     <a:srgbClr val="000000"/>
                   </a:solidFill>
@@ -3041,7 +3041,7 @@
             </a:ln>
             <a:extLst>
               <a:ext uri="{91240B29-F687-4f45-9708-019B960494DF}">
-                <a14:hiddenLine xmlns:a14="http://schemas.microsoft.com/office/drawing/2010/main" xmlns="" w="9525">
+                <a14:hiddenLine xmlns="" xmlns:a14="http://schemas.microsoft.com/office/drawing/2010/main" w="9525">
                   <a:solidFill>
                     <a:srgbClr val="000000"/>
                   </a:solidFill>
@@ -3103,7 +3103,7 @@
             </a:ln>
             <a:extLst>
               <a:ext uri="{91240B29-F687-4f45-9708-019B960494DF}">
-                <a14:hiddenLine xmlns:a14="http://schemas.microsoft.com/office/drawing/2010/main" xmlns="" w="9525">
+                <a14:hiddenLine xmlns="" xmlns:a14="http://schemas.microsoft.com/office/drawing/2010/main" w="9525">
                   <a:solidFill>
                     <a:srgbClr val="000000"/>
                   </a:solidFill>
@@ -3193,7 +3193,7 @@
             </a:ln>
             <a:extLst>
               <a:ext uri="{91240B29-F687-4f45-9708-019B960494DF}">
-                <a14:hiddenLine xmlns:a14="http://schemas.microsoft.com/office/drawing/2010/main" xmlns="" w="9525">
+                <a14:hiddenLine xmlns="" xmlns:a14="http://schemas.microsoft.com/office/drawing/2010/main" w="9525">
                   <a:solidFill>
                     <a:srgbClr val="000000"/>
                   </a:solidFill>
@@ -3261,7 +3261,7 @@
             </a:ln>
             <a:extLst>
               <a:ext uri="{91240B29-F687-4f45-9708-019B960494DF}">
-                <a14:hiddenLine xmlns:a14="http://schemas.microsoft.com/office/drawing/2010/main" xmlns="" w="9525">
+                <a14:hiddenLine xmlns="" xmlns:a14="http://schemas.microsoft.com/office/drawing/2010/main" w="9525">
                   <a:solidFill>
                     <a:srgbClr val="000000"/>
                   </a:solidFill>
@@ -3323,7 +3323,7 @@
             </a:ln>
             <a:extLst>
               <a:ext uri="{91240B29-F687-4f45-9708-019B960494DF}">
-                <a14:hiddenLine xmlns:a14="http://schemas.microsoft.com/office/drawing/2010/main" xmlns="" w="9525">
+                <a14:hiddenLine xmlns="" xmlns:a14="http://schemas.microsoft.com/office/drawing/2010/main" w="9525">
                   <a:solidFill>
                     <a:srgbClr val="000000"/>
                   </a:solidFill>
@@ -3413,7 +3413,7 @@
             </a:ln>
             <a:extLst>
               <a:ext uri="{91240B29-F687-4f45-9708-019B960494DF}">
-                <a14:hiddenLine xmlns:a14="http://schemas.microsoft.com/office/drawing/2010/main" xmlns="" w="9525">
+                <a14:hiddenLine xmlns="" xmlns:a14="http://schemas.microsoft.com/office/drawing/2010/main" w="9525">
                   <a:solidFill>
                     <a:srgbClr val="000000"/>
                   </a:solidFill>
@@ -3475,7 +3475,7 @@
             </a:ln>
             <a:extLst>
               <a:ext uri="{91240B29-F687-4f45-9708-019B960494DF}">
-                <a14:hiddenLine xmlns:a14="http://schemas.microsoft.com/office/drawing/2010/main" xmlns="" w="9525">
+                <a14:hiddenLine xmlns="" xmlns:a14="http://schemas.microsoft.com/office/drawing/2010/main" w="9525">
                   <a:solidFill>
                     <a:srgbClr val="000000"/>
                   </a:solidFill>
@@ -3565,7 +3565,7 @@
             </a:ln>
             <a:extLst>
               <a:ext uri="{91240B29-F687-4f45-9708-019B960494DF}">
-                <a14:hiddenLine xmlns:a14="http://schemas.microsoft.com/office/drawing/2010/main" xmlns="" w="9525">
+                <a14:hiddenLine xmlns="" xmlns:a14="http://schemas.microsoft.com/office/drawing/2010/main" w="9525">
                   <a:solidFill>
                     <a:srgbClr val="000000"/>
                   </a:solidFill>
@@ -3627,7 +3627,7 @@
             </a:ln>
             <a:extLst>
               <a:ext uri="{91240B29-F687-4f45-9708-019B960494DF}">
-                <a14:hiddenLine xmlns:a14="http://schemas.microsoft.com/office/drawing/2010/main" xmlns="" w="9525">
+                <a14:hiddenLine xmlns="" xmlns:a14="http://schemas.microsoft.com/office/drawing/2010/main" w="9525">
                   <a:solidFill>
                     <a:srgbClr val="000000"/>
                   </a:solidFill>
@@ -3717,7 +3717,7 @@
             </a:ln>
             <a:extLst>
               <a:ext uri="{91240B29-F687-4f45-9708-019B960494DF}">
-                <a14:hiddenLine xmlns:a14="http://schemas.microsoft.com/office/drawing/2010/main" xmlns="" w="9525">
+                <a14:hiddenLine xmlns="" xmlns:a14="http://schemas.microsoft.com/office/drawing/2010/main" w="9525">
                   <a:solidFill>
                     <a:srgbClr val="000000"/>
                   </a:solidFill>
@@ -3751,7 +3751,7 @@
             </a:ln>
             <a:extLst>
               <a:ext uri="{91240B29-F687-4f45-9708-019B960494DF}">
-                <a14:hiddenLine xmlns:a14="http://schemas.microsoft.com/office/drawing/2010/main" xmlns="" w="9525">
+                <a14:hiddenLine xmlns="" xmlns:a14="http://schemas.microsoft.com/office/drawing/2010/main" w="9525">
                   <a:solidFill>
                     <a:srgbClr val="000000"/>
                   </a:solidFill>
@@ -3816,7 +3816,7 @@
             </a:ln>
             <a:extLst>
               <a:ext uri="{91240B29-F687-4f45-9708-019B960494DF}">
-                <a14:hiddenLine xmlns:a14="http://schemas.microsoft.com/office/drawing/2010/main" xmlns="" w="9525">
+                <a14:hiddenLine xmlns="" xmlns:a14="http://schemas.microsoft.com/office/drawing/2010/main" w="9525">
                   <a:solidFill>
                     <a:srgbClr val="000000"/>
                   </a:solidFill>
@@ -3906,7 +3906,7 @@
             </a:ln>
             <a:extLst>
               <a:ext uri="{91240B29-F687-4f45-9708-019B960494DF}">
-                <a14:hiddenLine xmlns:a14="http://schemas.microsoft.com/office/drawing/2010/main" xmlns="" w="9525">
+                <a14:hiddenLine xmlns="" xmlns:a14="http://schemas.microsoft.com/office/drawing/2010/main" w="9525">
                   <a:solidFill>
                     <a:srgbClr val="000000"/>
                   </a:solidFill>
@@ -3968,7 +3968,7 @@
             </a:ln>
             <a:extLst>
               <a:ext uri="{91240B29-F687-4f45-9708-019B960494DF}">
-                <a14:hiddenLine xmlns:a14="http://schemas.microsoft.com/office/drawing/2010/main" xmlns="" w="9525">
+                <a14:hiddenLine xmlns="" xmlns:a14="http://schemas.microsoft.com/office/drawing/2010/main" w="9525">
                   <a:solidFill>
                     <a:srgbClr val="000000"/>
                   </a:solidFill>
@@ -4058,7 +4058,7 @@
             </a:ln>
             <a:extLst>
               <a:ext uri="{91240B29-F687-4f45-9708-019B960494DF}">
-                <a14:hiddenLine xmlns:a14="http://schemas.microsoft.com/office/drawing/2010/main" xmlns="" w="9525">
+                <a14:hiddenLine xmlns="" xmlns:a14="http://schemas.microsoft.com/office/drawing/2010/main" w="9525">
                   <a:solidFill>
                     <a:srgbClr val="000000"/>
                   </a:solidFill>
@@ -4148,7 +4148,7 @@
             </a:ln>
             <a:extLst>
               <a:ext uri="{91240B29-F687-4f45-9708-019B960494DF}">
-                <a14:hiddenLine xmlns:a14="http://schemas.microsoft.com/office/drawing/2010/main" xmlns="" w="9525">
+                <a14:hiddenLine xmlns="" xmlns:a14="http://schemas.microsoft.com/office/drawing/2010/main" w="9525">
                   <a:solidFill>
                     <a:srgbClr val="000000"/>
                   </a:solidFill>
@@ -4213,7 +4213,7 @@
             </a:ln>
             <a:extLst>
               <a:ext uri="{91240B29-F687-4f45-9708-019B960494DF}">
-                <a14:hiddenLine xmlns:a14="http://schemas.microsoft.com/office/drawing/2010/main" xmlns="" w="9525">
+                <a14:hiddenLine xmlns="" xmlns:a14="http://schemas.microsoft.com/office/drawing/2010/main" w="9525">
                   <a:solidFill>
                     <a:srgbClr val="000000"/>
                   </a:solidFill>
@@ -4275,7 +4275,7 @@
             </a:ln>
             <a:extLst>
               <a:ext uri="{91240B29-F687-4f45-9708-019B960494DF}">
-                <a14:hiddenLine xmlns:a14="http://schemas.microsoft.com/office/drawing/2010/main" xmlns="" w="9525">
+                <a14:hiddenLine xmlns="" xmlns:a14="http://schemas.microsoft.com/office/drawing/2010/main" w="9525">
                   <a:solidFill>
                     <a:srgbClr val="000000"/>
                   </a:solidFill>
@@ -4365,7 +4365,7 @@
             </a:ln>
             <a:extLst>
               <a:ext uri="{91240B29-F687-4f45-9708-019B960494DF}">
-                <a14:hiddenLine xmlns:a14="http://schemas.microsoft.com/office/drawing/2010/main" xmlns="" w="9525">
+                <a14:hiddenLine xmlns="" xmlns:a14="http://schemas.microsoft.com/office/drawing/2010/main" w="9525">
                   <a:solidFill>
                     <a:srgbClr val="000000"/>
                   </a:solidFill>
@@ -4455,7 +4455,7 @@
             </a:ln>
             <a:extLst>
               <a:ext uri="{91240B29-F687-4f45-9708-019B960494DF}">
-                <a14:hiddenLine xmlns:a14="http://schemas.microsoft.com/office/drawing/2010/main" xmlns="" w="9525">
+                <a14:hiddenLine xmlns="" xmlns:a14="http://schemas.microsoft.com/office/drawing/2010/main" w="9525">
                   <a:solidFill>
                     <a:srgbClr val="000000"/>
                   </a:solidFill>
@@ -4517,7 +4517,7 @@
             </a:ln>
             <a:extLst>
               <a:ext uri="{91240B29-F687-4f45-9708-019B960494DF}">
-                <a14:hiddenLine xmlns:a14="http://schemas.microsoft.com/office/drawing/2010/main" xmlns="" w="9525">
+                <a14:hiddenLine xmlns="" xmlns:a14="http://schemas.microsoft.com/office/drawing/2010/main" w="9525">
                   <a:solidFill>
                     <a:srgbClr val="000000"/>
                   </a:solidFill>
@@ -4637,7 +4637,7 @@
             </a:ln>
             <a:extLst>
               <a:ext uri="{91240B29-F687-4f45-9708-019B960494DF}">
-                <a14:hiddenLine xmlns:a14="http://schemas.microsoft.com/office/drawing/2010/main" xmlns="" w="9525">
+                <a14:hiddenLine xmlns="" xmlns:a14="http://schemas.microsoft.com/office/drawing/2010/main" w="9525">
                   <a:solidFill>
                     <a:srgbClr val="000000"/>
                   </a:solidFill>
@@ -4705,7 +4705,7 @@
             </a:ln>
             <a:extLst>
               <a:ext uri="{91240B29-F687-4f45-9708-019B960494DF}">
-                <a14:hiddenLine xmlns:a14="http://schemas.microsoft.com/office/drawing/2010/main" xmlns="" w="9525">
+                <a14:hiddenLine xmlns="" xmlns:a14="http://schemas.microsoft.com/office/drawing/2010/main" w="9525">
                   <a:solidFill>
                     <a:srgbClr val="000000"/>
                   </a:solidFill>
@@ -4795,7 +4795,7 @@
             </a:ln>
             <a:extLst>
               <a:ext uri="{91240B29-F687-4f45-9708-019B960494DF}">
-                <a14:hiddenLine xmlns:a14="http://schemas.microsoft.com/office/drawing/2010/main" xmlns="" w="9525">
+                <a14:hiddenLine xmlns="" xmlns:a14="http://schemas.microsoft.com/office/drawing/2010/main" w="9525">
                   <a:solidFill>
                     <a:srgbClr val="000000"/>
                   </a:solidFill>
@@ -4936,7 +4936,7 @@
             <a:pPr rtl="0"/>
             <a:fld id="{C7BAFE39-3CD2-438B-98DC-F175D13D36F9}" type="datetime1">
               <a:rPr lang="pt-BR" noProof="1" dirty="0" smtClean="0"/>
-              <a:t>02/10/2020</a:t>
+              <a:t>03/10/2020</a:t>
             </a:fld>
             <a:endParaRPr lang="pt-BR" noProof="1"/>
           </a:p>
@@ -5201,7 +5201,7 @@
             <a:pPr rtl="0"/>
             <a:fld id="{19434977-38C4-4AC5-A184-1B8E188943F8}" type="datetime1">
               <a:rPr lang="pt-BR" noProof="1" smtClean="0"/>
-              <a:t>02/10/2020</a:t>
+              <a:t>03/10/2020</a:t>
             </a:fld>
             <a:endParaRPr lang="pt-BR" noProof="1"/>
           </a:p>
@@ -5395,7 +5395,7 @@
             <a:pPr rtl="0"/>
             <a:fld id="{8F57C134-9496-48BE-A542-5782DC57EF7C}" type="datetime1">
               <a:rPr lang="pt-BR" noProof="1" smtClean="0"/>
-              <a:t>02/10/2020</a:t>
+              <a:t>03/10/2020</a:t>
             </a:fld>
             <a:endParaRPr lang="pt-BR" noProof="1"/>
           </a:p>
@@ -5657,7 +5657,7 @@
             <a:pPr rtl="0"/>
             <a:fld id="{B5B2A30D-686C-43CB-A630-481CB9735D21}" type="datetime1">
               <a:rPr lang="pt-BR" noProof="1" smtClean="0"/>
-              <a:t>02/10/2020</a:t>
+              <a:t>03/10/2020</a:t>
             </a:fld>
             <a:endParaRPr lang="pt-BR" noProof="1"/>
           </a:p>
@@ -6089,7 +6089,7 @@
             <a:pPr rtl="0"/>
             <a:fld id="{7B844AFB-902A-4143-B269-544E558C0D47}" type="datetime1">
               <a:rPr lang="pt-BR" noProof="1" smtClean="0"/>
-              <a:t>02/10/2020</a:t>
+              <a:t>03/10/2020</a:t>
             </a:fld>
             <a:endParaRPr lang="pt-BR" noProof="1"/>
           </a:p>
@@ -6633,7 +6633,7 @@
             <a:pPr rtl="0"/>
             <a:fld id="{CB145496-3D8E-4D78-9EDC-F9D92D27C280}" type="datetime1">
               <a:rPr lang="pt-BR" noProof="1" smtClean="0"/>
-              <a:t>02/10/2020</a:t>
+              <a:t>03/10/2020</a:t>
             </a:fld>
             <a:endParaRPr lang="pt-BR" noProof="1"/>
           </a:p>
@@ -7352,7 +7352,7 @@
             <a:pPr rtl="0"/>
             <a:fld id="{4EC85B7D-9CB6-4905-9186-69EF463E94F9}" type="datetime1">
               <a:rPr lang="pt-BR" noProof="1" smtClean="0"/>
-              <a:t>02/10/2020</a:t>
+              <a:t>03/10/2020</a:t>
             </a:fld>
             <a:endParaRPr lang="pt-BR" noProof="1"/>
           </a:p>
@@ -7519,7 +7519,7 @@
             <a:pPr rtl="0"/>
             <a:fld id="{C82AE119-2B17-4615-B2A6-43C0C343D88E}" type="datetime1">
               <a:rPr lang="pt-BR" noProof="1" smtClean="0"/>
-              <a:t>02/10/2020</a:t>
+              <a:t>03/10/2020</a:t>
             </a:fld>
             <a:endParaRPr lang="pt-BR" noProof="1"/>
           </a:p>
@@ -7696,7 +7696,7 @@
             <a:pPr rtl="0"/>
             <a:fld id="{6343EC4F-2B28-413E-9EFD-3AD28D481070}" type="datetime1">
               <a:rPr lang="pt-BR" noProof="1" smtClean="0"/>
-              <a:t>02/10/2020</a:t>
+              <a:t>03/10/2020</a:t>
             </a:fld>
             <a:endParaRPr lang="pt-BR" noProof="1"/>
           </a:p>
@@ -7863,7 +7863,7 @@
             <a:pPr rtl="0"/>
             <a:fld id="{B596146D-C863-4CFA-8430-F836E2550190}" type="datetime1">
               <a:rPr lang="pt-BR" noProof="1" smtClean="0"/>
-              <a:t>02/10/2020</a:t>
+              <a:t>03/10/2020</a:t>
             </a:fld>
             <a:endParaRPr lang="pt-BR" noProof="1"/>
           </a:p>
@@ -8111,7 +8111,7 @@
             <a:pPr rtl="0"/>
             <a:fld id="{A9F944D4-3462-47E3-BCC4-3209F18C1240}" type="datetime1">
               <a:rPr lang="pt-BR" noProof="1" smtClean="0"/>
-              <a:t>02/10/2020</a:t>
+              <a:t>03/10/2020</a:t>
             </a:fld>
             <a:endParaRPr lang="pt-BR" noProof="1"/>
           </a:p>
@@ -8339,7 +8339,7 @@
             <a:pPr rtl="0"/>
             <a:fld id="{D00C1AC3-F0BB-40C0-88AB-424EF0CDC369}" type="datetime1">
               <a:rPr lang="pt-BR" noProof="1" smtClean="0"/>
-              <a:t>02/10/2020</a:t>
+              <a:t>03/10/2020</a:t>
             </a:fld>
             <a:endParaRPr lang="pt-BR" noProof="1"/>
           </a:p>
@@ -8717,7 +8717,7 @@
             <a:pPr rtl="0"/>
             <a:fld id="{313A7D48-E889-4EF0-A586-900AB4128C83}" type="datetime1">
               <a:rPr lang="pt-BR" noProof="1" smtClean="0"/>
-              <a:t>02/10/2020</a:t>
+              <a:t>03/10/2020</a:t>
             </a:fld>
             <a:endParaRPr lang="pt-BR" noProof="1"/>
           </a:p>
@@ -8833,7 +8833,7 @@
             <a:pPr rtl="0"/>
             <a:fld id="{210F89FB-AF48-4FE6-BBAF-38BCC18EF6F8}" type="datetime1">
               <a:rPr lang="pt-BR" noProof="1" smtClean="0"/>
-              <a:t>02/10/2020</a:t>
+              <a:t>03/10/2020</a:t>
             </a:fld>
             <a:endParaRPr lang="pt-BR" noProof="1"/>
           </a:p>
@@ -8926,7 +8926,7 @@
             <a:pPr rtl="0"/>
             <a:fld id="{4DE41C33-0EF3-4494-98B0-359DBB520128}" type="datetime1">
               <a:rPr lang="pt-BR" noProof="1" smtClean="0"/>
-              <a:t>02/10/2020</a:t>
+              <a:t>03/10/2020</a:t>
             </a:fld>
             <a:endParaRPr lang="pt-BR" noProof="1"/>
           </a:p>
@@ -9172,7 +9172,7 @@
             <a:pPr rtl="0"/>
             <a:fld id="{8B4AB2D0-ADEB-4519-98D0-D97171176440}" type="datetime1">
               <a:rPr lang="pt-BR" noProof="1" smtClean="0"/>
-              <a:t>02/10/2020</a:t>
+              <a:t>03/10/2020</a:t>
             </a:fld>
             <a:endParaRPr lang="pt-BR" noProof="1"/>
           </a:p>
@@ -9452,7 +9452,7 @@
             <a:pPr rtl="0"/>
             <a:fld id="{765542AB-00EF-4079-9FA3-AA440DDB0054}" type="datetime1">
               <a:rPr lang="pt-BR" noProof="1" smtClean="0"/>
-              <a:t>02/10/2020</a:t>
+              <a:t>03/10/2020</a:t>
             </a:fld>
             <a:endParaRPr lang="pt-BR" noProof="1"/>
           </a:p>
@@ -9565,7 +9565,7 @@
           <a:noFill/>
           <a:extLst>
             <a:ext uri="{909E8E84-426E-40dd-AFC4-6F175D3DCCD1}">
-              <a14:hiddenFill xmlns:a14="http://schemas.microsoft.com/office/drawing/2010/main" xmlns="">
+              <a14:hiddenFill xmlns="" xmlns:a14="http://schemas.microsoft.com/office/drawing/2010/main">
                 <a:solidFill>
                   <a:srgbClr val="FFFFFF"/>
                 </a:solidFill>
@@ -9639,7 +9639,7 @@
               </a:ln>
               <a:extLst>
                 <a:ext uri="{91240B29-F687-4f45-9708-019B960494DF}">
-                  <a14:hiddenLine xmlns:a14="http://schemas.microsoft.com/office/drawing/2010/main" xmlns="" w="9525">
+                  <a14:hiddenLine xmlns="" xmlns:a14="http://schemas.microsoft.com/office/drawing/2010/main" w="9525">
                     <a:solidFill>
                       <a:srgbClr val="000000"/>
                     </a:solidFill>
@@ -9729,7 +9729,7 @@
               </a:ln>
               <a:extLst>
                 <a:ext uri="{91240B29-F687-4f45-9708-019B960494DF}">
-                  <a14:hiddenLine xmlns:a14="http://schemas.microsoft.com/office/drawing/2010/main" xmlns="" w="9525">
+                  <a14:hiddenLine xmlns="" xmlns:a14="http://schemas.microsoft.com/office/drawing/2010/main" w="9525">
                     <a:solidFill>
                       <a:srgbClr val="000000"/>
                     </a:solidFill>
@@ -9819,7 +9819,7 @@
               </a:ln>
               <a:extLst>
                 <a:ext uri="{91240B29-F687-4f45-9708-019B960494DF}">
-                  <a14:hiddenLine xmlns:a14="http://schemas.microsoft.com/office/drawing/2010/main" xmlns="" w="9525">
+                  <a14:hiddenLine xmlns="" xmlns:a14="http://schemas.microsoft.com/office/drawing/2010/main" w="9525">
                     <a:solidFill>
                       <a:srgbClr val="000000"/>
                     </a:solidFill>
@@ -9881,7 +9881,7 @@
               </a:ln>
               <a:extLst>
                 <a:ext uri="{91240B29-F687-4f45-9708-019B960494DF}">
-                  <a14:hiddenLine xmlns:a14="http://schemas.microsoft.com/office/drawing/2010/main" xmlns="" w="9525">
+                  <a14:hiddenLine xmlns="" xmlns:a14="http://schemas.microsoft.com/office/drawing/2010/main" w="9525">
                     <a:solidFill>
                       <a:srgbClr val="000000"/>
                     </a:solidFill>
@@ -9971,7 +9971,7 @@
               </a:ln>
               <a:extLst>
                 <a:ext uri="{91240B29-F687-4f45-9708-019B960494DF}">
-                  <a14:hiddenLine xmlns:a14="http://schemas.microsoft.com/office/drawing/2010/main" xmlns="" w="9525">
+                  <a14:hiddenLine xmlns="" xmlns:a14="http://schemas.microsoft.com/office/drawing/2010/main" w="9525">
                     <a:solidFill>
                       <a:srgbClr val="000000"/>
                     </a:solidFill>
@@ -10033,7 +10033,7 @@
               </a:ln>
               <a:extLst>
                 <a:ext uri="{91240B29-F687-4f45-9708-019B960494DF}">
-                  <a14:hiddenLine xmlns:a14="http://schemas.microsoft.com/office/drawing/2010/main" xmlns="" w="9525">
+                  <a14:hiddenLine xmlns="" xmlns:a14="http://schemas.microsoft.com/office/drawing/2010/main" w="9525">
                     <a:solidFill>
                       <a:srgbClr val="000000"/>
                     </a:solidFill>
@@ -10095,7 +10095,7 @@
               </a:ln>
               <a:extLst>
                 <a:ext uri="{91240B29-F687-4f45-9708-019B960494DF}">
-                  <a14:hiddenLine xmlns:a14="http://schemas.microsoft.com/office/drawing/2010/main" xmlns="" w="9525">
+                  <a14:hiddenLine xmlns="" xmlns:a14="http://schemas.microsoft.com/office/drawing/2010/main" w="9525">
                     <a:solidFill>
                       <a:srgbClr val="000000"/>
                     </a:solidFill>
@@ -10185,7 +10185,7 @@
               </a:ln>
               <a:extLst>
                 <a:ext uri="{91240B29-F687-4f45-9708-019B960494DF}">
-                  <a14:hiddenLine xmlns:a14="http://schemas.microsoft.com/office/drawing/2010/main" xmlns="" w="9525">
+                  <a14:hiddenLine xmlns="" xmlns:a14="http://schemas.microsoft.com/office/drawing/2010/main" w="9525">
                     <a:solidFill>
                       <a:srgbClr val="000000"/>
                     </a:solidFill>
@@ -10275,7 +10275,7 @@
               </a:ln>
               <a:extLst>
                 <a:ext uri="{91240B29-F687-4f45-9708-019B960494DF}">
-                  <a14:hiddenLine xmlns:a14="http://schemas.microsoft.com/office/drawing/2010/main" xmlns="" w="9525">
+                  <a14:hiddenLine xmlns="" xmlns:a14="http://schemas.microsoft.com/office/drawing/2010/main" w="9525">
                     <a:solidFill>
                       <a:srgbClr val="000000"/>
                     </a:solidFill>
@@ -10337,7 +10337,7 @@
               </a:ln>
               <a:extLst>
                 <a:ext uri="{91240B29-F687-4f45-9708-019B960494DF}">
-                  <a14:hiddenLine xmlns:a14="http://schemas.microsoft.com/office/drawing/2010/main" xmlns="" w="9525">
+                  <a14:hiddenLine xmlns="" xmlns:a14="http://schemas.microsoft.com/office/drawing/2010/main" w="9525">
                     <a:solidFill>
                       <a:srgbClr val="000000"/>
                     </a:solidFill>
@@ -10447,7 +10447,7 @@
               </a:ln>
               <a:extLst>
                 <a:ext uri="{91240B29-F687-4f45-9708-019B960494DF}">
-                  <a14:hiddenLine xmlns:a14="http://schemas.microsoft.com/office/drawing/2010/main" xmlns="" w="9525">
+                  <a14:hiddenLine xmlns="" xmlns:a14="http://schemas.microsoft.com/office/drawing/2010/main" w="9525">
                     <a:solidFill>
                       <a:srgbClr val="000000"/>
                     </a:solidFill>
@@ -10531,7 +10531,7 @@
               </a:ln>
               <a:extLst>
                 <a:ext uri="{91240B29-F687-4f45-9708-019B960494DF}">
-                  <a14:hiddenLine xmlns:a14="http://schemas.microsoft.com/office/drawing/2010/main" xmlns="" w="9525">
+                  <a14:hiddenLine xmlns="" xmlns:a14="http://schemas.microsoft.com/office/drawing/2010/main" w="9525">
                     <a:solidFill>
                       <a:srgbClr val="000000"/>
                     </a:solidFill>
@@ -10593,7 +10593,7 @@
               </a:ln>
               <a:extLst>
                 <a:ext uri="{91240B29-F687-4f45-9708-019B960494DF}">
-                  <a14:hiddenLine xmlns:a14="http://schemas.microsoft.com/office/drawing/2010/main" xmlns="" w="9525">
+                  <a14:hiddenLine xmlns="" xmlns:a14="http://schemas.microsoft.com/office/drawing/2010/main" w="9525">
                     <a:solidFill>
                       <a:srgbClr val="000000"/>
                     </a:solidFill>
@@ -10655,7 +10655,7 @@
               </a:ln>
               <a:extLst>
                 <a:ext uri="{91240B29-F687-4f45-9708-019B960494DF}">
-                  <a14:hiddenLine xmlns:a14="http://schemas.microsoft.com/office/drawing/2010/main" xmlns="" w="9525">
+                  <a14:hiddenLine xmlns="" xmlns:a14="http://schemas.microsoft.com/office/drawing/2010/main" w="9525">
                     <a:solidFill>
                       <a:srgbClr val="000000"/>
                     </a:solidFill>
@@ -10745,7 +10745,7 @@
               </a:ln>
               <a:extLst>
                 <a:ext uri="{91240B29-F687-4f45-9708-019B960494DF}">
-                  <a14:hiddenLine xmlns:a14="http://schemas.microsoft.com/office/drawing/2010/main" xmlns="" w="9525">
+                  <a14:hiddenLine xmlns="" xmlns:a14="http://schemas.microsoft.com/office/drawing/2010/main" w="9525">
                     <a:solidFill>
                       <a:srgbClr val="000000"/>
                     </a:solidFill>
@@ -10779,7 +10779,7 @@
               </a:ln>
               <a:extLst>
                 <a:ext uri="{91240B29-F687-4f45-9708-019B960494DF}">
-                  <a14:hiddenLine xmlns:a14="http://schemas.microsoft.com/office/drawing/2010/main" xmlns="" w="9525">
+                  <a14:hiddenLine xmlns="" xmlns:a14="http://schemas.microsoft.com/office/drawing/2010/main" w="9525">
                     <a:solidFill>
                       <a:srgbClr val="000000"/>
                     </a:solidFill>
@@ -10844,7 +10844,7 @@
               </a:ln>
               <a:extLst>
                 <a:ext uri="{91240B29-F687-4f45-9708-019B960494DF}">
-                  <a14:hiddenLine xmlns:a14="http://schemas.microsoft.com/office/drawing/2010/main" xmlns="" w="9525">
+                  <a14:hiddenLine xmlns="" xmlns:a14="http://schemas.microsoft.com/office/drawing/2010/main" w="9525">
                     <a:solidFill>
                       <a:srgbClr val="000000"/>
                     </a:solidFill>
@@ -10934,7 +10934,7 @@
               </a:ln>
               <a:extLst>
                 <a:ext uri="{91240B29-F687-4f45-9708-019B960494DF}">
-                  <a14:hiddenLine xmlns:a14="http://schemas.microsoft.com/office/drawing/2010/main" xmlns="" w="9525">
+                  <a14:hiddenLine xmlns="" xmlns:a14="http://schemas.microsoft.com/office/drawing/2010/main" w="9525">
                     <a:solidFill>
                       <a:srgbClr val="000000"/>
                     </a:solidFill>
@@ -10996,7 +10996,7 @@
               </a:ln>
               <a:extLst>
                 <a:ext uri="{91240B29-F687-4f45-9708-019B960494DF}">
-                  <a14:hiddenLine xmlns:a14="http://schemas.microsoft.com/office/drawing/2010/main" xmlns="" w="9525">
+                  <a14:hiddenLine xmlns="" xmlns:a14="http://schemas.microsoft.com/office/drawing/2010/main" w="9525">
                     <a:solidFill>
                       <a:srgbClr val="000000"/>
                     </a:solidFill>
@@ -11086,7 +11086,7 @@
               </a:ln>
               <a:extLst>
                 <a:ext uri="{91240B29-F687-4f45-9708-019B960494DF}">
-                  <a14:hiddenLine xmlns:a14="http://schemas.microsoft.com/office/drawing/2010/main" xmlns="" w="9525">
+                  <a14:hiddenLine xmlns="" xmlns:a14="http://schemas.microsoft.com/office/drawing/2010/main" w="9525">
                     <a:solidFill>
                       <a:srgbClr val="000000"/>
                     </a:solidFill>
@@ -11151,7 +11151,7 @@
               </a:ln>
               <a:extLst>
                 <a:ext uri="{91240B29-F687-4f45-9708-019B960494DF}">
-                  <a14:hiddenLine xmlns:a14="http://schemas.microsoft.com/office/drawing/2010/main" xmlns="" w="9525">
+                  <a14:hiddenLine xmlns="" xmlns:a14="http://schemas.microsoft.com/office/drawing/2010/main" w="9525">
                     <a:solidFill>
                       <a:srgbClr val="000000"/>
                     </a:solidFill>
@@ -11213,7 +11213,7 @@
               </a:ln>
               <a:extLst>
                 <a:ext uri="{91240B29-F687-4f45-9708-019B960494DF}">
-                  <a14:hiddenLine xmlns:a14="http://schemas.microsoft.com/office/drawing/2010/main" xmlns="" w="9525">
+                  <a14:hiddenLine xmlns="" xmlns:a14="http://schemas.microsoft.com/office/drawing/2010/main" w="9525">
                     <a:solidFill>
                       <a:srgbClr val="000000"/>
                     </a:solidFill>
@@ -11303,7 +11303,7 @@
               </a:ln>
               <a:extLst>
                 <a:ext uri="{91240B29-F687-4f45-9708-019B960494DF}">
-                  <a14:hiddenLine xmlns:a14="http://schemas.microsoft.com/office/drawing/2010/main" xmlns="" w="9525">
+                  <a14:hiddenLine xmlns="" xmlns:a14="http://schemas.microsoft.com/office/drawing/2010/main" w="9525">
                     <a:solidFill>
                       <a:srgbClr val="000000"/>
                     </a:solidFill>
@@ -11393,7 +11393,7 @@
               </a:ln>
               <a:extLst>
                 <a:ext uri="{91240B29-F687-4f45-9708-019B960494DF}">
-                  <a14:hiddenLine xmlns:a14="http://schemas.microsoft.com/office/drawing/2010/main" xmlns="" w="9525">
+                  <a14:hiddenLine xmlns="" xmlns:a14="http://schemas.microsoft.com/office/drawing/2010/main" w="9525">
                     <a:solidFill>
                       <a:srgbClr val="000000"/>
                     </a:solidFill>
@@ -11458,7 +11458,7 @@
               </a:ln>
               <a:extLst>
                 <a:ext uri="{91240B29-F687-4f45-9708-019B960494DF}">
-                  <a14:hiddenLine xmlns:a14="http://schemas.microsoft.com/office/drawing/2010/main" xmlns="" w="9525">
+                  <a14:hiddenLine xmlns="" xmlns:a14="http://schemas.microsoft.com/office/drawing/2010/main" w="9525">
                     <a:solidFill>
                       <a:srgbClr val="000000"/>
                     </a:solidFill>
@@ -11578,7 +11578,7 @@
               </a:ln>
               <a:extLst>
                 <a:ext uri="{91240B29-F687-4f45-9708-019B960494DF}">
-                  <a14:hiddenLine xmlns:a14="http://schemas.microsoft.com/office/drawing/2010/main" xmlns="" w="9525">
+                  <a14:hiddenLine xmlns="" xmlns:a14="http://schemas.microsoft.com/office/drawing/2010/main" w="9525">
                     <a:solidFill>
                       <a:srgbClr val="000000"/>
                     </a:solidFill>
@@ -11676,7 +11676,7 @@
               </a:ln>
               <a:extLst>
                 <a:ext uri="{91240B29-F687-4f45-9708-019B960494DF}">
-                  <a14:hiddenLine xmlns:a14="http://schemas.microsoft.com/office/drawing/2010/main" xmlns="" w="9525">
+                  <a14:hiddenLine xmlns="" xmlns:a14="http://schemas.microsoft.com/office/drawing/2010/main" w="9525">
                     <a:solidFill>
                       <a:srgbClr val="000000"/>
                     </a:solidFill>
@@ -11791,7 +11791,7 @@
               </a:ln>
               <a:extLst>
                 <a:ext uri="{91240B29-F687-4f45-9708-019B960494DF}">
-                  <a14:hiddenLine xmlns:a14="http://schemas.microsoft.com/office/drawing/2010/main" xmlns="" w="9525">
+                  <a14:hiddenLine xmlns="" xmlns:a14="http://schemas.microsoft.com/office/drawing/2010/main" w="9525">
                     <a:solidFill>
                       <a:srgbClr val="000000"/>
                     </a:solidFill>
@@ -11881,7 +11881,7 @@
               </a:ln>
               <a:extLst>
                 <a:ext uri="{91240B29-F687-4f45-9708-019B960494DF}">
-                  <a14:hiddenLine xmlns:a14="http://schemas.microsoft.com/office/drawing/2010/main" xmlns="" w="9525">
+                  <a14:hiddenLine xmlns="" xmlns:a14="http://schemas.microsoft.com/office/drawing/2010/main" w="9525">
                     <a:solidFill>
                       <a:srgbClr val="000000"/>
                     </a:solidFill>
@@ -11946,7 +11946,7 @@
               </a:ln>
               <a:extLst>
                 <a:ext uri="{91240B29-F687-4f45-9708-019B960494DF}">
-                  <a14:hiddenLine xmlns:a14="http://schemas.microsoft.com/office/drawing/2010/main" xmlns="" w="9525">
+                  <a14:hiddenLine xmlns="" xmlns:a14="http://schemas.microsoft.com/office/drawing/2010/main" w="9525">
                     <a:solidFill>
                       <a:srgbClr val="000000"/>
                     </a:solidFill>
@@ -12036,7 +12036,7 @@
               </a:ln>
               <a:extLst>
                 <a:ext uri="{91240B29-F687-4f45-9708-019B960494DF}">
-                  <a14:hiddenLine xmlns:a14="http://schemas.microsoft.com/office/drawing/2010/main" xmlns="" w="9525">
+                  <a14:hiddenLine xmlns="" xmlns:a14="http://schemas.microsoft.com/office/drawing/2010/main" w="9525">
                     <a:solidFill>
                       <a:srgbClr val="000000"/>
                     </a:solidFill>
@@ -12104,7 +12104,7 @@
               </a:ln>
               <a:extLst>
                 <a:ext uri="{91240B29-F687-4f45-9708-019B960494DF}">
-                  <a14:hiddenLine xmlns:a14="http://schemas.microsoft.com/office/drawing/2010/main" xmlns="" w="9525">
+                  <a14:hiddenLine xmlns="" xmlns:a14="http://schemas.microsoft.com/office/drawing/2010/main" w="9525">
                     <a:solidFill>
                       <a:srgbClr val="000000"/>
                     </a:solidFill>
@@ -12194,7 +12194,7 @@
               </a:ln>
               <a:extLst>
                 <a:ext uri="{91240B29-F687-4f45-9708-019B960494DF}">
-                  <a14:hiddenLine xmlns:a14="http://schemas.microsoft.com/office/drawing/2010/main" xmlns="" w="9525">
+                  <a14:hiddenLine xmlns="" xmlns:a14="http://schemas.microsoft.com/office/drawing/2010/main" w="9525">
                     <a:solidFill>
                       <a:srgbClr val="000000"/>
                     </a:solidFill>
@@ -12262,7 +12262,7 @@
               </a:ln>
               <a:extLst>
                 <a:ext uri="{91240B29-F687-4f45-9708-019B960494DF}">
-                  <a14:hiddenLine xmlns:a14="http://schemas.microsoft.com/office/drawing/2010/main" xmlns="" w="9525">
+                  <a14:hiddenLine xmlns="" xmlns:a14="http://schemas.microsoft.com/office/drawing/2010/main" w="9525">
                     <a:solidFill>
                       <a:srgbClr val="000000"/>
                     </a:solidFill>
@@ -12352,7 +12352,7 @@
               </a:ln>
               <a:extLst>
                 <a:ext uri="{91240B29-F687-4f45-9708-019B960494DF}">
-                  <a14:hiddenLine xmlns:a14="http://schemas.microsoft.com/office/drawing/2010/main" xmlns="" w="9525">
+                  <a14:hiddenLine xmlns="" xmlns:a14="http://schemas.microsoft.com/office/drawing/2010/main" w="9525">
                     <a:solidFill>
                       <a:srgbClr val="000000"/>
                     </a:solidFill>
@@ -12386,7 +12386,7 @@
               </a:ln>
               <a:extLst>
                 <a:ext uri="{91240B29-F687-4f45-9708-019B960494DF}">
-                  <a14:hiddenLine xmlns:a14="http://schemas.microsoft.com/office/drawing/2010/main" xmlns="" w="9525">
+                  <a14:hiddenLine xmlns="" xmlns:a14="http://schemas.microsoft.com/office/drawing/2010/main" w="9525">
                     <a:solidFill>
                       <a:srgbClr val="000000"/>
                     </a:solidFill>
@@ -12527,7 +12527,7 @@
             <a:pPr rtl="0"/>
             <a:fld id="{6858E5E6-2136-44A9-BD21-5FB6661CE345}" type="datetime1">
               <a:rPr lang="pt-BR" noProof="1" dirty="0" smtClean="0"/>
-              <a:t>02/10/2020</a:t>
+              <a:t>03/10/2020</a:t>
             </a:fld>
             <a:endParaRPr lang="pt-BR" noProof="1"/>
           </a:p>
@@ -13227,39 +13227,6 @@
             </a:r>
           </a:p>
           <a:p>
-            <a:pPr marL="285750" indent="-285750">
-              <a:buFont typeface="Arial" panose="020B0604020202020204" pitchFamily="34" charset="0"/>
-              <a:buChar char="•"/>
-            </a:pPr>
-            <a:r>
-              <a:rPr lang="pt-BR" dirty="0" smtClean="0"/>
-              <a:t>Remoção dos </a:t>
-            </a:r>
-            <a:r>
-              <a:rPr lang="pt-BR" dirty="0" err="1" smtClean="0"/>
-              <a:t>outliers</a:t>
-            </a:r>
-            <a:endParaRPr lang="pt-BR" dirty="0" smtClean="0"/>
-          </a:p>
-          <a:p>
-            <a:pPr marL="285750" indent="-285750">
-              <a:buFont typeface="Arial" panose="020B0604020202020204" pitchFamily="34" charset="0"/>
-              <a:buChar char="•"/>
-            </a:pPr>
-            <a:r>
-              <a:rPr lang="pt-BR" dirty="0" smtClean="0"/>
-              <a:t>Gráficos de tendência</a:t>
-            </a:r>
-          </a:p>
-          <a:p>
-            <a:pPr marL="285750" indent="-285750">
-              <a:buFont typeface="Arial" panose="020B0604020202020204" pitchFamily="34" charset="0"/>
-              <a:buChar char="•"/>
-            </a:pPr>
-            <a:r>
-              <a:rPr lang="pt-BR" dirty="0" err="1" smtClean="0"/>
-              <a:t>Forecasting</a:t>
-            </a:r>
             <a:endParaRPr lang="pt-BR" dirty="0" smtClean="0"/>
           </a:p>
           <a:p>
@@ -13269,15 +13236,38 @@
             </a:pPr>
             <a:endParaRPr lang="pt-BR" dirty="0" smtClean="0"/>
           </a:p>
-          <a:p>
-            <a:pPr marL="285750" indent="-285750">
-              <a:buFont typeface="Arial" panose="020B0604020202020204" pitchFamily="34" charset="0"/>
-              <a:buChar char="•"/>
-            </a:pPr>
-            <a:endParaRPr lang="pt-BR" dirty="0" smtClean="0"/>
-          </a:p>
         </p:txBody>
       </p:sp>
+      <p:pic>
+        <p:nvPicPr>
+          <p:cNvPr id="4" name="Imagem 3"/>
+          <p:cNvPicPr>
+            <a:picLocks noChangeAspect="1"/>
+          </p:cNvPicPr>
+          <p:nvPr/>
+        </p:nvPicPr>
+        <p:blipFill>
+          <a:blip r:embed="rId2">
+            <a:extLst>
+              <a:ext uri="{28A0092B-C50C-407E-A947-70E740481C1C}">
+                <a14:useLocalDpi xmlns:a14="http://schemas.microsoft.com/office/drawing/2010/main" val="0"/>
+              </a:ext>
+            </a:extLst>
+          </a:blip>
+          <a:stretch>
+            <a:fillRect/>
+          </a:stretch>
+        </p:blipFill>
+        <p:spPr>
+          <a:xfrm>
+            <a:off x="4156371" y="3862112"/>
+            <a:ext cx="3887351" cy="2668545"/>
+          </a:xfrm>
+          <a:prstGeom prst="rect">
+            <a:avLst/>
+          </a:prstGeom>
+        </p:spPr>
+      </p:pic>
     </p:spTree>
     <p:extLst>
       <p:ext uri="{BB962C8B-B14F-4D97-AF65-F5344CB8AC3E}">
@@ -15936,14 +15926,6 @@
 </file>
 
 <file path=customXml/item2.xml><?xml version="1.0" encoding="utf-8"?>
-<p:properties xmlns:p="http://schemas.microsoft.com/office/2006/metadata/properties" xmlns:xsi="http://www.w3.org/2001/XMLSchema-instance" xmlns:pc="http://schemas.microsoft.com/office/infopath/2007/PartnerControls">
-  <documentManagement>
-    <MediaServiceKeyPoints xmlns="71af3243-3dd4-4a8d-8c0d-dd76da1f02a5" xsi:nil="true"/>
-  </documentManagement>
-</p:properties>
-</file>
-
-<file path=customXml/item3.xml><?xml version="1.0" encoding="utf-8"?>
 <ct:contentTypeSchema xmlns:ct="http://schemas.microsoft.com/office/2006/metadata/contentType" xmlns:ma="http://schemas.microsoft.com/office/2006/metadata/properties/metaAttributes" ct:_="" ma:_="" ma:contentTypeName="Document" ma:contentTypeID="0x01010079F111ED35F8CC479449609E8A0923A6" ma:contentTypeVersion="11" ma:contentTypeDescription="Create a new document." ma:contentTypeScope="" ma:versionID="9677210f24a1be23c92c90fd886aa0aa">
   <xsd:schema xmlns:xsd="http://www.w3.org/2001/XMLSchema" xmlns:xs="http://www.w3.org/2001/XMLSchema" xmlns:p="http://schemas.microsoft.com/office/2006/metadata/properties" xmlns:ns2="71af3243-3dd4-4a8d-8c0d-dd76da1f02a5" xmlns:ns3="16c05727-aa75-4e4a-9b5f-8a80a1165891" targetNamespace="http://schemas.microsoft.com/office/2006/metadata/properties" ma:root="true" ma:fieldsID="60e05723c5c1908df1a1a4ebf11d344e" ns2:_="" ns3:_="">
     <xsd:import namespace="71af3243-3dd4-4a8d-8c0d-dd76da1f02a5"/>
@@ -16154,6 +16136,14 @@
 </ct:contentTypeSchema>
 </file>
 
+<file path=customXml/item3.xml><?xml version="1.0" encoding="utf-8"?>
+<p:properties xmlns:p="http://schemas.microsoft.com/office/2006/metadata/properties" xmlns:xsi="http://www.w3.org/2001/XMLSchema-instance" xmlns:pc="http://schemas.microsoft.com/office/infopath/2007/PartnerControls">
+  <documentManagement>
+    <MediaServiceKeyPoints xmlns="71af3243-3dd4-4a8d-8c0d-dd76da1f02a5" xsi:nil="true"/>
+  </documentManagement>
+</p:properties>
+</file>
+
 <file path=customXml/itemProps1.xml><?xml version="1.0" encoding="utf-8"?>
 <ds:datastoreItem xmlns:ds="http://schemas.openxmlformats.org/officeDocument/2006/customXml" ds:itemID="{E096F0E7-E7B5-406E-8E94-F0043B2AC7F6}">
   <ds:schemaRefs>
@@ -16163,23 +16153,6 @@
 </file>
 
 <file path=customXml/itemProps2.xml><?xml version="1.0" encoding="utf-8"?>
-<ds:datastoreItem xmlns:ds="http://schemas.openxmlformats.org/officeDocument/2006/customXml" ds:itemID="{AC41CBB0-BAA0-4983-8F2B-E10AF3358DA8}">
-  <ds:schemaRefs>
-    <ds:schemaRef ds:uri="http://schemas.microsoft.com/office/2006/documentManagement/types"/>
-    <ds:schemaRef ds:uri="http://schemas.openxmlformats.org/package/2006/metadata/core-properties"/>
-    <ds:schemaRef ds:uri="16c05727-aa75-4e4a-9b5f-8a80a1165891"/>
-    <ds:schemaRef ds:uri="http://purl.org/dc/elements/1.1/"/>
-    <ds:schemaRef ds:uri="http://schemas.microsoft.com/office/2006/metadata/properties"/>
-    <ds:schemaRef ds:uri="http://purl.org/dc/terms/"/>
-    <ds:schemaRef ds:uri="http://schemas.microsoft.com/office/infopath/2007/PartnerControls"/>
-    <ds:schemaRef ds:uri="71af3243-3dd4-4a8d-8c0d-dd76da1f02a5"/>
-    <ds:schemaRef ds:uri="http://www.w3.org/XML/1998/namespace"/>
-    <ds:schemaRef ds:uri="http://purl.org/dc/dcmitype/"/>
-  </ds:schemaRefs>
-</ds:datastoreItem>
-</file>
-
-<file path=customXml/itemProps3.xml><?xml version="1.0" encoding="utf-8"?>
 <ds:datastoreItem xmlns:ds="http://schemas.openxmlformats.org/officeDocument/2006/customXml" ds:itemID="{104C6BCC-A38B-4625-90E6-7D3BBA3909AE}">
   <ds:schemaRefs>
     <ds:schemaRef ds:uri="http://schemas.microsoft.com/office/2006/metadata/contentType"/>
@@ -16196,4 +16169,21 @@
     <ds:schemaRef ds:uri="http://schemas.microsoft.com/internal/obd"/>
   </ds:schemaRefs>
 </ds:datastoreItem>
+</file>
+
+<file path=customXml/itemProps3.xml><?xml version="1.0" encoding="utf-8"?>
+<ds:datastoreItem xmlns:ds="http://schemas.openxmlformats.org/officeDocument/2006/customXml" ds:itemID="{AC41CBB0-BAA0-4983-8F2B-E10AF3358DA8}">
+  <ds:schemaRefs>
+    <ds:schemaRef ds:uri="http://schemas.microsoft.com/office/2006/documentManagement/types"/>
+    <ds:schemaRef ds:uri="http://schemas.openxmlformats.org/package/2006/metadata/core-properties"/>
+    <ds:schemaRef ds:uri="16c05727-aa75-4e4a-9b5f-8a80a1165891"/>
+    <ds:schemaRef ds:uri="http://purl.org/dc/elements/1.1/"/>
+    <ds:schemaRef ds:uri="http://schemas.microsoft.com/office/2006/metadata/properties"/>
+    <ds:schemaRef ds:uri="http://purl.org/dc/terms/"/>
+    <ds:schemaRef ds:uri="http://schemas.microsoft.com/office/infopath/2007/PartnerControls"/>
+    <ds:schemaRef ds:uri="71af3243-3dd4-4a8d-8c0d-dd76da1f02a5"/>
+    <ds:schemaRef ds:uri="http://www.w3.org/XML/1998/namespace"/>
+    <ds:schemaRef ds:uri="http://purl.org/dc/dcmitype/"/>
+  </ds:schemaRefs>
+</ds:datastoreItem>
 </file>
</xml_diff>

<commit_message>
Edit slide that has ts dataframe
</commit_message>
<xml_diff>
--- a/apresentacao/Apresentacao.pptx
+++ b/apresentacao/Apresentacao.pptx
@@ -709,7 +709,7 @@
           <a:noFill/>
           <a:extLst>
             <a:ext uri="{909E8E84-426E-40dd-AFC4-6F175D3DCCD1}">
-              <a14:hiddenFill xmlns="" xmlns:a14="http://schemas.microsoft.com/office/drawing/2010/main">
+              <a14:hiddenFill xmlns:a14="http://schemas.microsoft.com/office/drawing/2010/main" xmlns="">
                 <a:solidFill>
                   <a:srgbClr val="FFFFFF"/>
                 </a:solidFill>
@@ -769,7 +769,7 @@
             </a:ln>
             <a:extLst>
               <a:ext uri="{91240B29-F687-4f45-9708-019B960494DF}">
-                <a14:hiddenLine xmlns="" xmlns:a14="http://schemas.microsoft.com/office/drawing/2010/main" w="9525">
+                <a14:hiddenLine xmlns:a14="http://schemas.microsoft.com/office/drawing/2010/main" xmlns="" w="9525">
                   <a:solidFill>
                     <a:srgbClr val="000000"/>
                   </a:solidFill>
@@ -859,7 +859,7 @@
             </a:ln>
             <a:extLst>
               <a:ext uri="{91240B29-F687-4f45-9708-019B960494DF}">
-                <a14:hiddenLine xmlns="" xmlns:a14="http://schemas.microsoft.com/office/drawing/2010/main" w="9525">
+                <a14:hiddenLine xmlns:a14="http://schemas.microsoft.com/office/drawing/2010/main" xmlns="" w="9525">
                   <a:solidFill>
                     <a:srgbClr val="000000"/>
                   </a:solidFill>
@@ -949,7 +949,7 @@
             </a:ln>
             <a:extLst>
               <a:ext uri="{91240B29-F687-4f45-9708-019B960494DF}">
-                <a14:hiddenLine xmlns="" xmlns:a14="http://schemas.microsoft.com/office/drawing/2010/main" w="9525">
+                <a14:hiddenLine xmlns:a14="http://schemas.microsoft.com/office/drawing/2010/main" xmlns="" w="9525">
                   <a:solidFill>
                     <a:srgbClr val="000000"/>
                   </a:solidFill>
@@ -983,7 +983,7 @@
             </a:ln>
             <a:extLst>
               <a:ext uri="{91240B29-F687-4f45-9708-019B960494DF}">
-                <a14:hiddenLine xmlns="" xmlns:a14="http://schemas.microsoft.com/office/drawing/2010/main" w="9525">
+                <a14:hiddenLine xmlns:a14="http://schemas.microsoft.com/office/drawing/2010/main" xmlns="" w="9525">
                   <a:solidFill>
                     <a:srgbClr val="000000"/>
                   </a:solidFill>
@@ -1073,7 +1073,7 @@
             </a:ln>
             <a:extLst>
               <a:ext uri="{91240B29-F687-4f45-9708-019B960494DF}">
-                <a14:hiddenLine xmlns="" xmlns:a14="http://schemas.microsoft.com/office/drawing/2010/main" w="9525">
+                <a14:hiddenLine xmlns:a14="http://schemas.microsoft.com/office/drawing/2010/main" xmlns="" w="9525">
                   <a:solidFill>
                     <a:srgbClr val="000000"/>
                   </a:solidFill>
@@ -1135,7 +1135,7 @@
             </a:ln>
             <a:extLst>
               <a:ext uri="{91240B29-F687-4f45-9708-019B960494DF}">
-                <a14:hiddenLine xmlns="" xmlns:a14="http://schemas.microsoft.com/office/drawing/2010/main" w="9525">
+                <a14:hiddenLine xmlns:a14="http://schemas.microsoft.com/office/drawing/2010/main" xmlns="" w="9525">
                   <a:solidFill>
                     <a:srgbClr val="000000"/>
                   </a:solidFill>
@@ -1197,7 +1197,7 @@
             </a:ln>
             <a:extLst>
               <a:ext uri="{91240B29-F687-4f45-9708-019B960494DF}">
-                <a14:hiddenLine xmlns="" xmlns:a14="http://schemas.microsoft.com/office/drawing/2010/main" w="9525">
+                <a14:hiddenLine xmlns:a14="http://schemas.microsoft.com/office/drawing/2010/main" xmlns="" w="9525">
                   <a:solidFill>
                     <a:srgbClr val="000000"/>
                   </a:solidFill>
@@ -1287,7 +1287,7 @@
             </a:ln>
             <a:extLst>
               <a:ext uri="{91240B29-F687-4f45-9708-019B960494DF}">
-                <a14:hiddenLine xmlns="" xmlns:a14="http://schemas.microsoft.com/office/drawing/2010/main" w="9525">
+                <a14:hiddenLine xmlns:a14="http://schemas.microsoft.com/office/drawing/2010/main" xmlns="" w="9525">
                   <a:solidFill>
                     <a:srgbClr val="000000"/>
                   </a:solidFill>
@@ -1349,7 +1349,7 @@
             </a:ln>
             <a:extLst>
               <a:ext uri="{91240B29-F687-4f45-9708-019B960494DF}">
-                <a14:hiddenLine xmlns="" xmlns:a14="http://schemas.microsoft.com/office/drawing/2010/main" w="9525">
+                <a14:hiddenLine xmlns:a14="http://schemas.microsoft.com/office/drawing/2010/main" xmlns="" w="9525">
                   <a:solidFill>
                     <a:srgbClr val="000000"/>
                   </a:solidFill>
@@ -1411,7 +1411,7 @@
             </a:ln>
             <a:extLst>
               <a:ext uri="{91240B29-F687-4f45-9708-019B960494DF}">
-                <a14:hiddenLine xmlns="" xmlns:a14="http://schemas.microsoft.com/office/drawing/2010/main" w="9525">
+                <a14:hiddenLine xmlns:a14="http://schemas.microsoft.com/office/drawing/2010/main" xmlns="" w="9525">
                   <a:solidFill>
                     <a:srgbClr val="000000"/>
                   </a:solidFill>
@@ -1501,7 +1501,7 @@
             </a:ln>
             <a:extLst>
               <a:ext uri="{91240B29-F687-4f45-9708-019B960494DF}">
-                <a14:hiddenLine xmlns="" xmlns:a14="http://schemas.microsoft.com/office/drawing/2010/main" w="9525">
+                <a14:hiddenLine xmlns:a14="http://schemas.microsoft.com/office/drawing/2010/main" xmlns="" w="9525">
                   <a:solidFill>
                     <a:srgbClr val="000000"/>
                   </a:solidFill>
@@ -1591,7 +1591,7 @@
             </a:ln>
             <a:extLst>
               <a:ext uri="{91240B29-F687-4f45-9708-019B960494DF}">
-                <a14:hiddenLine xmlns="" xmlns:a14="http://schemas.microsoft.com/office/drawing/2010/main" w="9525">
+                <a14:hiddenLine xmlns:a14="http://schemas.microsoft.com/office/drawing/2010/main" xmlns="" w="9525">
                   <a:solidFill>
                     <a:srgbClr val="000000"/>
                   </a:solidFill>
@@ -1653,7 +1653,7 @@
             </a:ln>
             <a:extLst>
               <a:ext uri="{91240B29-F687-4f45-9708-019B960494DF}">
-                <a14:hiddenLine xmlns="" xmlns:a14="http://schemas.microsoft.com/office/drawing/2010/main" w="9525">
+                <a14:hiddenLine xmlns:a14="http://schemas.microsoft.com/office/drawing/2010/main" xmlns="" w="9525">
                   <a:solidFill>
                     <a:srgbClr val="000000"/>
                   </a:solidFill>
@@ -1763,7 +1763,7 @@
             </a:ln>
             <a:extLst>
               <a:ext uri="{91240B29-F687-4f45-9708-019B960494DF}">
-                <a14:hiddenLine xmlns="" xmlns:a14="http://schemas.microsoft.com/office/drawing/2010/main" w="9525">
+                <a14:hiddenLine xmlns:a14="http://schemas.microsoft.com/office/drawing/2010/main" xmlns="" w="9525">
                   <a:solidFill>
                     <a:srgbClr val="000000"/>
                   </a:solidFill>
@@ -1825,7 +1825,7 @@
             </a:ln>
             <a:extLst>
               <a:ext uri="{91240B29-F687-4f45-9708-019B960494DF}">
-                <a14:hiddenLine xmlns="" xmlns:a14="http://schemas.microsoft.com/office/drawing/2010/main" w="9525">
+                <a14:hiddenLine xmlns:a14="http://schemas.microsoft.com/office/drawing/2010/main" xmlns="" w="9525">
                   <a:solidFill>
                     <a:srgbClr val="000000"/>
                   </a:solidFill>
@@ -1915,7 +1915,7 @@
             </a:ln>
             <a:extLst>
               <a:ext uri="{91240B29-F687-4f45-9708-019B960494DF}">
-                <a14:hiddenLine xmlns="" xmlns:a14="http://schemas.microsoft.com/office/drawing/2010/main" w="9525">
+                <a14:hiddenLine xmlns:a14="http://schemas.microsoft.com/office/drawing/2010/main" xmlns="" w="9525">
                   <a:solidFill>
                     <a:srgbClr val="000000"/>
                   </a:solidFill>
@@ -2005,7 +2005,7 @@
             </a:ln>
             <a:extLst>
               <a:ext uri="{91240B29-F687-4f45-9708-019B960494DF}">
-                <a14:hiddenLine xmlns="" xmlns:a14="http://schemas.microsoft.com/office/drawing/2010/main" w="9525">
+                <a14:hiddenLine xmlns:a14="http://schemas.microsoft.com/office/drawing/2010/main" xmlns="" w="9525">
                   <a:solidFill>
                     <a:srgbClr val="000000"/>
                   </a:solidFill>
@@ -2067,7 +2067,7 @@
             </a:ln>
             <a:extLst>
               <a:ext uri="{91240B29-F687-4f45-9708-019B960494DF}">
-                <a14:hiddenLine xmlns="" xmlns:a14="http://schemas.microsoft.com/office/drawing/2010/main" w="9525">
+                <a14:hiddenLine xmlns:a14="http://schemas.microsoft.com/office/drawing/2010/main" xmlns="" w="9525">
                   <a:solidFill>
                     <a:srgbClr val="000000"/>
                   </a:solidFill>
@@ -2157,7 +2157,7 @@
             </a:ln>
             <a:extLst>
               <a:ext uri="{91240B29-F687-4f45-9708-019B960494DF}">
-                <a14:hiddenLine xmlns="" xmlns:a14="http://schemas.microsoft.com/office/drawing/2010/main" w="9525">
+                <a14:hiddenLine xmlns:a14="http://schemas.microsoft.com/office/drawing/2010/main" xmlns="" w="9525">
                   <a:solidFill>
                     <a:srgbClr val="000000"/>
                   </a:solidFill>
@@ -2247,7 +2247,7 @@
             </a:ln>
             <a:extLst>
               <a:ext uri="{91240B29-F687-4f45-9708-019B960494DF}">
-                <a14:hiddenLine xmlns="" xmlns:a14="http://schemas.microsoft.com/office/drawing/2010/main" w="9525">
+                <a14:hiddenLine xmlns:a14="http://schemas.microsoft.com/office/drawing/2010/main" xmlns="" w="9525">
                   <a:solidFill>
                     <a:srgbClr val="000000"/>
                   </a:solidFill>
@@ -2303,7 +2303,7 @@
             </a:ln>
             <a:extLst>
               <a:ext uri="{91240B29-F687-4f45-9708-019B960494DF}">
-                <a14:hiddenLine xmlns="" xmlns:a14="http://schemas.microsoft.com/office/drawing/2010/main" w="9525">
+                <a14:hiddenLine xmlns:a14="http://schemas.microsoft.com/office/drawing/2010/main" xmlns="" w="9525">
                   <a:solidFill>
                     <a:srgbClr val="000000"/>
                   </a:solidFill>
@@ -2393,7 +2393,7 @@
             </a:ln>
             <a:extLst>
               <a:ext uri="{91240B29-F687-4f45-9708-019B960494DF}">
-                <a14:hiddenLine xmlns="" xmlns:a14="http://schemas.microsoft.com/office/drawing/2010/main" w="9525">
+                <a14:hiddenLine xmlns:a14="http://schemas.microsoft.com/office/drawing/2010/main" xmlns="" w="9525">
                   <a:solidFill>
                     <a:srgbClr val="000000"/>
                   </a:solidFill>
@@ -2449,7 +2449,7 @@
             </a:ln>
             <a:extLst>
               <a:ext uri="{91240B29-F687-4f45-9708-019B960494DF}">
-                <a14:hiddenLine xmlns="" xmlns:a14="http://schemas.microsoft.com/office/drawing/2010/main" w="9525">
+                <a14:hiddenLine xmlns:a14="http://schemas.microsoft.com/office/drawing/2010/main" xmlns="" w="9525">
                   <a:solidFill>
                     <a:srgbClr val="000000"/>
                   </a:solidFill>
@@ -2539,7 +2539,7 @@
             </a:ln>
             <a:extLst>
               <a:ext uri="{91240B29-F687-4f45-9708-019B960494DF}">
-                <a14:hiddenLine xmlns="" xmlns:a14="http://schemas.microsoft.com/office/drawing/2010/main" w="9525">
+                <a14:hiddenLine xmlns:a14="http://schemas.microsoft.com/office/drawing/2010/main" xmlns="" w="9525">
                   <a:solidFill>
                     <a:srgbClr val="000000"/>
                   </a:solidFill>
@@ -2607,7 +2607,7 @@
             </a:ln>
             <a:extLst>
               <a:ext uri="{91240B29-F687-4f45-9708-019B960494DF}">
-                <a14:hiddenLine xmlns="" xmlns:a14="http://schemas.microsoft.com/office/drawing/2010/main" w="9525">
+                <a14:hiddenLine xmlns:a14="http://schemas.microsoft.com/office/drawing/2010/main" xmlns="" w="9525">
                   <a:solidFill>
                     <a:srgbClr val="000000"/>
                   </a:solidFill>
@@ -2697,7 +2697,7 @@
             </a:ln>
             <a:extLst>
               <a:ext uri="{91240B29-F687-4f45-9708-019B960494DF}">
-                <a14:hiddenLine xmlns="" xmlns:a14="http://schemas.microsoft.com/office/drawing/2010/main" w="9525">
+                <a14:hiddenLine xmlns:a14="http://schemas.microsoft.com/office/drawing/2010/main" xmlns="" w="9525">
                   <a:solidFill>
                     <a:srgbClr val="000000"/>
                   </a:solidFill>
@@ -2765,7 +2765,7 @@
             </a:ln>
             <a:extLst>
               <a:ext uri="{91240B29-F687-4f45-9708-019B960494DF}">
-                <a14:hiddenLine xmlns="" xmlns:a14="http://schemas.microsoft.com/office/drawing/2010/main" w="9525">
+                <a14:hiddenLine xmlns:a14="http://schemas.microsoft.com/office/drawing/2010/main" xmlns="" w="9525">
                   <a:solidFill>
                     <a:srgbClr val="000000"/>
                   </a:solidFill>
@@ -2855,7 +2855,7 @@
             </a:ln>
             <a:extLst>
               <a:ext uri="{91240B29-F687-4f45-9708-019B960494DF}">
-                <a14:hiddenLine xmlns="" xmlns:a14="http://schemas.microsoft.com/office/drawing/2010/main" w="9525">
+                <a14:hiddenLine xmlns:a14="http://schemas.microsoft.com/office/drawing/2010/main" xmlns="" w="9525">
                   <a:solidFill>
                     <a:srgbClr val="000000"/>
                   </a:solidFill>
@@ -2889,7 +2889,7 @@
             </a:ln>
             <a:extLst>
               <a:ext uri="{91240B29-F687-4f45-9708-019B960494DF}">
-                <a14:hiddenLine xmlns="" xmlns:a14="http://schemas.microsoft.com/office/drawing/2010/main" w="9525">
+                <a14:hiddenLine xmlns:a14="http://schemas.microsoft.com/office/drawing/2010/main" xmlns="" w="9525">
                   <a:solidFill>
                     <a:srgbClr val="000000"/>
                   </a:solidFill>
@@ -2979,7 +2979,7 @@
             </a:ln>
             <a:extLst>
               <a:ext uri="{91240B29-F687-4f45-9708-019B960494DF}">
-                <a14:hiddenLine xmlns="" xmlns:a14="http://schemas.microsoft.com/office/drawing/2010/main" w="9525">
+                <a14:hiddenLine xmlns:a14="http://schemas.microsoft.com/office/drawing/2010/main" xmlns="" w="9525">
                   <a:solidFill>
                     <a:srgbClr val="000000"/>
                   </a:solidFill>
@@ -3041,7 +3041,7 @@
             </a:ln>
             <a:extLst>
               <a:ext uri="{91240B29-F687-4f45-9708-019B960494DF}">
-                <a14:hiddenLine xmlns="" xmlns:a14="http://schemas.microsoft.com/office/drawing/2010/main" w="9525">
+                <a14:hiddenLine xmlns:a14="http://schemas.microsoft.com/office/drawing/2010/main" xmlns="" w="9525">
                   <a:solidFill>
                     <a:srgbClr val="000000"/>
                   </a:solidFill>
@@ -3103,7 +3103,7 @@
             </a:ln>
             <a:extLst>
               <a:ext uri="{91240B29-F687-4f45-9708-019B960494DF}">
-                <a14:hiddenLine xmlns="" xmlns:a14="http://schemas.microsoft.com/office/drawing/2010/main" w="9525">
+                <a14:hiddenLine xmlns:a14="http://schemas.microsoft.com/office/drawing/2010/main" xmlns="" w="9525">
                   <a:solidFill>
                     <a:srgbClr val="000000"/>
                   </a:solidFill>
@@ -3193,7 +3193,7 @@
             </a:ln>
             <a:extLst>
               <a:ext uri="{91240B29-F687-4f45-9708-019B960494DF}">
-                <a14:hiddenLine xmlns="" xmlns:a14="http://schemas.microsoft.com/office/drawing/2010/main" w="9525">
+                <a14:hiddenLine xmlns:a14="http://schemas.microsoft.com/office/drawing/2010/main" xmlns="" w="9525">
                   <a:solidFill>
                     <a:srgbClr val="000000"/>
                   </a:solidFill>
@@ -3261,7 +3261,7 @@
             </a:ln>
             <a:extLst>
               <a:ext uri="{91240B29-F687-4f45-9708-019B960494DF}">
-                <a14:hiddenLine xmlns="" xmlns:a14="http://schemas.microsoft.com/office/drawing/2010/main" w="9525">
+                <a14:hiddenLine xmlns:a14="http://schemas.microsoft.com/office/drawing/2010/main" xmlns="" w="9525">
                   <a:solidFill>
                     <a:srgbClr val="000000"/>
                   </a:solidFill>
@@ -3323,7 +3323,7 @@
             </a:ln>
             <a:extLst>
               <a:ext uri="{91240B29-F687-4f45-9708-019B960494DF}">
-                <a14:hiddenLine xmlns="" xmlns:a14="http://schemas.microsoft.com/office/drawing/2010/main" w="9525">
+                <a14:hiddenLine xmlns:a14="http://schemas.microsoft.com/office/drawing/2010/main" xmlns="" w="9525">
                   <a:solidFill>
                     <a:srgbClr val="000000"/>
                   </a:solidFill>
@@ -3413,7 +3413,7 @@
             </a:ln>
             <a:extLst>
               <a:ext uri="{91240B29-F687-4f45-9708-019B960494DF}">
-                <a14:hiddenLine xmlns="" xmlns:a14="http://schemas.microsoft.com/office/drawing/2010/main" w="9525">
+                <a14:hiddenLine xmlns:a14="http://schemas.microsoft.com/office/drawing/2010/main" xmlns="" w="9525">
                   <a:solidFill>
                     <a:srgbClr val="000000"/>
                   </a:solidFill>
@@ -3475,7 +3475,7 @@
             </a:ln>
             <a:extLst>
               <a:ext uri="{91240B29-F687-4f45-9708-019B960494DF}">
-                <a14:hiddenLine xmlns="" xmlns:a14="http://schemas.microsoft.com/office/drawing/2010/main" w="9525">
+                <a14:hiddenLine xmlns:a14="http://schemas.microsoft.com/office/drawing/2010/main" xmlns="" w="9525">
                   <a:solidFill>
                     <a:srgbClr val="000000"/>
                   </a:solidFill>
@@ -3565,7 +3565,7 @@
             </a:ln>
             <a:extLst>
               <a:ext uri="{91240B29-F687-4f45-9708-019B960494DF}">
-                <a14:hiddenLine xmlns="" xmlns:a14="http://schemas.microsoft.com/office/drawing/2010/main" w="9525">
+                <a14:hiddenLine xmlns:a14="http://schemas.microsoft.com/office/drawing/2010/main" xmlns="" w="9525">
                   <a:solidFill>
                     <a:srgbClr val="000000"/>
                   </a:solidFill>
@@ -3627,7 +3627,7 @@
             </a:ln>
             <a:extLst>
               <a:ext uri="{91240B29-F687-4f45-9708-019B960494DF}">
-                <a14:hiddenLine xmlns="" xmlns:a14="http://schemas.microsoft.com/office/drawing/2010/main" w="9525">
+                <a14:hiddenLine xmlns:a14="http://schemas.microsoft.com/office/drawing/2010/main" xmlns="" w="9525">
                   <a:solidFill>
                     <a:srgbClr val="000000"/>
                   </a:solidFill>
@@ -3717,7 +3717,7 @@
             </a:ln>
             <a:extLst>
               <a:ext uri="{91240B29-F687-4f45-9708-019B960494DF}">
-                <a14:hiddenLine xmlns="" xmlns:a14="http://schemas.microsoft.com/office/drawing/2010/main" w="9525">
+                <a14:hiddenLine xmlns:a14="http://schemas.microsoft.com/office/drawing/2010/main" xmlns="" w="9525">
                   <a:solidFill>
                     <a:srgbClr val="000000"/>
                   </a:solidFill>
@@ -3751,7 +3751,7 @@
             </a:ln>
             <a:extLst>
               <a:ext uri="{91240B29-F687-4f45-9708-019B960494DF}">
-                <a14:hiddenLine xmlns="" xmlns:a14="http://schemas.microsoft.com/office/drawing/2010/main" w="9525">
+                <a14:hiddenLine xmlns:a14="http://schemas.microsoft.com/office/drawing/2010/main" xmlns="" w="9525">
                   <a:solidFill>
                     <a:srgbClr val="000000"/>
                   </a:solidFill>
@@ -3816,7 +3816,7 @@
             </a:ln>
             <a:extLst>
               <a:ext uri="{91240B29-F687-4f45-9708-019B960494DF}">
-                <a14:hiddenLine xmlns="" xmlns:a14="http://schemas.microsoft.com/office/drawing/2010/main" w="9525">
+                <a14:hiddenLine xmlns:a14="http://schemas.microsoft.com/office/drawing/2010/main" xmlns="" w="9525">
                   <a:solidFill>
                     <a:srgbClr val="000000"/>
                   </a:solidFill>
@@ -3906,7 +3906,7 @@
             </a:ln>
             <a:extLst>
               <a:ext uri="{91240B29-F687-4f45-9708-019B960494DF}">
-                <a14:hiddenLine xmlns="" xmlns:a14="http://schemas.microsoft.com/office/drawing/2010/main" w="9525">
+                <a14:hiddenLine xmlns:a14="http://schemas.microsoft.com/office/drawing/2010/main" xmlns="" w="9525">
                   <a:solidFill>
                     <a:srgbClr val="000000"/>
                   </a:solidFill>
@@ -3968,7 +3968,7 @@
             </a:ln>
             <a:extLst>
               <a:ext uri="{91240B29-F687-4f45-9708-019B960494DF}">
-                <a14:hiddenLine xmlns="" xmlns:a14="http://schemas.microsoft.com/office/drawing/2010/main" w="9525">
+                <a14:hiddenLine xmlns:a14="http://schemas.microsoft.com/office/drawing/2010/main" xmlns="" w="9525">
                   <a:solidFill>
                     <a:srgbClr val="000000"/>
                   </a:solidFill>
@@ -4058,7 +4058,7 @@
             </a:ln>
             <a:extLst>
               <a:ext uri="{91240B29-F687-4f45-9708-019B960494DF}">
-                <a14:hiddenLine xmlns="" xmlns:a14="http://schemas.microsoft.com/office/drawing/2010/main" w="9525">
+                <a14:hiddenLine xmlns:a14="http://schemas.microsoft.com/office/drawing/2010/main" xmlns="" w="9525">
                   <a:solidFill>
                     <a:srgbClr val="000000"/>
                   </a:solidFill>
@@ -4148,7 +4148,7 @@
             </a:ln>
             <a:extLst>
               <a:ext uri="{91240B29-F687-4f45-9708-019B960494DF}">
-                <a14:hiddenLine xmlns="" xmlns:a14="http://schemas.microsoft.com/office/drawing/2010/main" w="9525">
+                <a14:hiddenLine xmlns:a14="http://schemas.microsoft.com/office/drawing/2010/main" xmlns="" w="9525">
                   <a:solidFill>
                     <a:srgbClr val="000000"/>
                   </a:solidFill>
@@ -4213,7 +4213,7 @@
             </a:ln>
             <a:extLst>
               <a:ext uri="{91240B29-F687-4f45-9708-019B960494DF}">
-                <a14:hiddenLine xmlns="" xmlns:a14="http://schemas.microsoft.com/office/drawing/2010/main" w="9525">
+                <a14:hiddenLine xmlns:a14="http://schemas.microsoft.com/office/drawing/2010/main" xmlns="" w="9525">
                   <a:solidFill>
                     <a:srgbClr val="000000"/>
                   </a:solidFill>
@@ -4275,7 +4275,7 @@
             </a:ln>
             <a:extLst>
               <a:ext uri="{91240B29-F687-4f45-9708-019B960494DF}">
-                <a14:hiddenLine xmlns="" xmlns:a14="http://schemas.microsoft.com/office/drawing/2010/main" w="9525">
+                <a14:hiddenLine xmlns:a14="http://schemas.microsoft.com/office/drawing/2010/main" xmlns="" w="9525">
                   <a:solidFill>
                     <a:srgbClr val="000000"/>
                   </a:solidFill>
@@ -4365,7 +4365,7 @@
             </a:ln>
             <a:extLst>
               <a:ext uri="{91240B29-F687-4f45-9708-019B960494DF}">
-                <a14:hiddenLine xmlns="" xmlns:a14="http://schemas.microsoft.com/office/drawing/2010/main" w="9525">
+                <a14:hiddenLine xmlns:a14="http://schemas.microsoft.com/office/drawing/2010/main" xmlns="" w="9525">
                   <a:solidFill>
                     <a:srgbClr val="000000"/>
                   </a:solidFill>
@@ -4455,7 +4455,7 @@
             </a:ln>
             <a:extLst>
               <a:ext uri="{91240B29-F687-4f45-9708-019B960494DF}">
-                <a14:hiddenLine xmlns="" xmlns:a14="http://schemas.microsoft.com/office/drawing/2010/main" w="9525">
+                <a14:hiddenLine xmlns:a14="http://schemas.microsoft.com/office/drawing/2010/main" xmlns="" w="9525">
                   <a:solidFill>
                     <a:srgbClr val="000000"/>
                   </a:solidFill>
@@ -4517,7 +4517,7 @@
             </a:ln>
             <a:extLst>
               <a:ext uri="{91240B29-F687-4f45-9708-019B960494DF}">
-                <a14:hiddenLine xmlns="" xmlns:a14="http://schemas.microsoft.com/office/drawing/2010/main" w="9525">
+                <a14:hiddenLine xmlns:a14="http://schemas.microsoft.com/office/drawing/2010/main" xmlns="" w="9525">
                   <a:solidFill>
                     <a:srgbClr val="000000"/>
                   </a:solidFill>
@@ -4637,7 +4637,7 @@
             </a:ln>
             <a:extLst>
               <a:ext uri="{91240B29-F687-4f45-9708-019B960494DF}">
-                <a14:hiddenLine xmlns="" xmlns:a14="http://schemas.microsoft.com/office/drawing/2010/main" w="9525">
+                <a14:hiddenLine xmlns:a14="http://schemas.microsoft.com/office/drawing/2010/main" xmlns="" w="9525">
                   <a:solidFill>
                     <a:srgbClr val="000000"/>
                   </a:solidFill>
@@ -4705,7 +4705,7 @@
             </a:ln>
             <a:extLst>
               <a:ext uri="{91240B29-F687-4f45-9708-019B960494DF}">
-                <a14:hiddenLine xmlns="" xmlns:a14="http://schemas.microsoft.com/office/drawing/2010/main" w="9525">
+                <a14:hiddenLine xmlns:a14="http://schemas.microsoft.com/office/drawing/2010/main" xmlns="" w="9525">
                   <a:solidFill>
                     <a:srgbClr val="000000"/>
                   </a:solidFill>
@@ -4795,7 +4795,7 @@
             </a:ln>
             <a:extLst>
               <a:ext uri="{91240B29-F687-4f45-9708-019B960494DF}">
-                <a14:hiddenLine xmlns="" xmlns:a14="http://schemas.microsoft.com/office/drawing/2010/main" w="9525">
+                <a14:hiddenLine xmlns:a14="http://schemas.microsoft.com/office/drawing/2010/main" xmlns="" w="9525">
                   <a:solidFill>
                     <a:srgbClr val="000000"/>
                   </a:solidFill>
@@ -9565,7 +9565,7 @@
           <a:noFill/>
           <a:extLst>
             <a:ext uri="{909E8E84-426E-40dd-AFC4-6F175D3DCCD1}">
-              <a14:hiddenFill xmlns="" xmlns:a14="http://schemas.microsoft.com/office/drawing/2010/main">
+              <a14:hiddenFill xmlns:a14="http://schemas.microsoft.com/office/drawing/2010/main" xmlns="">
                 <a:solidFill>
                   <a:srgbClr val="FFFFFF"/>
                 </a:solidFill>
@@ -9639,7 +9639,7 @@
               </a:ln>
               <a:extLst>
                 <a:ext uri="{91240B29-F687-4f45-9708-019B960494DF}">
-                  <a14:hiddenLine xmlns="" xmlns:a14="http://schemas.microsoft.com/office/drawing/2010/main" w="9525">
+                  <a14:hiddenLine xmlns:a14="http://schemas.microsoft.com/office/drawing/2010/main" xmlns="" w="9525">
                     <a:solidFill>
                       <a:srgbClr val="000000"/>
                     </a:solidFill>
@@ -9729,7 +9729,7 @@
               </a:ln>
               <a:extLst>
                 <a:ext uri="{91240B29-F687-4f45-9708-019B960494DF}">
-                  <a14:hiddenLine xmlns="" xmlns:a14="http://schemas.microsoft.com/office/drawing/2010/main" w="9525">
+                  <a14:hiddenLine xmlns:a14="http://schemas.microsoft.com/office/drawing/2010/main" xmlns="" w="9525">
                     <a:solidFill>
                       <a:srgbClr val="000000"/>
                     </a:solidFill>
@@ -9819,7 +9819,7 @@
               </a:ln>
               <a:extLst>
                 <a:ext uri="{91240B29-F687-4f45-9708-019B960494DF}">
-                  <a14:hiddenLine xmlns="" xmlns:a14="http://schemas.microsoft.com/office/drawing/2010/main" w="9525">
+                  <a14:hiddenLine xmlns:a14="http://schemas.microsoft.com/office/drawing/2010/main" xmlns="" w="9525">
                     <a:solidFill>
                       <a:srgbClr val="000000"/>
                     </a:solidFill>
@@ -9881,7 +9881,7 @@
               </a:ln>
               <a:extLst>
                 <a:ext uri="{91240B29-F687-4f45-9708-019B960494DF}">
-                  <a14:hiddenLine xmlns="" xmlns:a14="http://schemas.microsoft.com/office/drawing/2010/main" w="9525">
+                  <a14:hiddenLine xmlns:a14="http://schemas.microsoft.com/office/drawing/2010/main" xmlns="" w="9525">
                     <a:solidFill>
                       <a:srgbClr val="000000"/>
                     </a:solidFill>
@@ -9971,7 +9971,7 @@
               </a:ln>
               <a:extLst>
                 <a:ext uri="{91240B29-F687-4f45-9708-019B960494DF}">
-                  <a14:hiddenLine xmlns="" xmlns:a14="http://schemas.microsoft.com/office/drawing/2010/main" w="9525">
+                  <a14:hiddenLine xmlns:a14="http://schemas.microsoft.com/office/drawing/2010/main" xmlns="" w="9525">
                     <a:solidFill>
                       <a:srgbClr val="000000"/>
                     </a:solidFill>
@@ -10033,7 +10033,7 @@
               </a:ln>
               <a:extLst>
                 <a:ext uri="{91240B29-F687-4f45-9708-019B960494DF}">
-                  <a14:hiddenLine xmlns="" xmlns:a14="http://schemas.microsoft.com/office/drawing/2010/main" w="9525">
+                  <a14:hiddenLine xmlns:a14="http://schemas.microsoft.com/office/drawing/2010/main" xmlns="" w="9525">
                     <a:solidFill>
                       <a:srgbClr val="000000"/>
                     </a:solidFill>
@@ -10095,7 +10095,7 @@
               </a:ln>
               <a:extLst>
                 <a:ext uri="{91240B29-F687-4f45-9708-019B960494DF}">
-                  <a14:hiddenLine xmlns="" xmlns:a14="http://schemas.microsoft.com/office/drawing/2010/main" w="9525">
+                  <a14:hiddenLine xmlns:a14="http://schemas.microsoft.com/office/drawing/2010/main" xmlns="" w="9525">
                     <a:solidFill>
                       <a:srgbClr val="000000"/>
                     </a:solidFill>
@@ -10185,7 +10185,7 @@
               </a:ln>
               <a:extLst>
                 <a:ext uri="{91240B29-F687-4f45-9708-019B960494DF}">
-                  <a14:hiddenLine xmlns="" xmlns:a14="http://schemas.microsoft.com/office/drawing/2010/main" w="9525">
+                  <a14:hiddenLine xmlns:a14="http://schemas.microsoft.com/office/drawing/2010/main" xmlns="" w="9525">
                     <a:solidFill>
                       <a:srgbClr val="000000"/>
                     </a:solidFill>
@@ -10275,7 +10275,7 @@
               </a:ln>
               <a:extLst>
                 <a:ext uri="{91240B29-F687-4f45-9708-019B960494DF}">
-                  <a14:hiddenLine xmlns="" xmlns:a14="http://schemas.microsoft.com/office/drawing/2010/main" w="9525">
+                  <a14:hiddenLine xmlns:a14="http://schemas.microsoft.com/office/drawing/2010/main" xmlns="" w="9525">
                     <a:solidFill>
                       <a:srgbClr val="000000"/>
                     </a:solidFill>
@@ -10337,7 +10337,7 @@
               </a:ln>
               <a:extLst>
                 <a:ext uri="{91240B29-F687-4f45-9708-019B960494DF}">
-                  <a14:hiddenLine xmlns="" xmlns:a14="http://schemas.microsoft.com/office/drawing/2010/main" w="9525">
+                  <a14:hiddenLine xmlns:a14="http://schemas.microsoft.com/office/drawing/2010/main" xmlns="" w="9525">
                     <a:solidFill>
                       <a:srgbClr val="000000"/>
                     </a:solidFill>
@@ -10447,7 +10447,7 @@
               </a:ln>
               <a:extLst>
                 <a:ext uri="{91240B29-F687-4f45-9708-019B960494DF}">
-                  <a14:hiddenLine xmlns="" xmlns:a14="http://schemas.microsoft.com/office/drawing/2010/main" w="9525">
+                  <a14:hiddenLine xmlns:a14="http://schemas.microsoft.com/office/drawing/2010/main" xmlns="" w="9525">
                     <a:solidFill>
                       <a:srgbClr val="000000"/>
                     </a:solidFill>
@@ -10531,7 +10531,7 @@
               </a:ln>
               <a:extLst>
                 <a:ext uri="{91240B29-F687-4f45-9708-019B960494DF}">
-                  <a14:hiddenLine xmlns="" xmlns:a14="http://schemas.microsoft.com/office/drawing/2010/main" w="9525">
+                  <a14:hiddenLine xmlns:a14="http://schemas.microsoft.com/office/drawing/2010/main" xmlns="" w="9525">
                     <a:solidFill>
                       <a:srgbClr val="000000"/>
                     </a:solidFill>
@@ -10593,7 +10593,7 @@
               </a:ln>
               <a:extLst>
                 <a:ext uri="{91240B29-F687-4f45-9708-019B960494DF}">
-                  <a14:hiddenLine xmlns="" xmlns:a14="http://schemas.microsoft.com/office/drawing/2010/main" w="9525">
+                  <a14:hiddenLine xmlns:a14="http://schemas.microsoft.com/office/drawing/2010/main" xmlns="" w="9525">
                     <a:solidFill>
                       <a:srgbClr val="000000"/>
                     </a:solidFill>
@@ -10655,7 +10655,7 @@
               </a:ln>
               <a:extLst>
                 <a:ext uri="{91240B29-F687-4f45-9708-019B960494DF}">
-                  <a14:hiddenLine xmlns="" xmlns:a14="http://schemas.microsoft.com/office/drawing/2010/main" w="9525">
+                  <a14:hiddenLine xmlns:a14="http://schemas.microsoft.com/office/drawing/2010/main" xmlns="" w="9525">
                     <a:solidFill>
                       <a:srgbClr val="000000"/>
                     </a:solidFill>
@@ -10745,7 +10745,7 @@
               </a:ln>
               <a:extLst>
                 <a:ext uri="{91240B29-F687-4f45-9708-019B960494DF}">
-                  <a14:hiddenLine xmlns="" xmlns:a14="http://schemas.microsoft.com/office/drawing/2010/main" w="9525">
+                  <a14:hiddenLine xmlns:a14="http://schemas.microsoft.com/office/drawing/2010/main" xmlns="" w="9525">
                     <a:solidFill>
                       <a:srgbClr val="000000"/>
                     </a:solidFill>
@@ -10779,7 +10779,7 @@
               </a:ln>
               <a:extLst>
                 <a:ext uri="{91240B29-F687-4f45-9708-019B960494DF}">
-                  <a14:hiddenLine xmlns="" xmlns:a14="http://schemas.microsoft.com/office/drawing/2010/main" w="9525">
+                  <a14:hiddenLine xmlns:a14="http://schemas.microsoft.com/office/drawing/2010/main" xmlns="" w="9525">
                     <a:solidFill>
                       <a:srgbClr val="000000"/>
                     </a:solidFill>
@@ -10844,7 +10844,7 @@
               </a:ln>
               <a:extLst>
                 <a:ext uri="{91240B29-F687-4f45-9708-019B960494DF}">
-                  <a14:hiddenLine xmlns="" xmlns:a14="http://schemas.microsoft.com/office/drawing/2010/main" w="9525">
+                  <a14:hiddenLine xmlns:a14="http://schemas.microsoft.com/office/drawing/2010/main" xmlns="" w="9525">
                     <a:solidFill>
                       <a:srgbClr val="000000"/>
                     </a:solidFill>
@@ -10934,7 +10934,7 @@
               </a:ln>
               <a:extLst>
                 <a:ext uri="{91240B29-F687-4f45-9708-019B960494DF}">
-                  <a14:hiddenLine xmlns="" xmlns:a14="http://schemas.microsoft.com/office/drawing/2010/main" w="9525">
+                  <a14:hiddenLine xmlns:a14="http://schemas.microsoft.com/office/drawing/2010/main" xmlns="" w="9525">
                     <a:solidFill>
                       <a:srgbClr val="000000"/>
                     </a:solidFill>
@@ -10996,7 +10996,7 @@
               </a:ln>
               <a:extLst>
                 <a:ext uri="{91240B29-F687-4f45-9708-019B960494DF}">
-                  <a14:hiddenLine xmlns="" xmlns:a14="http://schemas.microsoft.com/office/drawing/2010/main" w="9525">
+                  <a14:hiddenLine xmlns:a14="http://schemas.microsoft.com/office/drawing/2010/main" xmlns="" w="9525">
                     <a:solidFill>
                       <a:srgbClr val="000000"/>
                     </a:solidFill>
@@ -11086,7 +11086,7 @@
               </a:ln>
               <a:extLst>
                 <a:ext uri="{91240B29-F687-4f45-9708-019B960494DF}">
-                  <a14:hiddenLine xmlns="" xmlns:a14="http://schemas.microsoft.com/office/drawing/2010/main" w="9525">
+                  <a14:hiddenLine xmlns:a14="http://schemas.microsoft.com/office/drawing/2010/main" xmlns="" w="9525">
                     <a:solidFill>
                       <a:srgbClr val="000000"/>
                     </a:solidFill>
@@ -11151,7 +11151,7 @@
               </a:ln>
               <a:extLst>
                 <a:ext uri="{91240B29-F687-4f45-9708-019B960494DF}">
-                  <a14:hiddenLine xmlns="" xmlns:a14="http://schemas.microsoft.com/office/drawing/2010/main" w="9525">
+                  <a14:hiddenLine xmlns:a14="http://schemas.microsoft.com/office/drawing/2010/main" xmlns="" w="9525">
                     <a:solidFill>
                       <a:srgbClr val="000000"/>
                     </a:solidFill>
@@ -11213,7 +11213,7 @@
               </a:ln>
               <a:extLst>
                 <a:ext uri="{91240B29-F687-4f45-9708-019B960494DF}">
-                  <a14:hiddenLine xmlns="" xmlns:a14="http://schemas.microsoft.com/office/drawing/2010/main" w="9525">
+                  <a14:hiddenLine xmlns:a14="http://schemas.microsoft.com/office/drawing/2010/main" xmlns="" w="9525">
                     <a:solidFill>
                       <a:srgbClr val="000000"/>
                     </a:solidFill>
@@ -11303,7 +11303,7 @@
               </a:ln>
               <a:extLst>
                 <a:ext uri="{91240B29-F687-4f45-9708-019B960494DF}">
-                  <a14:hiddenLine xmlns="" xmlns:a14="http://schemas.microsoft.com/office/drawing/2010/main" w="9525">
+                  <a14:hiddenLine xmlns:a14="http://schemas.microsoft.com/office/drawing/2010/main" xmlns="" w="9525">
                     <a:solidFill>
                       <a:srgbClr val="000000"/>
                     </a:solidFill>
@@ -11393,7 +11393,7 @@
               </a:ln>
               <a:extLst>
                 <a:ext uri="{91240B29-F687-4f45-9708-019B960494DF}">
-                  <a14:hiddenLine xmlns="" xmlns:a14="http://schemas.microsoft.com/office/drawing/2010/main" w="9525">
+                  <a14:hiddenLine xmlns:a14="http://schemas.microsoft.com/office/drawing/2010/main" xmlns="" w="9525">
                     <a:solidFill>
                       <a:srgbClr val="000000"/>
                     </a:solidFill>
@@ -11458,7 +11458,7 @@
               </a:ln>
               <a:extLst>
                 <a:ext uri="{91240B29-F687-4f45-9708-019B960494DF}">
-                  <a14:hiddenLine xmlns="" xmlns:a14="http://schemas.microsoft.com/office/drawing/2010/main" w="9525">
+                  <a14:hiddenLine xmlns:a14="http://schemas.microsoft.com/office/drawing/2010/main" xmlns="" w="9525">
                     <a:solidFill>
                       <a:srgbClr val="000000"/>
                     </a:solidFill>
@@ -11578,7 +11578,7 @@
               </a:ln>
               <a:extLst>
                 <a:ext uri="{91240B29-F687-4f45-9708-019B960494DF}">
-                  <a14:hiddenLine xmlns="" xmlns:a14="http://schemas.microsoft.com/office/drawing/2010/main" w="9525">
+                  <a14:hiddenLine xmlns:a14="http://schemas.microsoft.com/office/drawing/2010/main" xmlns="" w="9525">
                     <a:solidFill>
                       <a:srgbClr val="000000"/>
                     </a:solidFill>
@@ -11676,7 +11676,7 @@
               </a:ln>
               <a:extLst>
                 <a:ext uri="{91240B29-F687-4f45-9708-019B960494DF}">
-                  <a14:hiddenLine xmlns="" xmlns:a14="http://schemas.microsoft.com/office/drawing/2010/main" w="9525">
+                  <a14:hiddenLine xmlns:a14="http://schemas.microsoft.com/office/drawing/2010/main" xmlns="" w="9525">
                     <a:solidFill>
                       <a:srgbClr val="000000"/>
                     </a:solidFill>
@@ -11791,7 +11791,7 @@
               </a:ln>
               <a:extLst>
                 <a:ext uri="{91240B29-F687-4f45-9708-019B960494DF}">
-                  <a14:hiddenLine xmlns="" xmlns:a14="http://schemas.microsoft.com/office/drawing/2010/main" w="9525">
+                  <a14:hiddenLine xmlns:a14="http://schemas.microsoft.com/office/drawing/2010/main" xmlns="" w="9525">
                     <a:solidFill>
                       <a:srgbClr val="000000"/>
                     </a:solidFill>
@@ -11881,7 +11881,7 @@
               </a:ln>
               <a:extLst>
                 <a:ext uri="{91240B29-F687-4f45-9708-019B960494DF}">
-                  <a14:hiddenLine xmlns="" xmlns:a14="http://schemas.microsoft.com/office/drawing/2010/main" w="9525">
+                  <a14:hiddenLine xmlns:a14="http://schemas.microsoft.com/office/drawing/2010/main" xmlns="" w="9525">
                     <a:solidFill>
                       <a:srgbClr val="000000"/>
                     </a:solidFill>
@@ -11946,7 +11946,7 @@
               </a:ln>
               <a:extLst>
                 <a:ext uri="{91240B29-F687-4f45-9708-019B960494DF}">
-                  <a14:hiddenLine xmlns="" xmlns:a14="http://schemas.microsoft.com/office/drawing/2010/main" w="9525">
+                  <a14:hiddenLine xmlns:a14="http://schemas.microsoft.com/office/drawing/2010/main" xmlns="" w="9525">
                     <a:solidFill>
                       <a:srgbClr val="000000"/>
                     </a:solidFill>
@@ -12036,7 +12036,7 @@
               </a:ln>
               <a:extLst>
                 <a:ext uri="{91240B29-F687-4f45-9708-019B960494DF}">
-                  <a14:hiddenLine xmlns="" xmlns:a14="http://schemas.microsoft.com/office/drawing/2010/main" w="9525">
+                  <a14:hiddenLine xmlns:a14="http://schemas.microsoft.com/office/drawing/2010/main" xmlns="" w="9525">
                     <a:solidFill>
                       <a:srgbClr val="000000"/>
                     </a:solidFill>
@@ -12104,7 +12104,7 @@
               </a:ln>
               <a:extLst>
                 <a:ext uri="{91240B29-F687-4f45-9708-019B960494DF}">
-                  <a14:hiddenLine xmlns="" xmlns:a14="http://schemas.microsoft.com/office/drawing/2010/main" w="9525">
+                  <a14:hiddenLine xmlns:a14="http://schemas.microsoft.com/office/drawing/2010/main" xmlns="" w="9525">
                     <a:solidFill>
                       <a:srgbClr val="000000"/>
                     </a:solidFill>
@@ -12194,7 +12194,7 @@
               </a:ln>
               <a:extLst>
                 <a:ext uri="{91240B29-F687-4f45-9708-019B960494DF}">
-                  <a14:hiddenLine xmlns="" xmlns:a14="http://schemas.microsoft.com/office/drawing/2010/main" w="9525">
+                  <a14:hiddenLine xmlns:a14="http://schemas.microsoft.com/office/drawing/2010/main" xmlns="" w="9525">
                     <a:solidFill>
                       <a:srgbClr val="000000"/>
                     </a:solidFill>
@@ -12262,7 +12262,7 @@
               </a:ln>
               <a:extLst>
                 <a:ext uri="{91240B29-F687-4f45-9708-019B960494DF}">
-                  <a14:hiddenLine xmlns="" xmlns:a14="http://schemas.microsoft.com/office/drawing/2010/main" w="9525">
+                  <a14:hiddenLine xmlns:a14="http://schemas.microsoft.com/office/drawing/2010/main" xmlns="" w="9525">
                     <a:solidFill>
                       <a:srgbClr val="000000"/>
                     </a:solidFill>
@@ -12352,7 +12352,7 @@
               </a:ln>
               <a:extLst>
                 <a:ext uri="{91240B29-F687-4f45-9708-019B960494DF}">
-                  <a14:hiddenLine xmlns="" xmlns:a14="http://schemas.microsoft.com/office/drawing/2010/main" w="9525">
+                  <a14:hiddenLine xmlns:a14="http://schemas.microsoft.com/office/drawing/2010/main" xmlns="" w="9525">
                     <a:solidFill>
                       <a:srgbClr val="000000"/>
                     </a:solidFill>
@@ -12386,7 +12386,7 @@
               </a:ln>
               <a:extLst>
                 <a:ext uri="{91240B29-F687-4f45-9708-019B960494DF}">
-                  <a14:hiddenLine xmlns="" xmlns:a14="http://schemas.microsoft.com/office/drawing/2010/main" w="9525">
+                  <a14:hiddenLine xmlns:a14="http://schemas.microsoft.com/office/drawing/2010/main" xmlns="" w="9525">
                     <a:solidFill>
                       <a:srgbClr val="000000"/>
                     </a:solidFill>
@@ -13180,7 +13180,7 @@
         <p:spPr>
           <a:xfrm>
             <a:off x="1141411" y="1946366"/>
-            <a:ext cx="9906000" cy="3852771"/>
+            <a:ext cx="9906000" cy="4153988"/>
           </a:xfrm>
         </p:spPr>
         <p:txBody>
@@ -13213,7 +13213,19 @@
             </a:pPr>
             <a:r>
               <a:rPr lang="pt-BR" dirty="0" smtClean="0"/>
-              <a:t>Dados diários</a:t>
+              <a:t>Dados </a:t>
+            </a:r>
+            <a:r>
+              <a:rPr lang="pt-BR" dirty="0" smtClean="0"/>
+              <a:t>diários entre </a:t>
+            </a:r>
+            <a:r>
+              <a:rPr lang="pt-BR" dirty="0" smtClean="0"/>
+              <a:t>janeiro de 2017 a outubro de 2018 (20 meses</a:t>
+            </a:r>
+            <a:r>
+              <a:rPr lang="pt-BR" dirty="0" smtClean="0"/>
+              <a:t>)</a:t>
             </a:r>
           </a:p>
           <a:p>
@@ -13222,9 +13234,42 @@
               <a:buChar char="•"/>
             </a:pPr>
             <a:r>
-              <a:rPr lang="pt-BR" dirty="0" smtClean="0"/>
-              <a:t>dados entre janeiro de 2017 a outubro de 2018 (20 meses)</a:t>
-            </a:r>
+              <a:rPr lang="pt-BR" dirty="0"/>
+              <a:t>Remoção dos </a:t>
+            </a:r>
+            <a:r>
+              <a:rPr lang="pt-BR" dirty="0" err="1"/>
+              <a:t>outliers</a:t>
+            </a:r>
+            <a:endParaRPr lang="pt-BR" dirty="0"/>
+          </a:p>
+          <a:p>
+            <a:pPr marL="285750" indent="-285750">
+              <a:buFont typeface="Arial" panose="020B0604020202020204" pitchFamily="34" charset="0"/>
+              <a:buChar char="•"/>
+            </a:pPr>
+            <a:r>
+              <a:rPr lang="pt-BR" dirty="0"/>
+              <a:t>Gráficos de tendência</a:t>
+            </a:r>
+          </a:p>
+          <a:p>
+            <a:pPr marL="285750" indent="-285750">
+              <a:buFont typeface="Arial" panose="020B0604020202020204" pitchFamily="34" charset="0"/>
+              <a:buChar char="•"/>
+            </a:pPr>
+            <a:r>
+              <a:rPr lang="pt-BR" dirty="0" err="1"/>
+              <a:t>Forecasting</a:t>
+            </a:r>
+            <a:endParaRPr lang="pt-BR" dirty="0"/>
+          </a:p>
+          <a:p>
+            <a:pPr marL="285750" indent="-285750">
+              <a:buFont typeface="Arial" panose="020B0604020202020204" pitchFamily="34" charset="0"/>
+              <a:buChar char="•"/>
+            </a:pPr>
+            <a:endParaRPr lang="pt-BR" dirty="0" smtClean="0"/>
           </a:p>
           <a:p>
             <a:endParaRPr lang="pt-BR" dirty="0" smtClean="0"/>
@@ -13260,7 +13305,7 @@
         </p:blipFill>
         <p:spPr>
           <a:xfrm>
-            <a:off x="4156371" y="3862112"/>
+            <a:off x="4731137" y="3313472"/>
             <a:ext cx="3887351" cy="2668545"/>
           </a:xfrm>
           <a:prstGeom prst="rect">
@@ -15926,6 +15971,14 @@
 </file>
 
 <file path=customXml/item2.xml><?xml version="1.0" encoding="utf-8"?>
+<p:properties xmlns:p="http://schemas.microsoft.com/office/2006/metadata/properties" xmlns:xsi="http://www.w3.org/2001/XMLSchema-instance" xmlns:pc="http://schemas.microsoft.com/office/infopath/2007/PartnerControls">
+  <documentManagement>
+    <MediaServiceKeyPoints xmlns="71af3243-3dd4-4a8d-8c0d-dd76da1f02a5" xsi:nil="true"/>
+  </documentManagement>
+</p:properties>
+</file>
+
+<file path=customXml/item3.xml><?xml version="1.0" encoding="utf-8"?>
 <ct:contentTypeSchema xmlns:ct="http://schemas.microsoft.com/office/2006/metadata/contentType" xmlns:ma="http://schemas.microsoft.com/office/2006/metadata/properties/metaAttributes" ct:_="" ma:_="" ma:contentTypeName="Document" ma:contentTypeID="0x01010079F111ED35F8CC479449609E8A0923A6" ma:contentTypeVersion="11" ma:contentTypeDescription="Create a new document." ma:contentTypeScope="" ma:versionID="9677210f24a1be23c92c90fd886aa0aa">
   <xsd:schema xmlns:xsd="http://www.w3.org/2001/XMLSchema" xmlns:xs="http://www.w3.org/2001/XMLSchema" xmlns:p="http://schemas.microsoft.com/office/2006/metadata/properties" xmlns:ns2="71af3243-3dd4-4a8d-8c0d-dd76da1f02a5" xmlns:ns3="16c05727-aa75-4e4a-9b5f-8a80a1165891" targetNamespace="http://schemas.microsoft.com/office/2006/metadata/properties" ma:root="true" ma:fieldsID="60e05723c5c1908df1a1a4ebf11d344e" ns2:_="" ns3:_="">
     <xsd:import namespace="71af3243-3dd4-4a8d-8c0d-dd76da1f02a5"/>
@@ -16136,14 +16189,6 @@
 </ct:contentTypeSchema>
 </file>
 
-<file path=customXml/item3.xml><?xml version="1.0" encoding="utf-8"?>
-<p:properties xmlns:p="http://schemas.microsoft.com/office/2006/metadata/properties" xmlns:xsi="http://www.w3.org/2001/XMLSchema-instance" xmlns:pc="http://schemas.microsoft.com/office/infopath/2007/PartnerControls">
-  <documentManagement>
-    <MediaServiceKeyPoints xmlns="71af3243-3dd4-4a8d-8c0d-dd76da1f02a5" xsi:nil="true"/>
-  </documentManagement>
-</p:properties>
-</file>
-
 <file path=customXml/itemProps1.xml><?xml version="1.0" encoding="utf-8"?>
 <ds:datastoreItem xmlns:ds="http://schemas.openxmlformats.org/officeDocument/2006/customXml" ds:itemID="{E096F0E7-E7B5-406E-8E94-F0043B2AC7F6}">
   <ds:schemaRefs>
@@ -16153,6 +16198,23 @@
 </file>
 
 <file path=customXml/itemProps2.xml><?xml version="1.0" encoding="utf-8"?>
+<ds:datastoreItem xmlns:ds="http://schemas.openxmlformats.org/officeDocument/2006/customXml" ds:itemID="{AC41CBB0-BAA0-4983-8F2B-E10AF3358DA8}">
+  <ds:schemaRefs>
+    <ds:schemaRef ds:uri="http://schemas.microsoft.com/office/2006/documentManagement/types"/>
+    <ds:schemaRef ds:uri="http://schemas.openxmlformats.org/package/2006/metadata/core-properties"/>
+    <ds:schemaRef ds:uri="16c05727-aa75-4e4a-9b5f-8a80a1165891"/>
+    <ds:schemaRef ds:uri="http://purl.org/dc/elements/1.1/"/>
+    <ds:schemaRef ds:uri="http://schemas.microsoft.com/office/2006/metadata/properties"/>
+    <ds:schemaRef ds:uri="http://purl.org/dc/terms/"/>
+    <ds:schemaRef ds:uri="http://schemas.microsoft.com/office/infopath/2007/PartnerControls"/>
+    <ds:schemaRef ds:uri="71af3243-3dd4-4a8d-8c0d-dd76da1f02a5"/>
+    <ds:schemaRef ds:uri="http://www.w3.org/XML/1998/namespace"/>
+    <ds:schemaRef ds:uri="http://purl.org/dc/dcmitype/"/>
+  </ds:schemaRefs>
+</ds:datastoreItem>
+</file>
+
+<file path=customXml/itemProps3.xml><?xml version="1.0" encoding="utf-8"?>
 <ds:datastoreItem xmlns:ds="http://schemas.openxmlformats.org/officeDocument/2006/customXml" ds:itemID="{104C6BCC-A38B-4625-90E6-7D3BBA3909AE}">
   <ds:schemaRefs>
     <ds:schemaRef ds:uri="http://schemas.microsoft.com/office/2006/metadata/contentType"/>
@@ -16169,21 +16231,4 @@
     <ds:schemaRef ds:uri="http://schemas.microsoft.com/internal/obd"/>
   </ds:schemaRefs>
 </ds:datastoreItem>
-</file>
-
-<file path=customXml/itemProps3.xml><?xml version="1.0" encoding="utf-8"?>
-<ds:datastoreItem xmlns:ds="http://schemas.openxmlformats.org/officeDocument/2006/customXml" ds:itemID="{AC41CBB0-BAA0-4983-8F2B-E10AF3358DA8}">
-  <ds:schemaRefs>
-    <ds:schemaRef ds:uri="http://schemas.microsoft.com/office/2006/documentManagement/types"/>
-    <ds:schemaRef ds:uri="http://schemas.openxmlformats.org/package/2006/metadata/core-properties"/>
-    <ds:schemaRef ds:uri="16c05727-aa75-4e4a-9b5f-8a80a1165891"/>
-    <ds:schemaRef ds:uri="http://purl.org/dc/elements/1.1/"/>
-    <ds:schemaRef ds:uri="http://schemas.microsoft.com/office/2006/metadata/properties"/>
-    <ds:schemaRef ds:uri="http://purl.org/dc/terms/"/>
-    <ds:schemaRef ds:uri="http://schemas.microsoft.com/office/infopath/2007/PartnerControls"/>
-    <ds:schemaRef ds:uri="71af3243-3dd4-4a8d-8c0d-dd76da1f02a5"/>
-    <ds:schemaRef ds:uri="http://www.w3.org/XML/1998/namespace"/>
-    <ds:schemaRef ds:uri="http://purl.org/dc/dcmitype/"/>
-  </ds:schemaRefs>
-</ds:datastoreItem>
 </file>
</xml_diff>

<commit_message>
Substitute ts dataframe image
</commit_message>
<xml_diff>
--- a/apresentacao/Apresentacao.pptx
+++ b/apresentacao/Apresentacao.pptx
@@ -13180,7 +13180,7 @@
         <p:spPr>
           <a:xfrm>
             <a:off x="1141411" y="1946366"/>
-            <a:ext cx="9906000" cy="4153988"/>
+            <a:ext cx="9906000" cy="4362994"/>
           </a:xfrm>
         </p:spPr>
         <p:txBody>
@@ -13285,7 +13285,7 @@
       </p:sp>
       <p:pic>
         <p:nvPicPr>
-          <p:cNvPr id="4" name="Imagem 3"/>
+          <p:cNvPr id="5" name="Imagem 4"/>
           <p:cNvPicPr>
             <a:picLocks noChangeAspect="1"/>
           </p:cNvPicPr>
@@ -13305,8 +13305,8 @@
         </p:blipFill>
         <p:spPr>
           <a:xfrm>
-            <a:off x="4731137" y="3313472"/>
-            <a:ext cx="3887351" cy="2668545"/>
+            <a:off x="4406446" y="3361104"/>
+            <a:ext cx="4875077" cy="2830690"/>
           </a:xfrm>
           <a:prstGeom prst="rect">
             <a:avLst/>

</xml_diff>

<commit_message>
Create another pca slide with weights plot
</commit_message>
<xml_diff>
--- a/apresentacao/Apresentacao.pptx
+++ b/apresentacao/Apresentacao.pptx
@@ -5,10 +5,10 @@
     <p:sldMasterId id="2147483648" r:id="rId4"/>
   </p:sldMasterIdLst>
   <p:notesMasterIdLst>
-    <p:notesMasterId r:id="rId19"/>
+    <p:notesMasterId r:id="rId20"/>
   </p:notesMasterIdLst>
   <p:handoutMasterIdLst>
-    <p:handoutMasterId r:id="rId20"/>
+    <p:handoutMasterId r:id="rId21"/>
   </p:handoutMasterIdLst>
   <p:sldIdLst>
     <p:sldId id="263" r:id="rId5"/>
@@ -20,11 +20,12 @@
     <p:sldId id="272" r:id="rId11"/>
     <p:sldId id="273" r:id="rId12"/>
     <p:sldId id="270" r:id="rId13"/>
-    <p:sldId id="274" r:id="rId14"/>
-    <p:sldId id="275" r:id="rId15"/>
-    <p:sldId id="276" r:id="rId16"/>
-    <p:sldId id="271" r:id="rId17"/>
-    <p:sldId id="277" r:id="rId18"/>
+    <p:sldId id="279" r:id="rId14"/>
+    <p:sldId id="274" r:id="rId15"/>
+    <p:sldId id="275" r:id="rId16"/>
+    <p:sldId id="276" r:id="rId17"/>
+    <p:sldId id="271" r:id="rId18"/>
+    <p:sldId id="277" r:id="rId19"/>
   </p:sldIdLst>
   <p:sldSz cx="12192000" cy="6858000"/>
   <p:notesSz cx="6858000" cy="9144000"/>
@@ -13157,6 +13158,184 @@
           <a:p>
             <a:r>
               <a:rPr lang="pt-BR" dirty="0"/>
+              <a:t>4</a:t>
+            </a:r>
+            <a:r>
+              <a:rPr lang="pt-BR" dirty="0" smtClean="0"/>
+              <a:t>. Análise das categorias dos produtos</a:t>
+            </a:r>
+            <a:endParaRPr lang="pt-BR" dirty="0"/>
+          </a:p>
+        </p:txBody>
+      </p:sp>
+      <p:sp>
+        <p:nvSpPr>
+          <p:cNvPr id="3" name="Espaço Reservado para Texto 2"/>
+          <p:cNvSpPr>
+            <a:spLocks noGrp="1"/>
+          </p:cNvSpPr>
+          <p:nvPr>
+            <p:ph type="body" idx="1"/>
+          </p:nvPr>
+        </p:nvSpPr>
+        <p:spPr>
+          <a:xfrm>
+            <a:off x="1141411" y="1946366"/>
+            <a:ext cx="9906000" cy="4545874"/>
+          </a:xfrm>
+        </p:spPr>
+        <p:txBody>
+          <a:bodyPr/>
+          <a:lstStyle/>
+          <a:p>
+            <a:pPr marL="285750" indent="-285750">
+              <a:buFont typeface="Arial" panose="020B0604020202020204" pitchFamily="34" charset="0"/>
+              <a:buChar char="•"/>
+            </a:pPr>
+            <a:r>
+              <a:rPr lang="pt-BR" dirty="0" smtClean="0"/>
+              <a:t>Importância das categorias</a:t>
+            </a:r>
+            <a:endParaRPr lang="pt-BR" dirty="0" smtClean="0"/>
+          </a:p>
+          <a:p>
+            <a:pPr marL="285750" indent="-285750">
+              <a:buFont typeface="Arial" panose="020B0604020202020204" pitchFamily="34" charset="0"/>
+              <a:buChar char="•"/>
+            </a:pPr>
+            <a:endParaRPr lang="pt-BR" dirty="0" smtClean="0"/>
+          </a:p>
+          <a:p>
+            <a:pPr marL="285750" indent="-285750">
+              <a:buFont typeface="Arial" panose="020B0604020202020204" pitchFamily="34" charset="0"/>
+              <a:buChar char="•"/>
+            </a:pPr>
+            <a:endParaRPr lang="pt-BR" dirty="0"/>
+          </a:p>
+          <a:p>
+            <a:pPr marL="285750" indent="-285750">
+              <a:buFont typeface="Arial" panose="020B0604020202020204" pitchFamily="34" charset="0"/>
+              <a:buChar char="•"/>
+            </a:pPr>
+            <a:endParaRPr lang="pt-BR" dirty="0" smtClean="0"/>
+          </a:p>
+          <a:p>
+            <a:endParaRPr lang="pt-BR" dirty="0"/>
+          </a:p>
+          <a:p>
+            <a:endParaRPr lang="pt-BR" dirty="0"/>
+          </a:p>
+          <a:p>
+            <a:endParaRPr lang="pt-BR" dirty="0" smtClean="0"/>
+          </a:p>
+          <a:p>
+            <a:endParaRPr lang="pt-BR" dirty="0"/>
+          </a:p>
+          <a:p>
+            <a:endParaRPr lang="pt-BR" dirty="0" smtClean="0"/>
+          </a:p>
+          <a:p>
+            <a:pPr marL="285750" indent="-285750">
+              <a:buFont typeface="Arial" panose="020B0604020202020204" pitchFamily="34" charset="0"/>
+              <a:buChar char="•"/>
+            </a:pPr>
+            <a:r>
+              <a:rPr lang="pt-BR" dirty="0" smtClean="0"/>
+              <a:t>Consideradas 11 dimensões (aproximadamente 81%)</a:t>
+            </a:r>
+            <a:endParaRPr lang="pt-BR" dirty="0" smtClean="0"/>
+          </a:p>
+        </p:txBody>
+      </p:sp>
+      <p:pic>
+        <p:nvPicPr>
+          <p:cNvPr id="5" name="Imagem 4"/>
+          <p:cNvPicPr>
+            <a:picLocks noChangeAspect="1"/>
+          </p:cNvPicPr>
+          <p:nvPr/>
+        </p:nvPicPr>
+        <p:blipFill>
+          <a:blip r:embed="rId2">
+            <a:extLst>
+              <a:ext uri="{28A0092B-C50C-407E-A947-70E740481C1C}">
+                <a14:useLocalDpi xmlns:a14="http://schemas.microsoft.com/office/drawing/2010/main" val="0"/>
+              </a:ext>
+            </a:extLst>
+          </a:blip>
+          <a:stretch>
+            <a:fillRect/>
+          </a:stretch>
+        </p:blipFill>
+        <p:spPr>
+          <a:xfrm>
+            <a:off x="1877395" y="2325746"/>
+            <a:ext cx="8429200" cy="3434806"/>
+          </a:xfrm>
+          <a:prstGeom prst="rect">
+            <a:avLst/>
+          </a:prstGeom>
+        </p:spPr>
+      </p:pic>
+    </p:spTree>
+    <p:extLst>
+      <p:ext uri="{BB962C8B-B14F-4D97-AF65-F5344CB8AC3E}">
+        <p14:creationId xmlns:p14="http://schemas.microsoft.com/office/powerpoint/2010/main" val="1695615790"/>
+      </p:ext>
+    </p:extLst>
+  </p:cSld>
+  <p:clrMapOvr>
+    <a:masterClrMapping/>
+  </p:clrMapOvr>
+  <p:timing>
+    <p:tnLst>
+      <p:par>
+        <p:cTn id="1" dur="indefinite" restart="never" nodeType="tmRoot"/>
+      </p:par>
+    </p:tnLst>
+  </p:timing>
+</p:sld>
+</file>
+
+<file path=ppt/slides/slide11.xml><?xml version="1.0" encoding="utf-8"?>
+<p:sld xmlns:a="http://schemas.openxmlformats.org/drawingml/2006/main" xmlns:r="http://schemas.openxmlformats.org/officeDocument/2006/relationships" xmlns:p="http://schemas.openxmlformats.org/presentationml/2006/main">
+  <p:cSld>
+    <p:spTree>
+      <p:nvGrpSpPr>
+        <p:cNvPr id="1" name=""/>
+        <p:cNvGrpSpPr/>
+        <p:nvPr/>
+      </p:nvGrpSpPr>
+      <p:grpSpPr>
+        <a:xfrm>
+          <a:off x="0" y="0"/>
+          <a:ext cx="0" cy="0"/>
+          <a:chOff x="0" y="0"/>
+          <a:chExt cx="0" cy="0"/>
+        </a:xfrm>
+      </p:grpSpPr>
+      <p:sp>
+        <p:nvSpPr>
+          <p:cNvPr id="2" name="Título 1"/>
+          <p:cNvSpPr>
+            <a:spLocks noGrp="1"/>
+          </p:cNvSpPr>
+          <p:nvPr>
+            <p:ph type="title"/>
+          </p:nvPr>
+        </p:nvSpPr>
+        <p:spPr>
+          <a:xfrm>
+            <a:off x="1141411" y="413386"/>
+            <a:ext cx="9906000" cy="997403"/>
+          </a:xfrm>
+        </p:spPr>
+        <p:txBody>
+          <a:bodyPr/>
+          <a:lstStyle/>
+          <a:p>
+            <a:r>
+              <a:rPr lang="pt-BR" dirty="0"/>
               <a:t>5</a:t>
             </a:r>
             <a:r>
@@ -13333,7 +13512,7 @@
 </p:sld>
 </file>
 
-<file path=ppt/slides/slide11.xml><?xml version="1.0" encoding="utf-8"?>
+<file path=ppt/slides/slide12.xml><?xml version="1.0" encoding="utf-8"?>
 <p:sld xmlns:a="http://schemas.openxmlformats.org/drawingml/2006/main" xmlns:r="http://schemas.openxmlformats.org/officeDocument/2006/relationships" xmlns:p="http://schemas.openxmlformats.org/presentationml/2006/main">
   <p:cSld>
     <p:spTree>
@@ -13557,7 +13736,7 @@
 </p:sld>
 </file>
 
-<file path=ppt/slides/slide12.xml><?xml version="1.0" encoding="utf-8"?>
+<file path=ppt/slides/slide13.xml><?xml version="1.0" encoding="utf-8"?>
 <p:sld xmlns:a="http://schemas.openxmlformats.org/drawingml/2006/main" xmlns:r="http://schemas.openxmlformats.org/officeDocument/2006/relationships" xmlns:p="http://schemas.openxmlformats.org/presentationml/2006/main">
   <p:cSld>
     <p:spTree>
@@ -13691,103 +13870,6 @@
 </p:sld>
 </file>
 
-<file path=ppt/slides/slide13.xml><?xml version="1.0" encoding="utf-8"?>
-<p:sld xmlns:a="http://schemas.openxmlformats.org/drawingml/2006/main" xmlns:r="http://schemas.openxmlformats.org/officeDocument/2006/relationships" xmlns:p="http://schemas.openxmlformats.org/presentationml/2006/main">
-  <p:cSld>
-    <p:spTree>
-      <p:nvGrpSpPr>
-        <p:cNvPr id="1" name=""/>
-        <p:cNvGrpSpPr/>
-        <p:nvPr/>
-      </p:nvGrpSpPr>
-      <p:grpSpPr>
-        <a:xfrm>
-          <a:off x="0" y="0"/>
-          <a:ext cx="0" cy="0"/>
-          <a:chOff x="0" y="0"/>
-          <a:chExt cx="0" cy="0"/>
-        </a:xfrm>
-      </p:grpSpPr>
-      <p:sp>
-        <p:nvSpPr>
-          <p:cNvPr id="2" name="Título 1"/>
-          <p:cNvSpPr>
-            <a:spLocks noGrp="1"/>
-          </p:cNvSpPr>
-          <p:nvPr>
-            <p:ph type="title"/>
-          </p:nvPr>
-        </p:nvSpPr>
-        <p:spPr>
-          <a:xfrm>
-            <a:off x="1141411" y="413386"/>
-            <a:ext cx="9906000" cy="997403"/>
-          </a:xfrm>
-        </p:spPr>
-        <p:txBody>
-          <a:bodyPr/>
-          <a:lstStyle/>
-          <a:p>
-            <a:r>
-              <a:rPr lang="pt-BR" dirty="0"/>
-              <a:t>6</a:t>
-            </a:r>
-            <a:r>
-              <a:rPr lang="pt-BR" dirty="0" smtClean="0"/>
-              <a:t>. conclusão</a:t>
-            </a:r>
-            <a:endParaRPr lang="pt-BR" dirty="0"/>
-          </a:p>
-        </p:txBody>
-      </p:sp>
-      <p:sp>
-        <p:nvSpPr>
-          <p:cNvPr id="3" name="Espaço Reservado para Texto 2"/>
-          <p:cNvSpPr>
-            <a:spLocks noGrp="1"/>
-          </p:cNvSpPr>
-          <p:nvPr>
-            <p:ph type="body" idx="1"/>
-          </p:nvPr>
-        </p:nvSpPr>
-        <p:spPr>
-          <a:xfrm>
-            <a:off x="1141411" y="1946366"/>
-            <a:ext cx="9906000" cy="3852771"/>
-          </a:xfrm>
-        </p:spPr>
-        <p:txBody>
-          <a:bodyPr/>
-          <a:lstStyle/>
-          <a:p>
-            <a:pPr marL="285750" indent="-285750">
-              <a:buFont typeface="Arial" panose="020B0604020202020204" pitchFamily="34" charset="0"/>
-              <a:buChar char="•"/>
-            </a:pPr>
-            <a:endParaRPr lang="pt-BR" dirty="0" smtClean="0"/>
-          </a:p>
-        </p:txBody>
-      </p:sp>
-    </p:spTree>
-    <p:extLst>
-      <p:ext uri="{BB962C8B-B14F-4D97-AF65-F5344CB8AC3E}">
-        <p14:creationId xmlns:p14="http://schemas.microsoft.com/office/powerpoint/2010/main" val="2278568767"/>
-      </p:ext>
-    </p:extLst>
-  </p:cSld>
-  <p:clrMapOvr>
-    <a:masterClrMapping/>
-  </p:clrMapOvr>
-  <p:timing>
-    <p:tnLst>
-      <p:par>
-        <p:cTn id="1" dur="indefinite" restart="never" nodeType="tmRoot"/>
-      </p:par>
-    </p:tnLst>
-  </p:timing>
-</p:sld>
-</file>
-
 <file path=ppt/slides/slide14.xml><?xml version="1.0" encoding="utf-8"?>
 <p:sld xmlns:a="http://schemas.openxmlformats.org/drawingml/2006/main" xmlns:r="http://schemas.openxmlformats.org/officeDocument/2006/relationships" xmlns:p="http://schemas.openxmlformats.org/presentationml/2006/main">
   <p:cSld>
@@ -13827,6 +13909,103 @@
           <a:p>
             <a:r>
               <a:rPr lang="pt-BR" dirty="0"/>
+              <a:t>6</a:t>
+            </a:r>
+            <a:r>
+              <a:rPr lang="pt-BR" dirty="0" smtClean="0"/>
+              <a:t>. conclusão</a:t>
+            </a:r>
+            <a:endParaRPr lang="pt-BR" dirty="0"/>
+          </a:p>
+        </p:txBody>
+      </p:sp>
+      <p:sp>
+        <p:nvSpPr>
+          <p:cNvPr id="3" name="Espaço Reservado para Texto 2"/>
+          <p:cNvSpPr>
+            <a:spLocks noGrp="1"/>
+          </p:cNvSpPr>
+          <p:nvPr>
+            <p:ph type="body" idx="1"/>
+          </p:nvPr>
+        </p:nvSpPr>
+        <p:spPr>
+          <a:xfrm>
+            <a:off x="1141411" y="1946366"/>
+            <a:ext cx="9906000" cy="3852771"/>
+          </a:xfrm>
+        </p:spPr>
+        <p:txBody>
+          <a:bodyPr/>
+          <a:lstStyle/>
+          <a:p>
+            <a:pPr marL="285750" indent="-285750">
+              <a:buFont typeface="Arial" panose="020B0604020202020204" pitchFamily="34" charset="0"/>
+              <a:buChar char="•"/>
+            </a:pPr>
+            <a:endParaRPr lang="pt-BR" dirty="0" smtClean="0"/>
+          </a:p>
+        </p:txBody>
+      </p:sp>
+    </p:spTree>
+    <p:extLst>
+      <p:ext uri="{BB962C8B-B14F-4D97-AF65-F5344CB8AC3E}">
+        <p14:creationId xmlns:p14="http://schemas.microsoft.com/office/powerpoint/2010/main" val="2278568767"/>
+      </p:ext>
+    </p:extLst>
+  </p:cSld>
+  <p:clrMapOvr>
+    <a:masterClrMapping/>
+  </p:clrMapOvr>
+  <p:timing>
+    <p:tnLst>
+      <p:par>
+        <p:cTn id="1" dur="indefinite" restart="never" nodeType="tmRoot"/>
+      </p:par>
+    </p:tnLst>
+  </p:timing>
+</p:sld>
+</file>
+
+<file path=ppt/slides/slide15.xml><?xml version="1.0" encoding="utf-8"?>
+<p:sld xmlns:a="http://schemas.openxmlformats.org/drawingml/2006/main" xmlns:r="http://schemas.openxmlformats.org/officeDocument/2006/relationships" xmlns:p="http://schemas.openxmlformats.org/presentationml/2006/main">
+  <p:cSld>
+    <p:spTree>
+      <p:nvGrpSpPr>
+        <p:cNvPr id="1" name=""/>
+        <p:cNvGrpSpPr/>
+        <p:nvPr/>
+      </p:nvGrpSpPr>
+      <p:grpSpPr>
+        <a:xfrm>
+          <a:off x="0" y="0"/>
+          <a:ext cx="0" cy="0"/>
+          <a:chOff x="0" y="0"/>
+          <a:chExt cx="0" cy="0"/>
+        </a:xfrm>
+      </p:grpSpPr>
+      <p:sp>
+        <p:nvSpPr>
+          <p:cNvPr id="2" name="Título 1"/>
+          <p:cNvSpPr>
+            <a:spLocks noGrp="1"/>
+          </p:cNvSpPr>
+          <p:nvPr>
+            <p:ph type="title"/>
+          </p:nvPr>
+        </p:nvSpPr>
+        <p:spPr>
+          <a:xfrm>
+            <a:off x="1141411" y="413386"/>
+            <a:ext cx="9906000" cy="997403"/>
+          </a:xfrm>
+        </p:spPr>
+        <p:txBody>
+          <a:bodyPr/>
+          <a:lstStyle/>
+          <a:p>
+            <a:r>
+              <a:rPr lang="pt-BR" dirty="0"/>
               <a:t>7</a:t>
             </a:r>
             <a:r>
@@ -13895,8 +14074,31 @@
             </a:r>
             <a:r>
               <a:rPr lang="pt-BR" dirty="0" smtClean="0"/>
-              <a:t> (segmentação)</a:t>
-            </a:r>
+              <a:t> (segmentação</a:t>
+            </a:r>
+            <a:r>
+              <a:rPr lang="pt-BR" dirty="0" smtClean="0"/>
+              <a:t>)</a:t>
+            </a:r>
+          </a:p>
+          <a:p>
+            <a:pPr marL="285750" indent="-285750">
+              <a:buFont typeface="Arial" panose="020B0604020202020204" pitchFamily="34" charset="0"/>
+              <a:buChar char="•"/>
+            </a:pPr>
+            <a:r>
+              <a:rPr lang="pt-BR" dirty="0" smtClean="0"/>
+              <a:t>Realizado </a:t>
+            </a:r>
+            <a:r>
+              <a:rPr lang="pt-BR" dirty="0" err="1" smtClean="0"/>
+              <a:t>pca</a:t>
+            </a:r>
+            <a:r>
+              <a:rPr lang="pt-BR" dirty="0" smtClean="0"/>
+              <a:t> para o valor monetário de cada produto</a:t>
+            </a:r>
+            <a:endParaRPr lang="pt-BR" dirty="0" smtClean="0"/>
           </a:p>
           <a:p>
             <a:pPr marL="285750" indent="-285750">

</xml_diff>

<commit_message>
Create 'thank you' slide
</commit_message>
<xml_diff>
--- a/apresentacao/Apresentacao.pptx
+++ b/apresentacao/Apresentacao.pptx
@@ -5,10 +5,10 @@
     <p:sldMasterId id="2147483648" r:id="rId4"/>
   </p:sldMasterIdLst>
   <p:notesMasterIdLst>
-    <p:notesMasterId r:id="rId20"/>
+    <p:notesMasterId r:id="rId21"/>
   </p:notesMasterIdLst>
   <p:handoutMasterIdLst>
-    <p:handoutMasterId r:id="rId21"/>
+    <p:handoutMasterId r:id="rId22"/>
   </p:handoutMasterIdLst>
   <p:sldIdLst>
     <p:sldId id="263" r:id="rId5"/>
@@ -26,6 +26,7 @@
     <p:sldId id="276" r:id="rId17"/>
     <p:sldId id="271" r:id="rId18"/>
     <p:sldId id="277" r:id="rId19"/>
+    <p:sldId id="280" r:id="rId20"/>
   </p:sldIdLst>
   <p:sldSz cx="12192000" cy="6858000"/>
   <p:notesSz cx="6858000" cy="9144000"/>
@@ -14286,6 +14287,74 @@
 </p:sld>
 </file>
 
+<file path=ppt/slides/slide16.xml><?xml version="1.0" encoding="utf-8"?>
+<p:sld xmlns:a="http://schemas.openxmlformats.org/drawingml/2006/main" xmlns:r="http://schemas.openxmlformats.org/officeDocument/2006/relationships" xmlns:p="http://schemas.openxmlformats.org/presentationml/2006/main">
+  <p:cSld>
+    <p:spTree>
+      <p:nvGrpSpPr>
+        <p:cNvPr id="1" name=""/>
+        <p:cNvGrpSpPr/>
+        <p:nvPr/>
+      </p:nvGrpSpPr>
+      <p:grpSpPr>
+        <a:xfrm>
+          <a:off x="0" y="0"/>
+          <a:ext cx="0" cy="0"/>
+          <a:chOff x="0" y="0"/>
+          <a:chExt cx="0" cy="0"/>
+        </a:xfrm>
+      </p:grpSpPr>
+      <p:sp>
+        <p:nvSpPr>
+          <p:cNvPr id="2" name="Título 1"/>
+          <p:cNvSpPr>
+            <a:spLocks noGrp="1"/>
+          </p:cNvSpPr>
+          <p:nvPr>
+            <p:ph type="title"/>
+          </p:nvPr>
+        </p:nvSpPr>
+        <p:spPr>
+          <a:xfrm>
+            <a:off x="1141411" y="413386"/>
+            <a:ext cx="9906000" cy="5739220"/>
+          </a:xfrm>
+        </p:spPr>
+        <p:txBody>
+          <a:bodyPr anchor="ctr">
+            <a:normAutofit/>
+          </a:bodyPr>
+          <a:lstStyle/>
+          <a:p>
+            <a:pPr algn="ctr"/>
+            <a:r>
+              <a:rPr lang="pt-BR" sz="8000" dirty="0" smtClean="0"/>
+              <a:t>Obrigado!</a:t>
+            </a:r>
+            <a:endParaRPr lang="pt-BR" sz="8000" dirty="0"/>
+          </a:p>
+        </p:txBody>
+      </p:sp>
+    </p:spTree>
+    <p:extLst>
+      <p:ext uri="{BB962C8B-B14F-4D97-AF65-F5344CB8AC3E}">
+        <p14:creationId xmlns:p14="http://schemas.microsoft.com/office/powerpoint/2010/main" val="471087556"/>
+      </p:ext>
+    </p:extLst>
+  </p:cSld>
+  <p:clrMapOvr>
+    <a:masterClrMapping/>
+  </p:clrMapOvr>
+  <p:timing>
+    <p:tnLst>
+      <p:par>
+        <p:cTn id="1" dur="indefinite" restart="never" nodeType="tmRoot"/>
+      </p:par>
+    </p:tnLst>
+  </p:timing>
+</p:sld>
+</file>
+
 <file path=ppt/slides/slide2.xml><?xml version="1.0" encoding="utf-8"?>
 <p:sld xmlns:a="http://schemas.openxmlformats.org/drawingml/2006/main" xmlns:r="http://schemas.openxmlformats.org/officeDocument/2006/relationships" xmlns:p="http://schemas.openxmlformats.org/presentationml/2006/main">
   <p:cSld>

</xml_diff>

<commit_message>
Add dim 1 and 2 pca plots
</commit_message>
<xml_diff>
--- a/apresentacao/Apresentacao.pptx
+++ b/apresentacao/Apresentacao.pptx
@@ -5,10 +5,10 @@
     <p:sldMasterId id="2147483648" r:id="rId4"/>
   </p:sldMasterIdLst>
   <p:notesMasterIdLst>
-    <p:notesMasterId r:id="rId21"/>
+    <p:notesMasterId r:id="rId22"/>
   </p:notesMasterIdLst>
   <p:handoutMasterIdLst>
-    <p:handoutMasterId r:id="rId22"/>
+    <p:handoutMasterId r:id="rId23"/>
   </p:handoutMasterIdLst>
   <p:sldIdLst>
     <p:sldId id="263" r:id="rId5"/>
@@ -21,12 +21,13 @@
     <p:sldId id="273" r:id="rId12"/>
     <p:sldId id="270" r:id="rId13"/>
     <p:sldId id="279" r:id="rId14"/>
-    <p:sldId id="274" r:id="rId15"/>
-    <p:sldId id="275" r:id="rId16"/>
-    <p:sldId id="276" r:id="rId17"/>
-    <p:sldId id="271" r:id="rId18"/>
-    <p:sldId id="277" r:id="rId19"/>
-    <p:sldId id="280" r:id="rId20"/>
+    <p:sldId id="281" r:id="rId15"/>
+    <p:sldId id="274" r:id="rId16"/>
+    <p:sldId id="275" r:id="rId17"/>
+    <p:sldId id="276" r:id="rId18"/>
+    <p:sldId id="271" r:id="rId19"/>
+    <p:sldId id="277" r:id="rId20"/>
+    <p:sldId id="280" r:id="rId21"/>
   </p:sldIdLst>
   <p:sldSz cx="12192000" cy="6858000"/>
   <p:notesSz cx="6858000" cy="9144000"/>
@@ -13335,6 +13336,178 @@
           <a:p>
             <a:r>
               <a:rPr lang="pt-BR" dirty="0"/>
+              <a:t>4</a:t>
+            </a:r>
+            <a:r>
+              <a:rPr lang="pt-BR" dirty="0" smtClean="0"/>
+              <a:t>. Análise das categorias dos produtos</a:t>
+            </a:r>
+            <a:endParaRPr lang="pt-BR" dirty="0"/>
+          </a:p>
+        </p:txBody>
+      </p:sp>
+      <p:sp>
+        <p:nvSpPr>
+          <p:cNvPr id="3" name="Espaço Reservado para Texto 2"/>
+          <p:cNvSpPr>
+            <a:spLocks noGrp="1"/>
+          </p:cNvSpPr>
+          <p:nvPr>
+            <p:ph type="body" idx="1"/>
+          </p:nvPr>
+        </p:nvSpPr>
+        <p:spPr>
+          <a:xfrm>
+            <a:off x="1141411" y="1946366"/>
+            <a:ext cx="9906000" cy="4545874"/>
+          </a:xfrm>
+        </p:spPr>
+        <p:txBody>
+          <a:bodyPr/>
+          <a:lstStyle/>
+          <a:p>
+            <a:pPr marL="285750" indent="-285750">
+              <a:buFont typeface="Arial" panose="020B0604020202020204" pitchFamily="34" charset="0"/>
+              <a:buChar char="•"/>
+            </a:pPr>
+            <a:r>
+              <a:rPr lang="pt-BR" dirty="0" err="1" smtClean="0"/>
+              <a:t>Plots</a:t>
+            </a:r>
+            <a:r>
+              <a:rPr lang="pt-BR" dirty="0" smtClean="0"/>
+              <a:t> </a:t>
+            </a:r>
+            <a:r>
+              <a:rPr lang="pt-BR" smtClean="0"/>
+              <a:t>das dimensões 1 e 2</a:t>
+            </a:r>
+            <a:endParaRPr lang="pt-BR" dirty="0" smtClean="0"/>
+          </a:p>
+          <a:p>
+            <a:endParaRPr lang="pt-BR" dirty="0" smtClean="0"/>
+          </a:p>
+        </p:txBody>
+      </p:sp>
+      <p:pic>
+        <p:nvPicPr>
+          <p:cNvPr id="4" name="Imagem 3"/>
+          <p:cNvPicPr>
+            <a:picLocks noChangeAspect="1"/>
+          </p:cNvPicPr>
+          <p:nvPr/>
+        </p:nvPicPr>
+        <p:blipFill>
+          <a:blip r:embed="rId2">
+            <a:extLst>
+              <a:ext uri="{28A0092B-C50C-407E-A947-70E740481C1C}">
+                <a14:useLocalDpi xmlns:a14="http://schemas.microsoft.com/office/drawing/2010/main" val="0"/>
+              </a:ext>
+            </a:extLst>
+          </a:blip>
+          <a:stretch>
+            <a:fillRect/>
+          </a:stretch>
+        </p:blipFill>
+        <p:spPr>
+          <a:xfrm>
+            <a:off x="2939731" y="2410075"/>
+            <a:ext cx="6308772" cy="1864688"/>
+          </a:xfrm>
+          <a:prstGeom prst="rect">
+            <a:avLst/>
+          </a:prstGeom>
+        </p:spPr>
+      </p:pic>
+      <p:pic>
+        <p:nvPicPr>
+          <p:cNvPr id="6" name="Imagem 5"/>
+          <p:cNvPicPr>
+            <a:picLocks noChangeAspect="1"/>
+          </p:cNvPicPr>
+          <p:nvPr/>
+        </p:nvPicPr>
+        <p:blipFill>
+          <a:blip r:embed="rId3">
+            <a:extLst>
+              <a:ext uri="{28A0092B-C50C-407E-A947-70E740481C1C}">
+                <a14:useLocalDpi xmlns:a14="http://schemas.microsoft.com/office/drawing/2010/main" val="0"/>
+              </a:ext>
+            </a:extLst>
+          </a:blip>
+          <a:stretch>
+            <a:fillRect/>
+          </a:stretch>
+        </p:blipFill>
+        <p:spPr>
+          <a:xfrm>
+            <a:off x="2939731" y="4456531"/>
+            <a:ext cx="6308772" cy="1853940"/>
+          </a:xfrm>
+          <a:prstGeom prst="rect">
+            <a:avLst/>
+          </a:prstGeom>
+        </p:spPr>
+      </p:pic>
+    </p:spTree>
+    <p:extLst>
+      <p:ext uri="{BB962C8B-B14F-4D97-AF65-F5344CB8AC3E}">
+        <p14:creationId xmlns:p14="http://schemas.microsoft.com/office/powerpoint/2010/main" val="2311741042"/>
+      </p:ext>
+    </p:extLst>
+  </p:cSld>
+  <p:clrMapOvr>
+    <a:masterClrMapping/>
+  </p:clrMapOvr>
+  <p:timing>
+    <p:tnLst>
+      <p:par>
+        <p:cTn id="1" dur="indefinite" restart="never" nodeType="tmRoot"/>
+      </p:par>
+    </p:tnLst>
+  </p:timing>
+</p:sld>
+</file>
+
+<file path=ppt/slides/slide12.xml><?xml version="1.0" encoding="utf-8"?>
+<p:sld xmlns:a="http://schemas.openxmlformats.org/drawingml/2006/main" xmlns:r="http://schemas.openxmlformats.org/officeDocument/2006/relationships" xmlns:p="http://schemas.openxmlformats.org/presentationml/2006/main">
+  <p:cSld>
+    <p:spTree>
+      <p:nvGrpSpPr>
+        <p:cNvPr id="1" name=""/>
+        <p:cNvGrpSpPr/>
+        <p:nvPr/>
+      </p:nvGrpSpPr>
+      <p:grpSpPr>
+        <a:xfrm>
+          <a:off x="0" y="0"/>
+          <a:ext cx="0" cy="0"/>
+          <a:chOff x="0" y="0"/>
+          <a:chExt cx="0" cy="0"/>
+        </a:xfrm>
+      </p:grpSpPr>
+      <p:sp>
+        <p:nvSpPr>
+          <p:cNvPr id="2" name="Título 1"/>
+          <p:cNvSpPr>
+            <a:spLocks noGrp="1"/>
+          </p:cNvSpPr>
+          <p:nvPr>
+            <p:ph type="title"/>
+          </p:nvPr>
+        </p:nvSpPr>
+        <p:spPr>
+          <a:xfrm>
+            <a:off x="1141411" y="413386"/>
+            <a:ext cx="9906000" cy="997403"/>
+          </a:xfrm>
+        </p:spPr>
+        <p:txBody>
+          <a:bodyPr/>
+          <a:lstStyle/>
+          <a:p>
+            <a:r>
+              <a:rPr lang="pt-BR" dirty="0"/>
               <a:t>5</a:t>
             </a:r>
             <a:r>
@@ -13499,7 +13672,7 @@
 </p:sld>
 </file>
 
-<file path=ppt/slides/slide12.xml><?xml version="1.0" encoding="utf-8"?>
+<file path=ppt/slides/slide13.xml><?xml version="1.0" encoding="utf-8"?>
 <p:sld xmlns:a="http://schemas.openxmlformats.org/drawingml/2006/main" xmlns:r="http://schemas.openxmlformats.org/officeDocument/2006/relationships" xmlns:p="http://schemas.openxmlformats.org/presentationml/2006/main">
   <p:cSld>
     <p:spTree>
@@ -13723,7 +13896,7 @@
 </p:sld>
 </file>
 
-<file path=ppt/slides/slide13.xml><?xml version="1.0" encoding="utf-8"?>
+<file path=ppt/slides/slide14.xml><?xml version="1.0" encoding="utf-8"?>
 <p:sld xmlns:a="http://schemas.openxmlformats.org/drawingml/2006/main" xmlns:r="http://schemas.openxmlformats.org/officeDocument/2006/relationships" xmlns:p="http://schemas.openxmlformats.org/presentationml/2006/main">
   <p:cSld>
     <p:spTree>
@@ -13857,230 +14030,6 @@
 </p:sld>
 </file>
 
-<file path=ppt/slides/slide14.xml><?xml version="1.0" encoding="utf-8"?>
-<p:sld xmlns:a="http://schemas.openxmlformats.org/drawingml/2006/main" xmlns:r="http://schemas.openxmlformats.org/officeDocument/2006/relationships" xmlns:p="http://schemas.openxmlformats.org/presentationml/2006/main">
-  <p:cSld>
-    <p:spTree>
-      <p:nvGrpSpPr>
-        <p:cNvPr id="1" name=""/>
-        <p:cNvGrpSpPr/>
-        <p:nvPr/>
-      </p:nvGrpSpPr>
-      <p:grpSpPr>
-        <a:xfrm>
-          <a:off x="0" y="0"/>
-          <a:ext cx="0" cy="0"/>
-          <a:chOff x="0" y="0"/>
-          <a:chExt cx="0" cy="0"/>
-        </a:xfrm>
-      </p:grpSpPr>
-      <p:sp>
-        <p:nvSpPr>
-          <p:cNvPr id="2" name="Título 1"/>
-          <p:cNvSpPr>
-            <a:spLocks noGrp="1"/>
-          </p:cNvSpPr>
-          <p:nvPr>
-            <p:ph type="title"/>
-          </p:nvPr>
-        </p:nvSpPr>
-        <p:spPr>
-          <a:xfrm>
-            <a:off x="1141411" y="413386"/>
-            <a:ext cx="9906000" cy="997403"/>
-          </a:xfrm>
-        </p:spPr>
-        <p:txBody>
-          <a:bodyPr/>
-          <a:lstStyle/>
-          <a:p>
-            <a:r>
-              <a:rPr lang="pt-BR" dirty="0"/>
-              <a:t>6</a:t>
-            </a:r>
-            <a:r>
-              <a:rPr lang="pt-BR" dirty="0" smtClean="0"/>
-              <a:t>. conclusão</a:t>
-            </a:r>
-            <a:endParaRPr lang="pt-BR" dirty="0"/>
-          </a:p>
-        </p:txBody>
-      </p:sp>
-      <p:sp>
-        <p:nvSpPr>
-          <p:cNvPr id="3" name="Espaço Reservado para Texto 2"/>
-          <p:cNvSpPr>
-            <a:spLocks noGrp="1"/>
-          </p:cNvSpPr>
-          <p:nvPr>
-            <p:ph type="body" idx="1"/>
-          </p:nvPr>
-        </p:nvSpPr>
-        <p:spPr>
-          <a:xfrm>
-            <a:off x="1141411" y="1946366"/>
-            <a:ext cx="9906000" cy="4402183"/>
-          </a:xfrm>
-        </p:spPr>
-        <p:txBody>
-          <a:bodyPr>
-            <a:normAutofit lnSpcReduction="10000"/>
-          </a:bodyPr>
-          <a:lstStyle/>
-          <a:p>
-            <a:pPr marL="285750" indent="-285750">
-              <a:buFont typeface="Arial" panose="020B0604020202020204" pitchFamily="34" charset="0"/>
-              <a:buChar char="•"/>
-            </a:pPr>
-            <a:r>
-              <a:rPr lang="pt-BR" dirty="0" smtClean="0"/>
-              <a:t>Maior parte dos clientes na categoria regular (R: 231 dias; F: 1,1 vezes; M: R$ 90,16)</a:t>
-            </a:r>
-          </a:p>
-          <a:p>
-            <a:pPr marL="285750" indent="-285750">
-              <a:buFont typeface="Arial" panose="020B0604020202020204" pitchFamily="34" charset="0"/>
-              <a:buChar char="•"/>
-            </a:pPr>
-            <a:r>
-              <a:rPr lang="pt-BR" dirty="0" smtClean="0"/>
-              <a:t>Menor parte dos clientes na categoria ótimo (</a:t>
-            </a:r>
-            <a:r>
-              <a:rPr lang="pt-BR" dirty="0"/>
-              <a:t>R: </a:t>
-            </a:r>
-            <a:r>
-              <a:rPr lang="pt-BR" dirty="0" smtClean="0"/>
-              <a:t>74 </a:t>
-            </a:r>
-            <a:r>
-              <a:rPr lang="pt-BR" dirty="0"/>
-              <a:t>dias; F: </a:t>
-            </a:r>
-            <a:r>
-              <a:rPr lang="pt-BR" dirty="0" smtClean="0"/>
-              <a:t>2,6 </a:t>
-            </a:r>
-            <a:r>
-              <a:rPr lang="pt-BR" dirty="0"/>
-              <a:t>vezes; M: R$ </a:t>
-            </a:r>
-            <a:r>
-              <a:rPr lang="pt-BR" dirty="0" smtClean="0"/>
-              <a:t>221,81)</a:t>
-            </a:r>
-          </a:p>
-          <a:p>
-            <a:pPr marL="285750" indent="-285750">
-              <a:buFont typeface="Arial" panose="020B0604020202020204" pitchFamily="34" charset="0"/>
-              <a:buChar char="•"/>
-            </a:pPr>
-            <a:r>
-              <a:rPr lang="pt-BR" dirty="0" smtClean="0"/>
-              <a:t>Grande quantidade de clientes compraram apenas 1 vez (insatisfeitos?)</a:t>
-            </a:r>
-          </a:p>
-          <a:p>
-            <a:pPr marL="285750" indent="-285750">
-              <a:buFont typeface="Arial" panose="020B0604020202020204" pitchFamily="34" charset="0"/>
-              <a:buChar char="•"/>
-            </a:pPr>
-            <a:r>
-              <a:rPr lang="pt-BR" dirty="0" smtClean="0"/>
-              <a:t>Oferecimento de vantagens ou estímulos para fidelização</a:t>
-            </a:r>
-            <a:endParaRPr lang="pt-BR" dirty="0"/>
-          </a:p>
-          <a:p>
-            <a:pPr marL="285750" indent="-285750">
-              <a:buFont typeface="Arial" panose="020B0604020202020204" pitchFamily="34" charset="0"/>
-              <a:buChar char="•"/>
-            </a:pPr>
-            <a:r>
-              <a:rPr lang="pt-BR" dirty="0" smtClean="0"/>
-              <a:t>Encontramos as categorias que mais obtiveram vendas</a:t>
-            </a:r>
-          </a:p>
-          <a:p>
-            <a:pPr marL="285750" indent="-285750">
-              <a:buFont typeface="Arial" panose="020B0604020202020204" pitchFamily="34" charset="0"/>
-              <a:buChar char="•"/>
-            </a:pPr>
-            <a:r>
-              <a:rPr lang="pt-BR" dirty="0" smtClean="0"/>
-              <a:t>Crescimento acelerado das vendas até meados de janeiro de 2018</a:t>
-            </a:r>
-          </a:p>
-          <a:p>
-            <a:pPr marL="285750" indent="-285750">
-              <a:buFont typeface="Arial" panose="020B0604020202020204" pitchFamily="34" charset="0"/>
-              <a:buChar char="•"/>
-            </a:pPr>
-            <a:r>
-              <a:rPr lang="pt-BR" dirty="0" smtClean="0"/>
-              <a:t>Segunda e terça feira são os dias com mais compras</a:t>
-            </a:r>
-          </a:p>
-          <a:p>
-            <a:pPr marL="285750" indent="-285750">
-              <a:buFont typeface="Arial" panose="020B0604020202020204" pitchFamily="34" charset="0"/>
-              <a:buChar char="•"/>
-            </a:pPr>
-            <a:r>
-              <a:rPr lang="pt-BR" dirty="0" smtClean="0"/>
-              <a:t>Final de semana os dias com menos vendas</a:t>
-            </a:r>
-          </a:p>
-          <a:p>
-            <a:pPr marL="285750" indent="-285750">
-              <a:buFont typeface="Arial" panose="020B0604020202020204" pitchFamily="34" charset="0"/>
-              <a:buChar char="•"/>
-            </a:pPr>
-            <a:r>
-              <a:rPr lang="pt-BR" dirty="0" smtClean="0"/>
-              <a:t>Pico de vendas anual entre novembro e dezembro</a:t>
-            </a:r>
-          </a:p>
-          <a:p>
-            <a:pPr marL="285750" indent="-285750">
-              <a:buFont typeface="Arial" panose="020B0604020202020204" pitchFamily="34" charset="0"/>
-              <a:buChar char="•"/>
-            </a:pPr>
-            <a:r>
-              <a:rPr lang="pt-BR" dirty="0" smtClean="0"/>
-              <a:t>Maior frequência de vendas até o dia 15 do mês. Subida no fim do mês</a:t>
-            </a:r>
-          </a:p>
-          <a:p>
-            <a:pPr marL="285750" indent="-285750">
-              <a:buFont typeface="Arial" panose="020B0604020202020204" pitchFamily="34" charset="0"/>
-              <a:buChar char="•"/>
-            </a:pPr>
-            <a:endParaRPr lang="pt-BR" dirty="0" smtClean="0"/>
-          </a:p>
-        </p:txBody>
-      </p:sp>
-    </p:spTree>
-    <p:extLst>
-      <p:ext uri="{BB962C8B-B14F-4D97-AF65-F5344CB8AC3E}">
-        <p14:creationId xmlns:p14="http://schemas.microsoft.com/office/powerpoint/2010/main" val="2278568767"/>
-      </p:ext>
-    </p:extLst>
-  </p:cSld>
-  <p:clrMapOvr>
-    <a:masterClrMapping/>
-  </p:clrMapOvr>
-  <p:timing>
-    <p:tnLst>
-      <p:par>
-        <p:cTn id="1" dur="indefinite" restart="never" nodeType="tmRoot"/>
-      </p:par>
-    </p:tnLst>
-  </p:timing>
-</p:sld>
-</file>
-
 <file path=ppt/slides/slide15.xml><?xml version="1.0" encoding="utf-8"?>
 <p:sld xmlns:a="http://schemas.openxmlformats.org/drawingml/2006/main" xmlns:r="http://schemas.openxmlformats.org/officeDocument/2006/relationships" xmlns:p="http://schemas.openxmlformats.org/presentationml/2006/main">
   <p:cSld>
@@ -14120,6 +14069,230 @@
           <a:p>
             <a:r>
               <a:rPr lang="pt-BR" dirty="0"/>
+              <a:t>6</a:t>
+            </a:r>
+            <a:r>
+              <a:rPr lang="pt-BR" dirty="0" smtClean="0"/>
+              <a:t>. conclusão</a:t>
+            </a:r>
+            <a:endParaRPr lang="pt-BR" dirty="0"/>
+          </a:p>
+        </p:txBody>
+      </p:sp>
+      <p:sp>
+        <p:nvSpPr>
+          <p:cNvPr id="3" name="Espaço Reservado para Texto 2"/>
+          <p:cNvSpPr>
+            <a:spLocks noGrp="1"/>
+          </p:cNvSpPr>
+          <p:nvPr>
+            <p:ph type="body" idx="1"/>
+          </p:nvPr>
+        </p:nvSpPr>
+        <p:spPr>
+          <a:xfrm>
+            <a:off x="1141411" y="1946366"/>
+            <a:ext cx="9906000" cy="4402183"/>
+          </a:xfrm>
+        </p:spPr>
+        <p:txBody>
+          <a:bodyPr>
+            <a:normAutofit lnSpcReduction="10000"/>
+          </a:bodyPr>
+          <a:lstStyle/>
+          <a:p>
+            <a:pPr marL="285750" indent="-285750">
+              <a:buFont typeface="Arial" panose="020B0604020202020204" pitchFamily="34" charset="0"/>
+              <a:buChar char="•"/>
+            </a:pPr>
+            <a:r>
+              <a:rPr lang="pt-BR" dirty="0" smtClean="0"/>
+              <a:t>Maior parte dos clientes na categoria regular (R: 231 dias; F: 1,1 vezes; M: R$ 90,16)</a:t>
+            </a:r>
+          </a:p>
+          <a:p>
+            <a:pPr marL="285750" indent="-285750">
+              <a:buFont typeface="Arial" panose="020B0604020202020204" pitchFamily="34" charset="0"/>
+              <a:buChar char="•"/>
+            </a:pPr>
+            <a:r>
+              <a:rPr lang="pt-BR" dirty="0" smtClean="0"/>
+              <a:t>Menor parte dos clientes na categoria ótimo (</a:t>
+            </a:r>
+            <a:r>
+              <a:rPr lang="pt-BR" dirty="0"/>
+              <a:t>R: </a:t>
+            </a:r>
+            <a:r>
+              <a:rPr lang="pt-BR" dirty="0" smtClean="0"/>
+              <a:t>74 </a:t>
+            </a:r>
+            <a:r>
+              <a:rPr lang="pt-BR" dirty="0"/>
+              <a:t>dias; F: </a:t>
+            </a:r>
+            <a:r>
+              <a:rPr lang="pt-BR" dirty="0" smtClean="0"/>
+              <a:t>2,6 </a:t>
+            </a:r>
+            <a:r>
+              <a:rPr lang="pt-BR" dirty="0"/>
+              <a:t>vezes; M: R$ </a:t>
+            </a:r>
+            <a:r>
+              <a:rPr lang="pt-BR" dirty="0" smtClean="0"/>
+              <a:t>221,81)</a:t>
+            </a:r>
+          </a:p>
+          <a:p>
+            <a:pPr marL="285750" indent="-285750">
+              <a:buFont typeface="Arial" panose="020B0604020202020204" pitchFamily="34" charset="0"/>
+              <a:buChar char="•"/>
+            </a:pPr>
+            <a:r>
+              <a:rPr lang="pt-BR" dirty="0" smtClean="0"/>
+              <a:t>Grande quantidade de clientes compraram apenas 1 vez (insatisfeitos?)</a:t>
+            </a:r>
+          </a:p>
+          <a:p>
+            <a:pPr marL="285750" indent="-285750">
+              <a:buFont typeface="Arial" panose="020B0604020202020204" pitchFamily="34" charset="0"/>
+              <a:buChar char="•"/>
+            </a:pPr>
+            <a:r>
+              <a:rPr lang="pt-BR" dirty="0" smtClean="0"/>
+              <a:t>Oferecimento de vantagens ou estímulos para fidelização</a:t>
+            </a:r>
+            <a:endParaRPr lang="pt-BR" dirty="0"/>
+          </a:p>
+          <a:p>
+            <a:pPr marL="285750" indent="-285750">
+              <a:buFont typeface="Arial" panose="020B0604020202020204" pitchFamily="34" charset="0"/>
+              <a:buChar char="•"/>
+            </a:pPr>
+            <a:r>
+              <a:rPr lang="pt-BR" dirty="0" smtClean="0"/>
+              <a:t>Encontramos as categorias que mais obtiveram vendas</a:t>
+            </a:r>
+          </a:p>
+          <a:p>
+            <a:pPr marL="285750" indent="-285750">
+              <a:buFont typeface="Arial" panose="020B0604020202020204" pitchFamily="34" charset="0"/>
+              <a:buChar char="•"/>
+            </a:pPr>
+            <a:r>
+              <a:rPr lang="pt-BR" dirty="0" smtClean="0"/>
+              <a:t>Crescimento acelerado das vendas até meados de janeiro de 2018</a:t>
+            </a:r>
+          </a:p>
+          <a:p>
+            <a:pPr marL="285750" indent="-285750">
+              <a:buFont typeface="Arial" panose="020B0604020202020204" pitchFamily="34" charset="0"/>
+              <a:buChar char="•"/>
+            </a:pPr>
+            <a:r>
+              <a:rPr lang="pt-BR" dirty="0" smtClean="0"/>
+              <a:t>Segunda e terça feira são os dias com mais compras</a:t>
+            </a:r>
+          </a:p>
+          <a:p>
+            <a:pPr marL="285750" indent="-285750">
+              <a:buFont typeface="Arial" panose="020B0604020202020204" pitchFamily="34" charset="0"/>
+              <a:buChar char="•"/>
+            </a:pPr>
+            <a:r>
+              <a:rPr lang="pt-BR" dirty="0" smtClean="0"/>
+              <a:t>Final de semana os dias com menos vendas</a:t>
+            </a:r>
+          </a:p>
+          <a:p>
+            <a:pPr marL="285750" indent="-285750">
+              <a:buFont typeface="Arial" panose="020B0604020202020204" pitchFamily="34" charset="0"/>
+              <a:buChar char="•"/>
+            </a:pPr>
+            <a:r>
+              <a:rPr lang="pt-BR" dirty="0" smtClean="0"/>
+              <a:t>Pico de vendas anual entre novembro e dezembro</a:t>
+            </a:r>
+          </a:p>
+          <a:p>
+            <a:pPr marL="285750" indent="-285750">
+              <a:buFont typeface="Arial" panose="020B0604020202020204" pitchFamily="34" charset="0"/>
+              <a:buChar char="•"/>
+            </a:pPr>
+            <a:r>
+              <a:rPr lang="pt-BR" dirty="0" smtClean="0"/>
+              <a:t>Maior frequência de vendas até o dia 15 do mês. Subida no fim do mês</a:t>
+            </a:r>
+          </a:p>
+          <a:p>
+            <a:pPr marL="285750" indent="-285750">
+              <a:buFont typeface="Arial" panose="020B0604020202020204" pitchFamily="34" charset="0"/>
+              <a:buChar char="•"/>
+            </a:pPr>
+            <a:endParaRPr lang="pt-BR" dirty="0" smtClean="0"/>
+          </a:p>
+        </p:txBody>
+      </p:sp>
+    </p:spTree>
+    <p:extLst>
+      <p:ext uri="{BB962C8B-B14F-4D97-AF65-F5344CB8AC3E}">
+        <p14:creationId xmlns:p14="http://schemas.microsoft.com/office/powerpoint/2010/main" val="2278568767"/>
+      </p:ext>
+    </p:extLst>
+  </p:cSld>
+  <p:clrMapOvr>
+    <a:masterClrMapping/>
+  </p:clrMapOvr>
+  <p:timing>
+    <p:tnLst>
+      <p:par>
+        <p:cTn id="1" dur="indefinite" restart="never" nodeType="tmRoot"/>
+      </p:par>
+    </p:tnLst>
+  </p:timing>
+</p:sld>
+</file>
+
+<file path=ppt/slides/slide16.xml><?xml version="1.0" encoding="utf-8"?>
+<p:sld xmlns:a="http://schemas.openxmlformats.org/drawingml/2006/main" xmlns:r="http://schemas.openxmlformats.org/officeDocument/2006/relationships" xmlns:p="http://schemas.openxmlformats.org/presentationml/2006/main">
+  <p:cSld>
+    <p:spTree>
+      <p:nvGrpSpPr>
+        <p:cNvPr id="1" name=""/>
+        <p:cNvGrpSpPr/>
+        <p:nvPr/>
+      </p:nvGrpSpPr>
+      <p:grpSpPr>
+        <a:xfrm>
+          <a:off x="0" y="0"/>
+          <a:ext cx="0" cy="0"/>
+          <a:chOff x="0" y="0"/>
+          <a:chExt cx="0" cy="0"/>
+        </a:xfrm>
+      </p:grpSpPr>
+      <p:sp>
+        <p:nvSpPr>
+          <p:cNvPr id="2" name="Título 1"/>
+          <p:cNvSpPr>
+            <a:spLocks noGrp="1"/>
+          </p:cNvSpPr>
+          <p:nvPr>
+            <p:ph type="title"/>
+          </p:nvPr>
+        </p:nvSpPr>
+        <p:spPr>
+          <a:xfrm>
+            <a:off x="1141411" y="413386"/>
+            <a:ext cx="9906000" cy="997403"/>
+          </a:xfrm>
+        </p:spPr>
+        <p:txBody>
+          <a:bodyPr/>
+          <a:lstStyle/>
+          <a:p>
+            <a:r>
+              <a:rPr lang="pt-BR" dirty="0"/>
               <a:t>7</a:t>
             </a:r>
             <a:r>
@@ -14255,7 +14428,7 @@
 </p:sld>
 </file>
 
-<file path=ppt/slides/slide16.xml><?xml version="1.0" encoding="utf-8"?>
+<file path=ppt/slides/slide17.xml><?xml version="1.0" encoding="utf-8"?>
 <p:sld xmlns:a="http://schemas.openxmlformats.org/drawingml/2006/main" xmlns:r="http://schemas.openxmlformats.org/officeDocument/2006/relationships" xmlns:p="http://schemas.openxmlformats.org/presentationml/2006/main">
   <p:cSld>
     <p:spTree>

</xml_diff>

<commit_message>
Replace dim 2 pca plot for dim 11
</commit_message>
<xml_diff>
--- a/apresentacao/Apresentacao.pptx
+++ b/apresentacao/Apresentacao.pptx
@@ -13376,13 +13376,8 @@
             </a:r>
             <a:r>
               <a:rPr lang="pt-BR" dirty="0" smtClean="0"/>
-              <a:t> </a:t>
-            </a:r>
-            <a:r>
-              <a:rPr lang="pt-BR" smtClean="0"/>
-              <a:t>das dimensões 1 e 2</a:t>
-            </a:r>
-            <a:endParaRPr lang="pt-BR" dirty="0" smtClean="0"/>
+              <a:t> das dimensões 1 e 11 (maior e menor variância)</a:t>
+            </a:r>
           </a:p>
           <a:p>
             <a:endParaRPr lang="pt-BR" dirty="0" smtClean="0"/>
@@ -13421,7 +13416,7 @@
       </p:pic>
       <p:pic>
         <p:nvPicPr>
-          <p:cNvPr id="6" name="Imagem 5"/>
+          <p:cNvPr id="7" name="Imagem 6"/>
           <p:cNvPicPr>
             <a:picLocks noChangeAspect="1"/>
           </p:cNvPicPr>
@@ -13441,8 +13436,8 @@
         </p:blipFill>
         <p:spPr>
           <a:xfrm>
-            <a:off x="2939731" y="4456531"/>
-            <a:ext cx="6308772" cy="1853940"/>
+            <a:off x="2939731" y="4460080"/>
+            <a:ext cx="6302890" cy="1846843"/>
           </a:xfrm>
           <a:prstGeom prst="rect">
             <a:avLst/>

</xml_diff>

<commit_message>
Edit introduction slide one more time
</commit_message>
<xml_diff>
--- a/apresentacao/Apresentacao.pptx
+++ b/apresentacao/Apresentacao.pptx
@@ -14718,7 +14718,7 @@
         </p:spPr>
         <p:txBody>
           <a:bodyPr>
-            <a:normAutofit fontScale="92500" lnSpcReduction="20000"/>
+            <a:normAutofit/>
           </a:bodyPr>
           <a:lstStyle/>
           <a:p>
@@ -14728,27 +14728,11 @@
             </a:pPr>
             <a:r>
               <a:rPr lang="pt-BR" dirty="0" smtClean="0"/>
-              <a:t>Avanço da tecnologia provém novas ferramentas</a:t>
-            </a:r>
-          </a:p>
-          <a:p>
-            <a:pPr marL="285750" indent="-285750">
-              <a:buFont typeface="Arial" panose="020B0604020202020204" pitchFamily="34" charset="0"/>
-              <a:buChar char="•"/>
-            </a:pPr>
+              <a:t>Aplicação </a:t>
+            </a:r>
             <a:r>
               <a:rPr lang="pt-BR" dirty="0" smtClean="0"/>
-              <a:t>Ferramentas aplicáveis em distintos modelos de negócios</a:t>
-            </a:r>
-          </a:p>
-          <a:p>
-            <a:pPr marL="285750" indent="-285750">
-              <a:buFont typeface="Arial" panose="020B0604020202020204" pitchFamily="34" charset="0"/>
-              <a:buChar char="•"/>
-            </a:pPr>
-            <a:r>
-              <a:rPr lang="pt-BR" dirty="0" smtClean="0"/>
-              <a:t>Aplicação nos contextos:</a:t>
+              <a:t>nos contextos:</a:t>
             </a:r>
           </a:p>
           <a:p>

</xml_diff>